<commit_message>
update PPT and demo code
</commit_message>
<xml_diff>
--- a/Rust调研.pptx
+++ b/Rust调研.pptx
@@ -5,23 +5,25 @@
     <p:sldMasterId id="2147483648" r:id="rId1"/>
   </p:sldMasterIdLst>
   <p:notesMasterIdLst>
-    <p:notesMasterId r:id="rId6"/>
+    <p:notesMasterId r:id="rId19"/>
   </p:notesMasterIdLst>
   <p:sldIdLst>
-    <p:sldId id="256" r:id="rId3"/>
-    <p:sldId id="257" r:id="rId4"/>
-    <p:sldId id="258" r:id="rId5"/>
-    <p:sldId id="259" r:id="rId7"/>
-    <p:sldId id="260" r:id="rId8"/>
-    <p:sldId id="262" r:id="rId9"/>
-    <p:sldId id="263" r:id="rId10"/>
-    <p:sldId id="264" r:id="rId11"/>
-    <p:sldId id="265" r:id="rId12"/>
-    <p:sldId id="266" r:id="rId13"/>
-    <p:sldId id="267" r:id="rId14"/>
-    <p:sldId id="269" r:id="rId15"/>
-    <p:sldId id="268" r:id="rId16"/>
-    <p:sldId id="270" r:id="rId17"/>
+    <p:sldId id="256" r:id="rId2"/>
+    <p:sldId id="257" r:id="rId3"/>
+    <p:sldId id="258" r:id="rId4"/>
+    <p:sldId id="259" r:id="rId5"/>
+    <p:sldId id="260" r:id="rId6"/>
+    <p:sldId id="262" r:id="rId7"/>
+    <p:sldId id="263" r:id="rId8"/>
+    <p:sldId id="264" r:id="rId9"/>
+    <p:sldId id="265" r:id="rId10"/>
+    <p:sldId id="266" r:id="rId11"/>
+    <p:sldId id="267" r:id="rId12"/>
+    <p:sldId id="269" r:id="rId13"/>
+    <p:sldId id="268" r:id="rId14"/>
+    <p:sldId id="274" r:id="rId15"/>
+    <p:sldId id="271" r:id="rId16"/>
+    <p:sldId id="273" r:id="rId17"/>
     <p:sldId id="261" r:id="rId18"/>
   </p:sldIdLst>
   <p:sldSz cx="12192000" cy="6858000"/>
@@ -121,11 +123,16 @@
       </a:defRPr>
     </a:lvl9pPr>
   </p:defaultTextStyle>
+  <p:extLst>
+    <p:ext uri="{EFAFB233-063F-42B5-8137-9DF3F51BA10A}">
+      <p15:sldGuideLst xmlns:p15="http://schemas.microsoft.com/office/powerpoint/2012/main"/>
+    </p:ext>
+  </p:extLst>
 </p:presentation>
 </file>
 
 <file path=ppt/diagrams/colors1.xml><?xml version="1.0" encoding="utf-8"?>
-<dgm:colorsDef xmlns:dgm="http://schemas.openxmlformats.org/drawingml/2006/diagram" xmlns:a="http://schemas.openxmlformats.org/drawingml/2006/main" uniqueId="urn:microsoft.com/office/officeart/2005/8/colors/accent1_2">
+<dgm:colorsDef xmlns:dgm="http://schemas.openxmlformats.org/drawingml/2006/diagram" xmlns:a="http://schemas.openxmlformats.org/drawingml/2006/main" uniqueId="urn:microsoft.com/office/officeart/2005/8/colors/accent1_2#1">
   <dgm:title val=""/>
   <dgm:desc val=""/>
   <dgm:catLst>
@@ -872,7 +879,7 @@
 </file>
 
 <file path=ppt/diagrams/colors2.xml><?xml version="1.0" encoding="utf-8"?>
-<dgm:colorsDef xmlns:dgm="http://schemas.openxmlformats.org/drawingml/2006/diagram" xmlns:a="http://schemas.openxmlformats.org/drawingml/2006/main" uniqueId="urn:microsoft.com/office/officeart/2005/8/colors/accent1_2">
+<dgm:colorsDef xmlns:dgm="http://schemas.openxmlformats.org/drawingml/2006/diagram" xmlns:a="http://schemas.openxmlformats.org/drawingml/2006/main" uniqueId="urn:microsoft.com/office/officeart/2005/8/colors/accent1_2#2">
   <dgm:title val=""/>
   <dgm:desc val=""/>
   <dgm:catLst>
@@ -1622,7 +1629,7 @@
 <dgm:dataModel xmlns:dgm="http://schemas.openxmlformats.org/drawingml/2006/diagram" xmlns:a="http://schemas.openxmlformats.org/drawingml/2006/main">
   <dgm:ptLst>
     <dgm:pt modelId="{983286CE-446A-4F9B-82B0-C597E376277A}" type="doc">
-      <dgm:prSet loTypeId="urn:microsoft.com/office/officeart/2005/8/layout/vList2" loCatId="list" qsTypeId="urn:microsoft.com/office/officeart/2005/8/quickstyle/simple1" qsCatId="simple" csTypeId="urn:microsoft.com/office/officeart/2005/8/colors/accent1_2" csCatId="accent1" phldr="1"/>
+      <dgm:prSet loTypeId="urn:microsoft.com/office/officeart/2005/8/layout/vList2#1" loCatId="list" qsTypeId="urn:microsoft.com/office/officeart/2005/8/quickstyle/simple1#1" qsCatId="simple" csTypeId="urn:microsoft.com/office/officeart/2005/8/colors/accent1_2#1" csCatId="accent1" phldr="1"/>
       <dgm:spPr/>
       <dgm:t>
         <a:bodyPr/>
@@ -1656,7 +1663,7 @@
         </a:p>
       </dgm:t>
     </dgm:pt>
-    <dgm:pt modelId="{580E44D2-1069-4E90-B4E1-E2161A1E1108}" cxnId="{78230898-919F-4988-94BC-F64D1D034AA2}" type="parTrans">
+    <dgm:pt modelId="{580E44D2-1069-4E90-B4E1-E2161A1E1108}" type="parTrans" cxnId="{78230898-919F-4988-94BC-F64D1D034AA2}">
       <dgm:prSet/>
       <dgm:spPr/>
       <dgm:t>
@@ -1667,7 +1674,7 @@
         </a:p>
       </dgm:t>
     </dgm:pt>
-    <dgm:pt modelId="{AC7099AB-1E01-47DC-BA2D-DD27D03B1C41}" cxnId="{78230898-919F-4988-94BC-F64D1D034AA2}" type="sibTrans">
+    <dgm:pt modelId="{AC7099AB-1E01-47DC-BA2D-DD27D03B1C41}" type="sibTrans" cxnId="{78230898-919F-4988-94BC-F64D1D034AA2}">
       <dgm:prSet/>
       <dgm:spPr/>
       <dgm:t>
@@ -1702,7 +1709,7 @@
         </a:p>
       </dgm:t>
     </dgm:pt>
-    <dgm:pt modelId="{4C256AA1-00E3-42AF-8686-F3F5BD3A6D8E}" cxnId="{001B09BD-1EE7-45B4-A4A2-FBE3F423B147}" type="parTrans">
+    <dgm:pt modelId="{4C256AA1-00E3-42AF-8686-F3F5BD3A6D8E}" type="parTrans" cxnId="{001B09BD-1EE7-45B4-A4A2-FBE3F423B147}">
       <dgm:prSet/>
       <dgm:spPr/>
       <dgm:t>
@@ -1713,7 +1720,7 @@
         </a:p>
       </dgm:t>
     </dgm:pt>
-    <dgm:pt modelId="{EED0CDDD-B020-4FD8-A38E-EDE72BF2251A}" cxnId="{001B09BD-1EE7-45B4-A4A2-FBE3F423B147}" type="sibTrans">
+    <dgm:pt modelId="{EED0CDDD-B020-4FD8-A38E-EDE72BF2251A}" type="sibTrans" cxnId="{001B09BD-1EE7-45B4-A4A2-FBE3F423B147}">
       <dgm:prSet/>
       <dgm:spPr/>
       <dgm:t>
@@ -1748,7 +1755,7 @@
         </a:p>
       </dgm:t>
     </dgm:pt>
-    <dgm:pt modelId="{7038D7A3-2B0D-42EA-B318-25A26AE5CCBE}" cxnId="{4AC01F2F-0761-439D-8B66-7C7C4D6031FF}" type="parTrans">
+    <dgm:pt modelId="{7038D7A3-2B0D-42EA-B318-25A26AE5CCBE}" type="parTrans" cxnId="{4AC01F2F-0761-439D-8B66-7C7C4D6031FF}">
       <dgm:prSet/>
       <dgm:spPr/>
       <dgm:t>
@@ -1759,7 +1766,7 @@
         </a:p>
       </dgm:t>
     </dgm:pt>
-    <dgm:pt modelId="{DDE96CFA-41D1-4124-A0B0-3869E1D6CAE7}" cxnId="{4AC01F2F-0761-439D-8B66-7C7C4D6031FF}" type="sibTrans">
+    <dgm:pt modelId="{DDE96CFA-41D1-4124-A0B0-3869E1D6CAE7}" type="sibTrans" cxnId="{4AC01F2F-0761-439D-8B66-7C7C4D6031FF}">
       <dgm:prSet/>
       <dgm:spPr/>
       <dgm:t>
@@ -1844,24 +1851,24 @@
     </dgm:pt>
   </dgm:ptLst>
   <dgm:cxnLst>
-    <dgm:cxn modelId="{3D482F73-3623-4871-9951-FB2B52BF89FC}" type="presOf" srcId="{80DEAACB-5F6F-4EA6-92A9-8525E6E4DC15}" destId="{B0DCA04B-0357-4F0A-853C-C3FA4952347E}" srcOrd="0" destOrd="0" presId="urn:microsoft.com/office/officeart/2005/8/layout/vList2"/>
+    <dgm:cxn modelId="{3D482F73-3623-4871-9951-FB2B52BF89FC}" type="presOf" srcId="{80DEAACB-5F6F-4EA6-92A9-8525E6E4DC15}" destId="{B0DCA04B-0357-4F0A-853C-C3FA4952347E}" srcOrd="0" destOrd="0" presId="urn:microsoft.com/office/officeart/2005/8/layout/vList2#1"/>
     <dgm:cxn modelId="{001B09BD-1EE7-45B4-A4A2-FBE3F423B147}" srcId="{983286CE-446A-4F9B-82B0-C597E376277A}" destId="{13B5A9A5-5A4B-468B-943F-943880A5A861}" srcOrd="1" destOrd="0" parTransId="{4C256AA1-00E3-42AF-8686-F3F5BD3A6D8E}" sibTransId="{EED0CDDD-B020-4FD8-A38E-EDE72BF2251A}"/>
-    <dgm:cxn modelId="{D860AAE7-63F3-4CE3-9ACB-6F50A2645D08}" type="presOf" srcId="{13B5A9A5-5A4B-468B-943F-943880A5A861}" destId="{17FA72BE-E120-4DB5-9241-680132CD847B}" srcOrd="0" destOrd="0" presId="urn:microsoft.com/office/officeart/2005/8/layout/vList2"/>
-    <dgm:cxn modelId="{5769F26A-F05F-432E-A164-48E79F01FB36}" type="presOf" srcId="{983286CE-446A-4F9B-82B0-C597E376277A}" destId="{C6D428E2-0DD2-431B-B55E-5C6E57D8CBF6}" srcOrd="0" destOrd="0" presId="urn:microsoft.com/office/officeart/2005/8/layout/vList2"/>
-    <dgm:cxn modelId="{64EE26AB-CB67-4C46-B18F-2CD5B73A4BD1}" type="presOf" srcId="{2B826EB9-6DF8-4AD2-B07A-78651F72AE56}" destId="{C89A32A6-75B1-4B69-B952-545EFE2CBD58}" srcOrd="0" destOrd="0" presId="urn:microsoft.com/office/officeart/2005/8/layout/vList2"/>
+    <dgm:cxn modelId="{D860AAE7-63F3-4CE3-9ACB-6F50A2645D08}" type="presOf" srcId="{13B5A9A5-5A4B-468B-943F-943880A5A861}" destId="{17FA72BE-E120-4DB5-9241-680132CD847B}" srcOrd="0" destOrd="0" presId="urn:microsoft.com/office/officeart/2005/8/layout/vList2#1"/>
+    <dgm:cxn modelId="{5769F26A-F05F-432E-A164-48E79F01FB36}" type="presOf" srcId="{983286CE-446A-4F9B-82B0-C597E376277A}" destId="{C6D428E2-0DD2-431B-B55E-5C6E57D8CBF6}" srcOrd="0" destOrd="0" presId="urn:microsoft.com/office/officeart/2005/8/layout/vList2#1"/>
+    <dgm:cxn modelId="{64EE26AB-CB67-4C46-B18F-2CD5B73A4BD1}" type="presOf" srcId="{2B826EB9-6DF8-4AD2-B07A-78651F72AE56}" destId="{C89A32A6-75B1-4B69-B952-545EFE2CBD58}" srcOrd="0" destOrd="0" presId="urn:microsoft.com/office/officeart/2005/8/layout/vList2#1"/>
     <dgm:cxn modelId="{78230898-919F-4988-94BC-F64D1D034AA2}" srcId="{983286CE-446A-4F9B-82B0-C597E376277A}" destId="{2B826EB9-6DF8-4AD2-B07A-78651F72AE56}" srcOrd="0" destOrd="0" parTransId="{580E44D2-1069-4E90-B4E1-E2161A1E1108}" sibTransId="{AC7099AB-1E01-47DC-BA2D-DD27D03B1C41}"/>
     <dgm:cxn modelId="{4AC01F2F-0761-439D-8B66-7C7C4D6031FF}" srcId="{983286CE-446A-4F9B-82B0-C597E376277A}" destId="{80DEAACB-5F6F-4EA6-92A9-8525E6E4DC15}" srcOrd="2" destOrd="0" parTransId="{7038D7A3-2B0D-42EA-B318-25A26AE5CCBE}" sibTransId="{DDE96CFA-41D1-4124-A0B0-3869E1D6CAE7}"/>
-    <dgm:cxn modelId="{F4D548B1-0358-484F-9145-325AF0FF04CC}" type="presParOf" srcId="{C6D428E2-0DD2-431B-B55E-5C6E57D8CBF6}" destId="{C89A32A6-75B1-4B69-B952-545EFE2CBD58}" srcOrd="0" destOrd="0" presId="urn:microsoft.com/office/officeart/2005/8/layout/vList2"/>
-    <dgm:cxn modelId="{EE03DAE9-4F0C-4A37-A424-4A34D30BA6E2}" type="presParOf" srcId="{C6D428E2-0DD2-431B-B55E-5C6E57D8CBF6}" destId="{C0DFBEE6-DEB2-4B94-BFBE-D473B250490E}" srcOrd="1" destOrd="0" presId="urn:microsoft.com/office/officeart/2005/8/layout/vList2"/>
-    <dgm:cxn modelId="{BBDC4185-26A1-49B9-8D2E-A0F372C1A8E8}" type="presParOf" srcId="{C6D428E2-0DD2-431B-B55E-5C6E57D8CBF6}" destId="{17FA72BE-E120-4DB5-9241-680132CD847B}" srcOrd="2" destOrd="0" presId="urn:microsoft.com/office/officeart/2005/8/layout/vList2"/>
-    <dgm:cxn modelId="{63CD73E5-C464-46BF-AA55-358DBDDC3ACE}" type="presParOf" srcId="{C6D428E2-0DD2-431B-B55E-5C6E57D8CBF6}" destId="{B2F7EED2-3919-4E53-80B5-69A7987E9659}" srcOrd="3" destOrd="0" presId="urn:microsoft.com/office/officeart/2005/8/layout/vList2"/>
-    <dgm:cxn modelId="{36AF23EF-A3C8-4C88-A280-E511E432EE8D}" type="presParOf" srcId="{C6D428E2-0DD2-431B-B55E-5C6E57D8CBF6}" destId="{B0DCA04B-0357-4F0A-853C-C3FA4952347E}" srcOrd="4" destOrd="0" presId="urn:microsoft.com/office/officeart/2005/8/layout/vList2"/>
+    <dgm:cxn modelId="{F4D548B1-0358-484F-9145-325AF0FF04CC}" type="presParOf" srcId="{C6D428E2-0DD2-431B-B55E-5C6E57D8CBF6}" destId="{C89A32A6-75B1-4B69-B952-545EFE2CBD58}" srcOrd="0" destOrd="0" presId="urn:microsoft.com/office/officeart/2005/8/layout/vList2#1"/>
+    <dgm:cxn modelId="{EE03DAE9-4F0C-4A37-A424-4A34D30BA6E2}" type="presParOf" srcId="{C6D428E2-0DD2-431B-B55E-5C6E57D8CBF6}" destId="{C0DFBEE6-DEB2-4B94-BFBE-D473B250490E}" srcOrd="1" destOrd="0" presId="urn:microsoft.com/office/officeart/2005/8/layout/vList2#1"/>
+    <dgm:cxn modelId="{BBDC4185-26A1-49B9-8D2E-A0F372C1A8E8}" type="presParOf" srcId="{C6D428E2-0DD2-431B-B55E-5C6E57D8CBF6}" destId="{17FA72BE-E120-4DB5-9241-680132CD847B}" srcOrd="2" destOrd="0" presId="urn:microsoft.com/office/officeart/2005/8/layout/vList2#1"/>
+    <dgm:cxn modelId="{63CD73E5-C464-46BF-AA55-358DBDDC3ACE}" type="presParOf" srcId="{C6D428E2-0DD2-431B-B55E-5C6E57D8CBF6}" destId="{B2F7EED2-3919-4E53-80B5-69A7987E9659}" srcOrd="3" destOrd="0" presId="urn:microsoft.com/office/officeart/2005/8/layout/vList2#1"/>
+    <dgm:cxn modelId="{36AF23EF-A3C8-4C88-A280-E511E432EE8D}" type="presParOf" srcId="{C6D428E2-0DD2-431B-B55E-5C6E57D8CBF6}" destId="{B0DCA04B-0357-4F0A-853C-C3FA4952347E}" srcOrd="4" destOrd="0" presId="urn:microsoft.com/office/officeart/2005/8/layout/vList2#1"/>
   </dgm:cxnLst>
   <dgm:bg/>
   <dgm:whole/>
   <dgm:extLst>
     <a:ext uri="http://schemas.microsoft.com/office/drawing/2008/diagram">
-      <dsp:dataModelExt xmlns:dsp="http://schemas.microsoft.com/office/drawing/2008/diagram" relId="rId5" minVer="http://schemas.openxmlformats.org/drawingml/2006/diagram"/>
+      <dsp:dataModelExt xmlns:dsp="http://schemas.microsoft.com/office/drawing/2008/diagram" relId="rId6" minVer="http://schemas.openxmlformats.org/drawingml/2006/diagram"/>
     </a:ext>
   </dgm:extLst>
 </dgm:dataModel>
@@ -1871,7 +1878,7 @@
 <dgm:dataModel xmlns:dgm="http://schemas.openxmlformats.org/drawingml/2006/diagram" xmlns:a="http://schemas.openxmlformats.org/drawingml/2006/main">
   <dgm:ptLst>
     <dgm:pt modelId="{010C7CB2-6680-4E4A-B99C-904D2B60123A}" type="doc">
-      <dgm:prSet loTypeId="urn:microsoft.com/office/officeart/2005/8/layout/arrow2" loCatId="process" qsTypeId="urn:microsoft.com/office/officeart/2005/8/quickstyle/simple1" qsCatId="simple" csTypeId="urn:microsoft.com/office/officeart/2005/8/colors/accent1_2" csCatId="accent1" phldr="1"/>
+      <dgm:prSet loTypeId="urn:microsoft.com/office/officeart/2005/8/layout/arrow2#1" loCatId="process" qsTypeId="urn:microsoft.com/office/officeart/2005/8/quickstyle/simple1#2" qsCatId="simple" csTypeId="urn:microsoft.com/office/officeart/2005/8/colors/accent1_2#2" csCatId="accent1" phldr="1"/>
       <dgm:spPr/>
     </dgm:pt>
     <dgm:pt modelId="{CA17F39D-21AC-4D46-8CC5-ABA9AF7C0832}">
@@ -1919,7 +1926,7 @@
         </a:p>
       </dgm:t>
     </dgm:pt>
-    <dgm:pt modelId="{D5DB9D9D-5FAC-4A22-966D-AAFBB446676C}" cxnId="{E69C9D86-10F9-4460-996A-8D48D9E1ED31}" type="parTrans">
+    <dgm:pt modelId="{D5DB9D9D-5FAC-4A22-966D-AAFBB446676C}" type="parTrans" cxnId="{E69C9D86-10F9-4460-996A-8D48D9E1ED31}">
       <dgm:prSet/>
       <dgm:spPr/>
       <dgm:t>
@@ -1930,7 +1937,7 @@
         </a:p>
       </dgm:t>
     </dgm:pt>
-    <dgm:pt modelId="{AC64B6D3-7F3B-48C1-BEA8-3E52CBB01AF7}" cxnId="{E69C9D86-10F9-4460-996A-8D48D9E1ED31}" type="sibTrans">
+    <dgm:pt modelId="{AC64B6D3-7F3B-48C1-BEA8-3E52CBB01AF7}" type="sibTrans" cxnId="{E69C9D86-10F9-4460-996A-8D48D9E1ED31}">
       <dgm:prSet/>
       <dgm:spPr/>
       <dgm:t>
@@ -1980,7 +1987,7 @@
         </a:p>
       </dgm:t>
     </dgm:pt>
-    <dgm:pt modelId="{6A931022-86ED-44CE-A8F3-6F5970BC8A4F}" cxnId="{AF1808A2-E295-431C-9AE2-BA66B8B4C9BB}" type="parTrans">
+    <dgm:pt modelId="{6A931022-86ED-44CE-A8F3-6F5970BC8A4F}" type="parTrans" cxnId="{AF1808A2-E295-431C-9AE2-BA66B8B4C9BB}">
       <dgm:prSet/>
       <dgm:spPr/>
       <dgm:t>
@@ -1991,7 +1998,7 @@
         </a:p>
       </dgm:t>
     </dgm:pt>
-    <dgm:pt modelId="{13553A33-036B-48BC-8252-E72241F5CC7B}" cxnId="{AF1808A2-E295-431C-9AE2-BA66B8B4C9BB}" type="sibTrans">
+    <dgm:pt modelId="{13553A33-036B-48BC-8252-E72241F5CC7B}" type="sibTrans" cxnId="{AF1808A2-E295-431C-9AE2-BA66B8B4C9BB}">
       <dgm:prSet/>
       <dgm:spPr/>
       <dgm:t>
@@ -2026,7 +2033,7 @@
         </a:p>
       </dgm:t>
     </dgm:pt>
-    <dgm:pt modelId="{A1EE81A5-DFA1-4A41-96CB-C98FDE5D4342}" cxnId="{C640ACF4-50BE-4BE6-9F9C-C4B388C055FE}" type="parTrans">
+    <dgm:pt modelId="{A1EE81A5-DFA1-4A41-96CB-C98FDE5D4342}" type="parTrans" cxnId="{C640ACF4-50BE-4BE6-9F9C-C4B388C055FE}">
       <dgm:prSet/>
       <dgm:spPr/>
       <dgm:t>
@@ -2037,7 +2044,7 @@
         </a:p>
       </dgm:t>
     </dgm:pt>
-    <dgm:pt modelId="{1609F81C-788F-4D96-B7D6-9ACFA791CFBD}" cxnId="{C640ACF4-50BE-4BE6-9F9C-C4B388C055FE}" type="sibTrans">
+    <dgm:pt modelId="{1609F81C-788F-4D96-B7D6-9ACFA791CFBD}" type="sibTrans" cxnId="{C640ACF4-50BE-4BE6-9F9C-C4B388C055FE}">
       <dgm:prSet/>
       <dgm:spPr/>
       <dgm:t>
@@ -2059,7 +2066,7 @@
         </a:p>
       </dgm:t>
     </dgm:pt>
-    <dgm:pt modelId="{F31237F8-2C1E-4A97-987C-5EBC7AC41DF2}" cxnId="{A9D31B76-6787-4604-B0CB-E54AF772DE78}" type="parTrans">
+    <dgm:pt modelId="{F31237F8-2C1E-4A97-987C-5EBC7AC41DF2}" type="parTrans" cxnId="{A9D31B76-6787-4604-B0CB-E54AF772DE78}">
       <dgm:prSet/>
       <dgm:spPr/>
       <dgm:t>
@@ -2070,7 +2077,7 @@
         </a:p>
       </dgm:t>
     </dgm:pt>
-    <dgm:pt modelId="{9D110154-9C19-4CEC-AD19-BACD229A2E04}" cxnId="{A9D31B76-6787-4604-B0CB-E54AF772DE78}" type="sibTrans">
+    <dgm:pt modelId="{9D110154-9C19-4CEC-AD19-BACD229A2E04}" type="sibTrans" cxnId="{A9D31B76-6787-4604-B0CB-E54AF772DE78}">
       <dgm:prSet/>
       <dgm:spPr/>
       <dgm:t>
@@ -2092,7 +2099,7 @@
         </a:p>
       </dgm:t>
     </dgm:pt>
-    <dgm:pt modelId="{A1AAAABF-059D-49D5-8F33-DCF02BA1E07C}" cxnId="{D2012F15-BC57-44A7-9679-AF40EDA1B2D9}" type="parTrans">
+    <dgm:pt modelId="{A1AAAABF-059D-49D5-8F33-DCF02BA1E07C}" type="parTrans" cxnId="{D2012F15-BC57-44A7-9679-AF40EDA1B2D9}">
       <dgm:prSet/>
       <dgm:spPr/>
       <dgm:t>
@@ -2103,7 +2110,7 @@
         </a:p>
       </dgm:t>
     </dgm:pt>
-    <dgm:pt modelId="{71FD7C62-CF7B-46B1-9311-268DC14A93AB}" cxnId="{D2012F15-BC57-44A7-9679-AF40EDA1B2D9}" type="sibTrans">
+    <dgm:pt modelId="{71FD7C62-CF7B-46B1-9311-268DC14A93AB}" type="sibTrans" cxnId="{D2012F15-BC57-44A7-9679-AF40EDA1B2D9}">
       <dgm:prSet/>
       <dgm:spPr/>
       <dgm:t>
@@ -2230,74 +2237,87 @@
   </dgm:ptLst>
   <dgm:cxnLst>
     <dgm:cxn modelId="{AF1808A2-E295-431C-9AE2-BA66B8B4C9BB}" srcId="{010C7CB2-6680-4E4A-B99C-904D2B60123A}" destId="{807451BD-516C-4176-BD47-20B11B7816F9}" srcOrd="1" destOrd="0" parTransId="{6A931022-86ED-44CE-A8F3-6F5970BC8A4F}" sibTransId="{13553A33-036B-48BC-8252-E72241F5CC7B}"/>
-    <dgm:cxn modelId="{89415093-FD29-45AE-BE98-5B6B5FA06581}" type="presOf" srcId="{A7FC8F27-AE57-4E5A-8BF1-6E51BEBB9A97}" destId="{1B0A9E80-58E0-4F1B-9807-0D08965C64F9}" srcOrd="0" destOrd="0" presId="urn:microsoft.com/office/officeart/2005/8/layout/arrow2"/>
+    <dgm:cxn modelId="{89415093-FD29-45AE-BE98-5B6B5FA06581}" type="presOf" srcId="{A7FC8F27-AE57-4E5A-8BF1-6E51BEBB9A97}" destId="{1B0A9E80-58E0-4F1B-9807-0D08965C64F9}" srcOrd="0" destOrd="0" presId="urn:microsoft.com/office/officeart/2005/8/layout/arrow2#1"/>
     <dgm:cxn modelId="{D2012F15-BC57-44A7-9679-AF40EDA1B2D9}" srcId="{010C7CB2-6680-4E4A-B99C-904D2B60123A}" destId="{EA84B3FE-F761-4145-A323-DA94E7416C41}" srcOrd="4" destOrd="0" parTransId="{A1AAAABF-059D-49D5-8F33-DCF02BA1E07C}" sibTransId="{71FD7C62-CF7B-46B1-9311-268DC14A93AB}"/>
-    <dgm:cxn modelId="{104E9A3A-16AE-4B25-869A-07BE70439283}" type="presOf" srcId="{EA84B3FE-F761-4145-A323-DA94E7416C41}" destId="{4BB30F82-E3F8-4F78-9892-353560ECF66A}" srcOrd="0" destOrd="0" presId="urn:microsoft.com/office/officeart/2005/8/layout/arrow2"/>
+    <dgm:cxn modelId="{104E9A3A-16AE-4B25-869A-07BE70439283}" type="presOf" srcId="{EA84B3FE-F761-4145-A323-DA94E7416C41}" destId="{4BB30F82-E3F8-4F78-9892-353560ECF66A}" srcOrd="0" destOrd="0" presId="urn:microsoft.com/office/officeart/2005/8/layout/arrow2#1"/>
     <dgm:cxn modelId="{E69C9D86-10F9-4460-996A-8D48D9E1ED31}" srcId="{010C7CB2-6680-4E4A-B99C-904D2B60123A}" destId="{CA17F39D-21AC-4D46-8CC5-ABA9AF7C0832}" srcOrd="0" destOrd="0" parTransId="{D5DB9D9D-5FAC-4A22-966D-AAFBB446676C}" sibTransId="{AC64B6D3-7F3B-48C1-BEA8-3E52CBB01AF7}"/>
-    <dgm:cxn modelId="{D84B6AF6-02C5-46A2-AFFC-819B87D4DC98}" type="presOf" srcId="{CA17F39D-21AC-4D46-8CC5-ABA9AF7C0832}" destId="{50D9E917-3DAC-4A3F-A991-42B18DBC85AC}" srcOrd="0" destOrd="0" presId="urn:microsoft.com/office/officeart/2005/8/layout/arrow2"/>
+    <dgm:cxn modelId="{D84B6AF6-02C5-46A2-AFFC-819B87D4DC98}" type="presOf" srcId="{CA17F39D-21AC-4D46-8CC5-ABA9AF7C0832}" destId="{50D9E917-3DAC-4A3F-A991-42B18DBC85AC}" srcOrd="0" destOrd="0" presId="urn:microsoft.com/office/officeart/2005/8/layout/arrow2#1"/>
     <dgm:cxn modelId="{A9D31B76-6787-4604-B0CB-E54AF772DE78}" srcId="{010C7CB2-6680-4E4A-B99C-904D2B60123A}" destId="{5D977A63-015C-4457-9C71-1E9F8E27AE65}" srcOrd="3" destOrd="0" parTransId="{F31237F8-2C1E-4A97-987C-5EBC7AC41DF2}" sibTransId="{9D110154-9C19-4CEC-AD19-BACD229A2E04}"/>
-    <dgm:cxn modelId="{A1D56B4E-4908-49E0-A6B0-057C2615405C}" type="presOf" srcId="{807451BD-516C-4176-BD47-20B11B7816F9}" destId="{3331BA0B-0227-44E7-A0EE-96E9667A38C5}" srcOrd="0" destOrd="0" presId="urn:microsoft.com/office/officeart/2005/8/layout/arrow2"/>
+    <dgm:cxn modelId="{A1D56B4E-4908-49E0-A6B0-057C2615405C}" type="presOf" srcId="{807451BD-516C-4176-BD47-20B11B7816F9}" destId="{3331BA0B-0227-44E7-A0EE-96E9667A38C5}" srcOrd="0" destOrd="0" presId="urn:microsoft.com/office/officeart/2005/8/layout/arrow2#1"/>
     <dgm:cxn modelId="{C640ACF4-50BE-4BE6-9F9C-C4B388C055FE}" srcId="{010C7CB2-6680-4E4A-B99C-904D2B60123A}" destId="{A7FC8F27-AE57-4E5A-8BF1-6E51BEBB9A97}" srcOrd="2" destOrd="0" parTransId="{A1EE81A5-DFA1-4A41-96CB-C98FDE5D4342}" sibTransId="{1609F81C-788F-4D96-B7D6-9ACFA791CFBD}"/>
-    <dgm:cxn modelId="{C3EE8304-0352-4665-9347-B24493694F05}" type="presOf" srcId="{010C7CB2-6680-4E4A-B99C-904D2B60123A}" destId="{1EB3CED2-957E-40BD-A56F-57393C9FF364}" srcOrd="0" destOrd="0" presId="urn:microsoft.com/office/officeart/2005/8/layout/arrow2"/>
-    <dgm:cxn modelId="{E39C5110-9A7D-4E33-BFDF-BD241938E1AB}" type="presOf" srcId="{5D977A63-015C-4457-9C71-1E9F8E27AE65}" destId="{A6A60C68-6B48-400D-989E-41B3A837A146}" srcOrd="0" destOrd="0" presId="urn:microsoft.com/office/officeart/2005/8/layout/arrow2"/>
-    <dgm:cxn modelId="{530751A9-CF94-48AC-990C-8F470424BE8E}" type="presParOf" srcId="{1EB3CED2-957E-40BD-A56F-57393C9FF364}" destId="{B52F97A3-79D9-45C4-B3F2-1FABD14756C8}" srcOrd="0" destOrd="0" presId="urn:microsoft.com/office/officeart/2005/8/layout/arrow2"/>
-    <dgm:cxn modelId="{4F520754-8214-4EA4-B208-6BF588CDF050}" type="presParOf" srcId="{1EB3CED2-957E-40BD-A56F-57393C9FF364}" destId="{0ED4371F-C365-4F9C-8288-D1A5FCE88F2E}" srcOrd="1" destOrd="0" presId="urn:microsoft.com/office/officeart/2005/8/layout/arrow2"/>
-    <dgm:cxn modelId="{D82AA037-FD9D-4A1D-B344-B0AB6BD4C180}" type="presParOf" srcId="{0ED4371F-C365-4F9C-8288-D1A5FCE88F2E}" destId="{E01A1116-EEF5-40F3-A1AB-5B2152D30435}" srcOrd="0" destOrd="0" presId="urn:microsoft.com/office/officeart/2005/8/layout/arrow2"/>
-    <dgm:cxn modelId="{FAF03F43-B249-46E1-A5FF-C3840010A49E}" type="presParOf" srcId="{0ED4371F-C365-4F9C-8288-D1A5FCE88F2E}" destId="{50D9E917-3DAC-4A3F-A991-42B18DBC85AC}" srcOrd="1" destOrd="0" presId="urn:microsoft.com/office/officeart/2005/8/layout/arrow2"/>
-    <dgm:cxn modelId="{547007CC-3A89-406F-8ED4-AEC4E5C1A43E}" type="presParOf" srcId="{0ED4371F-C365-4F9C-8288-D1A5FCE88F2E}" destId="{E1D17602-9636-4444-8F4C-4B133495B27E}" srcOrd="2" destOrd="0" presId="urn:microsoft.com/office/officeart/2005/8/layout/arrow2"/>
-    <dgm:cxn modelId="{2CD86A65-F376-4CE0-B2C3-7318066DD70B}" type="presParOf" srcId="{0ED4371F-C365-4F9C-8288-D1A5FCE88F2E}" destId="{3331BA0B-0227-44E7-A0EE-96E9667A38C5}" srcOrd="3" destOrd="0" presId="urn:microsoft.com/office/officeart/2005/8/layout/arrow2"/>
-    <dgm:cxn modelId="{651E8606-D8CF-4809-93BD-92FFF0EF4BDB}" type="presParOf" srcId="{0ED4371F-C365-4F9C-8288-D1A5FCE88F2E}" destId="{52320FAD-E02B-4695-8C9D-F7B2E412DB02}" srcOrd="4" destOrd="0" presId="urn:microsoft.com/office/officeart/2005/8/layout/arrow2"/>
-    <dgm:cxn modelId="{40FFF57C-8B89-4911-8B5A-BBDB84E733D6}" type="presParOf" srcId="{0ED4371F-C365-4F9C-8288-D1A5FCE88F2E}" destId="{1B0A9E80-58E0-4F1B-9807-0D08965C64F9}" srcOrd="5" destOrd="0" presId="urn:microsoft.com/office/officeart/2005/8/layout/arrow2"/>
-    <dgm:cxn modelId="{02DA011A-CB07-4880-9804-B0A61689E69C}" type="presParOf" srcId="{0ED4371F-C365-4F9C-8288-D1A5FCE88F2E}" destId="{11C52DA7-38F9-42BA-86EC-E1190751B3A9}" srcOrd="6" destOrd="0" presId="urn:microsoft.com/office/officeart/2005/8/layout/arrow2"/>
-    <dgm:cxn modelId="{3F990F65-B26F-4D31-AB06-3EC62A249CCD}" type="presParOf" srcId="{0ED4371F-C365-4F9C-8288-D1A5FCE88F2E}" destId="{A6A60C68-6B48-400D-989E-41B3A837A146}" srcOrd="7" destOrd="0" presId="urn:microsoft.com/office/officeart/2005/8/layout/arrow2"/>
-    <dgm:cxn modelId="{565FE320-6D1B-47CF-9062-C82373CE69C9}" type="presParOf" srcId="{0ED4371F-C365-4F9C-8288-D1A5FCE88F2E}" destId="{709D4EEB-418B-4C8B-818F-B9749DC245C4}" srcOrd="8" destOrd="0" presId="urn:microsoft.com/office/officeart/2005/8/layout/arrow2"/>
-    <dgm:cxn modelId="{E1C9A4C8-F6A2-43E5-8DF7-3104CC5C0397}" type="presParOf" srcId="{0ED4371F-C365-4F9C-8288-D1A5FCE88F2E}" destId="{4BB30F82-E3F8-4F78-9892-353560ECF66A}" srcOrd="9" destOrd="0" presId="urn:microsoft.com/office/officeart/2005/8/layout/arrow2"/>
+    <dgm:cxn modelId="{C3EE8304-0352-4665-9347-B24493694F05}" type="presOf" srcId="{010C7CB2-6680-4E4A-B99C-904D2B60123A}" destId="{1EB3CED2-957E-40BD-A56F-57393C9FF364}" srcOrd="0" destOrd="0" presId="urn:microsoft.com/office/officeart/2005/8/layout/arrow2#1"/>
+    <dgm:cxn modelId="{E39C5110-9A7D-4E33-BFDF-BD241938E1AB}" type="presOf" srcId="{5D977A63-015C-4457-9C71-1E9F8E27AE65}" destId="{A6A60C68-6B48-400D-989E-41B3A837A146}" srcOrd="0" destOrd="0" presId="urn:microsoft.com/office/officeart/2005/8/layout/arrow2#1"/>
+    <dgm:cxn modelId="{530751A9-CF94-48AC-990C-8F470424BE8E}" type="presParOf" srcId="{1EB3CED2-957E-40BD-A56F-57393C9FF364}" destId="{B52F97A3-79D9-45C4-B3F2-1FABD14756C8}" srcOrd="0" destOrd="0" presId="urn:microsoft.com/office/officeart/2005/8/layout/arrow2#1"/>
+    <dgm:cxn modelId="{4F520754-8214-4EA4-B208-6BF588CDF050}" type="presParOf" srcId="{1EB3CED2-957E-40BD-A56F-57393C9FF364}" destId="{0ED4371F-C365-4F9C-8288-D1A5FCE88F2E}" srcOrd="1" destOrd="0" presId="urn:microsoft.com/office/officeart/2005/8/layout/arrow2#1"/>
+    <dgm:cxn modelId="{D82AA037-FD9D-4A1D-B344-B0AB6BD4C180}" type="presParOf" srcId="{0ED4371F-C365-4F9C-8288-D1A5FCE88F2E}" destId="{E01A1116-EEF5-40F3-A1AB-5B2152D30435}" srcOrd="0" destOrd="0" presId="urn:microsoft.com/office/officeart/2005/8/layout/arrow2#1"/>
+    <dgm:cxn modelId="{FAF03F43-B249-46E1-A5FF-C3840010A49E}" type="presParOf" srcId="{0ED4371F-C365-4F9C-8288-D1A5FCE88F2E}" destId="{50D9E917-3DAC-4A3F-A991-42B18DBC85AC}" srcOrd="1" destOrd="0" presId="urn:microsoft.com/office/officeart/2005/8/layout/arrow2#1"/>
+    <dgm:cxn modelId="{547007CC-3A89-406F-8ED4-AEC4E5C1A43E}" type="presParOf" srcId="{0ED4371F-C365-4F9C-8288-D1A5FCE88F2E}" destId="{E1D17602-9636-4444-8F4C-4B133495B27E}" srcOrd="2" destOrd="0" presId="urn:microsoft.com/office/officeart/2005/8/layout/arrow2#1"/>
+    <dgm:cxn modelId="{2CD86A65-F376-4CE0-B2C3-7318066DD70B}" type="presParOf" srcId="{0ED4371F-C365-4F9C-8288-D1A5FCE88F2E}" destId="{3331BA0B-0227-44E7-A0EE-96E9667A38C5}" srcOrd="3" destOrd="0" presId="urn:microsoft.com/office/officeart/2005/8/layout/arrow2#1"/>
+    <dgm:cxn modelId="{651E8606-D8CF-4809-93BD-92FFF0EF4BDB}" type="presParOf" srcId="{0ED4371F-C365-4F9C-8288-D1A5FCE88F2E}" destId="{52320FAD-E02B-4695-8C9D-F7B2E412DB02}" srcOrd="4" destOrd="0" presId="urn:microsoft.com/office/officeart/2005/8/layout/arrow2#1"/>
+    <dgm:cxn modelId="{40FFF57C-8B89-4911-8B5A-BBDB84E733D6}" type="presParOf" srcId="{0ED4371F-C365-4F9C-8288-D1A5FCE88F2E}" destId="{1B0A9E80-58E0-4F1B-9807-0D08965C64F9}" srcOrd="5" destOrd="0" presId="urn:microsoft.com/office/officeart/2005/8/layout/arrow2#1"/>
+    <dgm:cxn modelId="{02DA011A-CB07-4880-9804-B0A61689E69C}" type="presParOf" srcId="{0ED4371F-C365-4F9C-8288-D1A5FCE88F2E}" destId="{11C52DA7-38F9-42BA-86EC-E1190751B3A9}" srcOrd="6" destOrd="0" presId="urn:microsoft.com/office/officeart/2005/8/layout/arrow2#1"/>
+    <dgm:cxn modelId="{3F990F65-B26F-4D31-AB06-3EC62A249CCD}" type="presParOf" srcId="{0ED4371F-C365-4F9C-8288-D1A5FCE88F2E}" destId="{A6A60C68-6B48-400D-989E-41B3A837A146}" srcOrd="7" destOrd="0" presId="urn:microsoft.com/office/officeart/2005/8/layout/arrow2#1"/>
+    <dgm:cxn modelId="{565FE320-6D1B-47CF-9062-C82373CE69C9}" type="presParOf" srcId="{0ED4371F-C365-4F9C-8288-D1A5FCE88F2E}" destId="{709D4EEB-418B-4C8B-818F-B9749DC245C4}" srcOrd="8" destOrd="0" presId="urn:microsoft.com/office/officeart/2005/8/layout/arrow2#1"/>
+    <dgm:cxn modelId="{E1C9A4C8-F6A2-43E5-8DF7-3104CC5C0397}" type="presParOf" srcId="{0ED4371F-C365-4F9C-8288-D1A5FCE88F2E}" destId="{4BB30F82-E3F8-4F78-9892-353560ECF66A}" srcOrd="9" destOrd="0" presId="urn:microsoft.com/office/officeart/2005/8/layout/arrow2#1"/>
   </dgm:cxnLst>
   <dgm:bg/>
   <dgm:whole/>
   <dgm:extLst>
     <a:ext uri="http://schemas.microsoft.com/office/drawing/2008/diagram">
-      <dsp:dataModelExt xmlns:dsp="http://schemas.microsoft.com/office/drawing/2008/diagram" relId="rId5" minVer="http://schemas.openxmlformats.org/drawingml/2006/diagram"/>
+      <dsp:dataModelExt xmlns:dsp="http://schemas.microsoft.com/office/drawing/2008/diagram" relId="rId7" minVer="http://schemas.openxmlformats.org/drawingml/2006/diagram"/>
     </a:ext>
   </dgm:extLst>
 </dgm:dataModel>
 </file>
 
 <file path=ppt/diagrams/drawing1.xml><?xml version="1.0" encoding="utf-8"?>
-<dsp:drawing xmlns:dgm="http://schemas.openxmlformats.org/drawingml/2006/diagram" xmlns:dsp="http://schemas.microsoft.com/office/drawing/2008/diagram" xmlns:a="http://schemas.openxmlformats.org/drawingml/2006/main" xmlns:r="http://schemas.openxmlformats.org/officeDocument/2006/relationships">
+<dsp:drawing xmlns:dgm="http://schemas.openxmlformats.org/drawingml/2006/diagram" xmlns:dsp="http://schemas.microsoft.com/office/drawing/2008/diagram" xmlns:a="http://schemas.openxmlformats.org/drawingml/2006/main">
   <dsp:spTree>
     <dsp:nvGrpSpPr>
-      <dsp:cNvPr id="2" name="Group 1"/>
+      <dsp:cNvPr id="0" name=""/>
       <dsp:cNvGrpSpPr/>
     </dsp:nvGrpSpPr>
-    <dsp:grpSpPr>
-      <a:xfrm>
-        <a:off x="0" y="0"/>
-        <a:ext cx="8160512" cy="4328160"/>
-        <a:chOff x="0" y="0"/>
-        <a:chExt cx="8160512" cy="4328160"/>
-      </a:xfrm>
-    </dsp:grpSpPr>
+    <dsp:grpSpPr/>
     <dsp:sp modelId="{C89A32A6-75B1-4B69-B952-545EFE2CBD58}">
       <dsp:nvSpPr>
-        <dsp:cNvPr id="3" name="Rounded Rectangle 2"/>
+        <dsp:cNvPr id="0" name=""/>
         <dsp:cNvSpPr/>
       </dsp:nvSpPr>
-      <dsp:spPr bwMode="white">
+      <dsp:spPr>
         <a:xfrm>
-          <a:off x="0" y="151680"/>
+          <a:off x="0" y="151679"/>
           <a:ext cx="8160512" cy="1216800"/>
         </a:xfrm>
         <a:prstGeom prst="roundRect">
           <a:avLst/>
         </a:prstGeom>
+        <a:solidFill>
+          <a:schemeClr val="accent1">
+            <a:hueOff val="0"/>
+            <a:satOff val="0"/>
+            <a:lumOff val="0"/>
+            <a:alphaOff val="0"/>
+          </a:schemeClr>
+        </a:solidFill>
+        <a:ln w="19050" cap="rnd" cmpd="sng" algn="ctr">
+          <a:solidFill>
+            <a:schemeClr val="lt1">
+              <a:hueOff val="0"/>
+              <a:satOff val="0"/>
+              <a:lumOff val="0"/>
+              <a:alphaOff val="0"/>
+            </a:schemeClr>
+          </a:solidFill>
+          <a:prstDash val="solid"/>
+        </a:ln>
+        <a:effectLst/>
       </dsp:spPr>
       <dsp:style>
         <a:lnRef idx="2">
-          <a:schemeClr val="lt1"/>
+          <a:scrgbClr r="0" g="0" b="0"/>
         </a:lnRef>
         <a:fillRef idx="1">
-          <a:schemeClr val="accent1"/>
+          <a:scrgbClr r="0" g="0" b="0"/>
         </a:fillRef>
         <a:effectRef idx="0">
           <a:scrgbClr r="0" g="0" b="0"/>
@@ -2307,40 +2327,14 @@
         </a:fontRef>
       </dsp:style>
       <dsp:txBody>
-        <a:bodyPr lIns="152400" tIns="152400" rIns="152400" bIns="152400" anchor="ctr"/>
-        <a:lstStyle>
-          <a:lvl1pPr algn="l">
-            <a:defRPr sz="6500"/>
-          </a:lvl1pPr>
-          <a:lvl2pPr marL="285750" indent="-285750" algn="l">
-            <a:defRPr sz="5000"/>
-          </a:lvl2pPr>
-          <a:lvl3pPr marL="571500" indent="-285750" algn="l">
-            <a:defRPr sz="5000"/>
-          </a:lvl3pPr>
-          <a:lvl4pPr marL="857250" indent="-285750" algn="l">
-            <a:defRPr sz="5000"/>
-          </a:lvl4pPr>
-          <a:lvl5pPr marL="1143000" indent="-285750" algn="l">
-            <a:defRPr sz="5000"/>
-          </a:lvl5pPr>
-          <a:lvl6pPr marL="1428750" indent="-285750" algn="l">
-            <a:defRPr sz="5000"/>
-          </a:lvl6pPr>
-          <a:lvl7pPr marL="1714500" indent="-285750" algn="l">
-            <a:defRPr sz="5000"/>
-          </a:lvl7pPr>
-          <a:lvl8pPr marL="2000250" indent="-285750" algn="l">
-            <a:defRPr sz="5000"/>
-          </a:lvl8pPr>
-          <a:lvl9pPr marL="2286000" indent="-285750" algn="l">
-            <a:defRPr sz="5000"/>
-          </a:lvl9pPr>
-        </a:lstStyle>
+        <a:bodyPr spcFirstLastPara="0" vert="horz" wrap="square" lIns="152400" tIns="152400" rIns="152400" bIns="152400" numCol="1" spcCol="1270" anchor="ctr" anchorCtr="0">
+          <a:noAutofit/>
+        </a:bodyPr>
+        <a:lstStyle/>
         <a:p>
-          <a:pPr lvl="0">
+          <a:pPr lvl="0" algn="l" defTabSz="1778000">
             <a:lnSpc>
-              <a:spcPct val="100000"/>
+              <a:spcPct val="90000"/>
             </a:lnSpc>
             <a:spcBef>
               <a:spcPct val="0"/>
@@ -2350,14 +2344,14 @@
             </a:spcAft>
           </a:pPr>
           <a:r>
-            <a:rPr lang="en-US" altLang="zh-CN" sz="4000" dirty="0">
+            <a:rPr lang="en-US" altLang="zh-CN" sz="4000" kern="1200" dirty="0">
               <a:latin typeface="+mn-ea"/>
               <a:ea typeface="+mn-ea"/>
             </a:rPr>
             <a:t>Rust</a:t>
           </a:r>
           <a:r>
-            <a:rPr lang="zh-CN" altLang="en-US" sz="4000" dirty="0">
+            <a:rPr lang="zh-CN" altLang="en-US" sz="4000" kern="1200" dirty="0">
               <a:latin typeface="+mn-ea"/>
               <a:ea typeface="+mn-ea"/>
             </a:rPr>
@@ -2366,16 +2360,16 @@
         </a:p>
       </dsp:txBody>
       <dsp:txXfrm>
-        <a:off x="0" y="151680"/>
-        <a:ext cx="8160512" cy="1216800"/>
+        <a:off x="59399" y="211078"/>
+        <a:ext cx="8041714" cy="1098002"/>
       </dsp:txXfrm>
     </dsp:sp>
     <dsp:sp modelId="{17FA72BE-E120-4DB5-9241-680132CD847B}">
       <dsp:nvSpPr>
-        <dsp:cNvPr id="4" name="Rounded Rectangle 3"/>
+        <dsp:cNvPr id="0" name=""/>
         <dsp:cNvSpPr/>
       </dsp:nvSpPr>
-      <dsp:spPr bwMode="white">
+      <dsp:spPr>
         <a:xfrm>
           <a:off x="0" y="1555680"/>
           <a:ext cx="8160512" cy="1216800"/>
@@ -2383,13 +2377,33 @@
         <a:prstGeom prst="roundRect">
           <a:avLst/>
         </a:prstGeom>
+        <a:solidFill>
+          <a:schemeClr val="accent1">
+            <a:hueOff val="0"/>
+            <a:satOff val="0"/>
+            <a:lumOff val="0"/>
+            <a:alphaOff val="0"/>
+          </a:schemeClr>
+        </a:solidFill>
+        <a:ln w="19050" cap="rnd" cmpd="sng" algn="ctr">
+          <a:solidFill>
+            <a:schemeClr val="lt1">
+              <a:hueOff val="0"/>
+              <a:satOff val="0"/>
+              <a:lumOff val="0"/>
+              <a:alphaOff val="0"/>
+            </a:schemeClr>
+          </a:solidFill>
+          <a:prstDash val="solid"/>
+        </a:ln>
+        <a:effectLst/>
       </dsp:spPr>
       <dsp:style>
         <a:lnRef idx="2">
-          <a:schemeClr val="lt1"/>
+          <a:scrgbClr r="0" g="0" b="0"/>
         </a:lnRef>
         <a:fillRef idx="1">
-          <a:schemeClr val="accent1"/>
+          <a:scrgbClr r="0" g="0" b="0"/>
         </a:fillRef>
         <a:effectRef idx="0">
           <a:scrgbClr r="0" g="0" b="0"/>
@@ -2399,40 +2413,14 @@
         </a:fontRef>
       </dsp:style>
       <dsp:txBody>
-        <a:bodyPr lIns="152400" tIns="152400" rIns="152400" bIns="152400" anchor="ctr"/>
-        <a:lstStyle>
-          <a:lvl1pPr algn="l">
-            <a:defRPr sz="6500"/>
-          </a:lvl1pPr>
-          <a:lvl2pPr marL="285750" indent="-285750" algn="l">
-            <a:defRPr sz="5000"/>
-          </a:lvl2pPr>
-          <a:lvl3pPr marL="571500" indent="-285750" algn="l">
-            <a:defRPr sz="5000"/>
-          </a:lvl3pPr>
-          <a:lvl4pPr marL="857250" indent="-285750" algn="l">
-            <a:defRPr sz="5000"/>
-          </a:lvl4pPr>
-          <a:lvl5pPr marL="1143000" indent="-285750" algn="l">
-            <a:defRPr sz="5000"/>
-          </a:lvl5pPr>
-          <a:lvl6pPr marL="1428750" indent="-285750" algn="l">
-            <a:defRPr sz="5000"/>
-          </a:lvl6pPr>
-          <a:lvl7pPr marL="1714500" indent="-285750" algn="l">
-            <a:defRPr sz="5000"/>
-          </a:lvl7pPr>
-          <a:lvl8pPr marL="2000250" indent="-285750" algn="l">
-            <a:defRPr sz="5000"/>
-          </a:lvl8pPr>
-          <a:lvl9pPr marL="2286000" indent="-285750" algn="l">
-            <a:defRPr sz="5000"/>
-          </a:lvl9pPr>
-        </a:lstStyle>
+        <a:bodyPr spcFirstLastPara="0" vert="horz" wrap="square" lIns="152400" tIns="152400" rIns="152400" bIns="152400" numCol="1" spcCol="1270" anchor="ctr" anchorCtr="0">
+          <a:noAutofit/>
+        </a:bodyPr>
+        <a:lstStyle/>
         <a:p>
-          <a:pPr lvl="0">
+          <a:pPr lvl="0" algn="l" defTabSz="1778000">
             <a:lnSpc>
-              <a:spcPct val="100000"/>
+              <a:spcPct val="90000"/>
             </a:lnSpc>
             <a:spcBef>
               <a:spcPct val="0"/>
@@ -2442,14 +2430,14 @@
             </a:spcAft>
           </a:pPr>
           <a:r>
-            <a:rPr lang="en-US" altLang="zh-CN" sz="4000" dirty="0">
+            <a:rPr lang="en-US" altLang="zh-CN" sz="4000" kern="1200" dirty="0">
               <a:latin typeface="+mn-ea"/>
               <a:ea typeface="+mn-ea"/>
             </a:rPr>
             <a:t>Rust</a:t>
           </a:r>
           <a:r>
-            <a:rPr lang="zh-CN" altLang="en-US" sz="4000" dirty="0">
+            <a:rPr lang="zh-CN" altLang="en-US" sz="4000" kern="1200" dirty="0">
               <a:latin typeface="+mn-ea"/>
               <a:ea typeface="+mn-ea"/>
             </a:rPr>
@@ -2458,16 +2446,16 @@
         </a:p>
       </dsp:txBody>
       <dsp:txXfrm>
-        <a:off x="0" y="1555680"/>
-        <a:ext cx="8160512" cy="1216800"/>
+        <a:off x="59399" y="1615079"/>
+        <a:ext cx="8041714" cy="1098002"/>
       </dsp:txXfrm>
     </dsp:sp>
     <dsp:sp modelId="{B0DCA04B-0357-4F0A-853C-C3FA4952347E}">
       <dsp:nvSpPr>
-        <dsp:cNvPr id="5" name="Rounded Rectangle 4"/>
+        <dsp:cNvPr id="0" name=""/>
         <dsp:cNvSpPr/>
       </dsp:nvSpPr>
-      <dsp:spPr bwMode="white">
+      <dsp:spPr>
         <a:xfrm>
           <a:off x="0" y="2959680"/>
           <a:ext cx="8160512" cy="1216800"/>
@@ -2475,13 +2463,33 @@
         <a:prstGeom prst="roundRect">
           <a:avLst/>
         </a:prstGeom>
+        <a:solidFill>
+          <a:schemeClr val="accent1">
+            <a:hueOff val="0"/>
+            <a:satOff val="0"/>
+            <a:lumOff val="0"/>
+            <a:alphaOff val="0"/>
+          </a:schemeClr>
+        </a:solidFill>
+        <a:ln w="19050" cap="rnd" cmpd="sng" algn="ctr">
+          <a:solidFill>
+            <a:schemeClr val="lt1">
+              <a:hueOff val="0"/>
+              <a:satOff val="0"/>
+              <a:lumOff val="0"/>
+              <a:alphaOff val="0"/>
+            </a:schemeClr>
+          </a:solidFill>
+          <a:prstDash val="solid"/>
+        </a:ln>
+        <a:effectLst/>
       </dsp:spPr>
       <dsp:style>
         <a:lnRef idx="2">
-          <a:schemeClr val="lt1"/>
+          <a:scrgbClr r="0" g="0" b="0"/>
         </a:lnRef>
         <a:fillRef idx="1">
-          <a:schemeClr val="accent1"/>
+          <a:scrgbClr r="0" g="0" b="0"/>
         </a:fillRef>
         <a:effectRef idx="0">
           <a:scrgbClr r="0" g="0" b="0"/>
@@ -2491,40 +2499,14 @@
         </a:fontRef>
       </dsp:style>
       <dsp:txBody>
-        <a:bodyPr lIns="152400" tIns="152400" rIns="152400" bIns="152400" anchor="ctr"/>
-        <a:lstStyle>
-          <a:lvl1pPr algn="l">
-            <a:defRPr sz="6500"/>
-          </a:lvl1pPr>
-          <a:lvl2pPr marL="285750" indent="-285750" algn="l">
-            <a:defRPr sz="5000"/>
-          </a:lvl2pPr>
-          <a:lvl3pPr marL="571500" indent="-285750" algn="l">
-            <a:defRPr sz="5000"/>
-          </a:lvl3pPr>
-          <a:lvl4pPr marL="857250" indent="-285750" algn="l">
-            <a:defRPr sz="5000"/>
-          </a:lvl4pPr>
-          <a:lvl5pPr marL="1143000" indent="-285750" algn="l">
-            <a:defRPr sz="5000"/>
-          </a:lvl5pPr>
-          <a:lvl6pPr marL="1428750" indent="-285750" algn="l">
-            <a:defRPr sz="5000"/>
-          </a:lvl6pPr>
-          <a:lvl7pPr marL="1714500" indent="-285750" algn="l">
-            <a:defRPr sz="5000"/>
-          </a:lvl7pPr>
-          <a:lvl8pPr marL="2000250" indent="-285750" algn="l">
-            <a:defRPr sz="5000"/>
-          </a:lvl8pPr>
-          <a:lvl9pPr marL="2286000" indent="-285750" algn="l">
-            <a:defRPr sz="5000"/>
-          </a:lvl9pPr>
-        </a:lstStyle>
+        <a:bodyPr spcFirstLastPara="0" vert="horz" wrap="square" lIns="152400" tIns="152400" rIns="152400" bIns="152400" numCol="1" spcCol="1270" anchor="ctr" anchorCtr="0">
+          <a:noAutofit/>
+        </a:bodyPr>
+        <a:lstStyle/>
         <a:p>
-          <a:pPr lvl="0">
+          <a:pPr lvl="0" algn="l" defTabSz="1778000">
             <a:lnSpc>
-              <a:spcPct val="100000"/>
+              <a:spcPct val="90000"/>
             </a:lnSpc>
             <a:spcBef>
               <a:spcPct val="0"/>
@@ -2534,14 +2516,14 @@
             </a:spcAft>
           </a:pPr>
           <a:r>
-            <a:rPr lang="en-US" altLang="zh-CN" sz="4000" dirty="0">
+            <a:rPr lang="en-US" altLang="zh-CN" sz="4000" kern="1200" dirty="0">
               <a:latin typeface="+mn-ea"/>
               <a:ea typeface="+mn-ea"/>
             </a:rPr>
             <a:t>Rust</a:t>
           </a:r>
           <a:r>
-            <a:rPr lang="zh-CN" altLang="en-US" sz="4000" dirty="0">
+            <a:rPr lang="zh-CN" altLang="en-US" sz="4000" kern="1200" dirty="0">
               <a:latin typeface="+mn-ea"/>
               <a:ea typeface="+mn-ea"/>
             </a:rPr>
@@ -2550,8 +2532,8 @@
         </a:p>
       </dsp:txBody>
       <dsp:txXfrm>
-        <a:off x="0" y="2959680"/>
-        <a:ext cx="8160512" cy="1216800"/>
+        <a:off x="59399" y="3019079"/>
+        <a:ext cx="8041714" cy="1098002"/>
       </dsp:txXfrm>
     </dsp:sp>
   </dsp:spTree>
@@ -2559,28 +2541,21 @@
 </file>
 
 <file path=ppt/diagrams/drawing2.xml><?xml version="1.0" encoding="utf-8"?>
-<dsp:drawing xmlns:dgm="http://schemas.openxmlformats.org/drawingml/2006/diagram" xmlns:dsp="http://schemas.microsoft.com/office/drawing/2008/diagram" xmlns:a="http://schemas.openxmlformats.org/drawingml/2006/main" xmlns:r="http://schemas.openxmlformats.org/officeDocument/2006/relationships">
+<dsp:drawing xmlns:dgm="http://schemas.openxmlformats.org/drawingml/2006/diagram" xmlns:dsp="http://schemas.microsoft.com/office/drawing/2008/diagram" xmlns:a="http://schemas.openxmlformats.org/drawingml/2006/main">
   <dsp:spTree>
     <dsp:nvGrpSpPr>
-      <dsp:cNvPr id="2" name="Group 1"/>
+      <dsp:cNvPr id="0" name=""/>
       <dsp:cNvGrpSpPr/>
     </dsp:nvGrpSpPr>
-    <dsp:grpSpPr>
-      <a:xfrm>
-        <a:off x="0" y="0"/>
-        <a:ext cx="6537275" cy="4085797"/>
-        <a:chOff x="0" y="0"/>
-        <a:chExt cx="6537275" cy="4085797"/>
-      </a:xfrm>
-    </dsp:grpSpPr>
+    <dsp:grpSpPr/>
     <dsp:sp modelId="{B52F97A3-79D9-45C4-B3F2-1FABD14756C8}">
       <dsp:nvSpPr>
-        <dsp:cNvPr id="3" name="Shape 2"/>
+        <dsp:cNvPr id="0" name=""/>
         <dsp:cNvSpPr/>
       </dsp:nvSpPr>
-      <dsp:spPr bwMode="white">
+      <dsp:spPr>
         <a:xfrm>
-          <a:off x="408958" y="0"/>
+          <a:off x="408957" y="0"/>
           <a:ext cx="6537275" cy="4085797"/>
         </a:xfrm>
         <a:prstGeom prst="swooshArrow">
@@ -2589,46 +2564,73 @@
             <a:gd name="adj2" fmla="val 25000"/>
           </a:avLst>
         </a:prstGeom>
+        <a:solidFill>
+          <a:schemeClr val="accent1">
+            <a:tint val="40000"/>
+            <a:hueOff val="0"/>
+            <a:satOff val="0"/>
+            <a:lumOff val="0"/>
+            <a:alphaOff val="0"/>
+          </a:schemeClr>
+        </a:solidFill>
+        <a:ln>
+          <a:noFill/>
+        </a:ln>
+        <a:effectLst/>
       </dsp:spPr>
       <dsp:style>
         <a:lnRef idx="0">
-          <a:schemeClr val="accent1"/>
+          <a:scrgbClr r="0" g="0" b="0"/>
         </a:lnRef>
         <a:fillRef idx="1">
-          <a:schemeClr val="accent1">
-            <a:tint val="40000"/>
-          </a:schemeClr>
+          <a:scrgbClr r="0" g="0" b="0"/>
         </a:fillRef>
         <a:effectRef idx="0">
           <a:scrgbClr r="0" g="0" b="0"/>
         </a:effectRef>
         <a:fontRef idx="minor"/>
       </dsp:style>
-      <dsp:txXfrm>
-        <a:off x="408958" y="0"/>
-        <a:ext cx="6537275" cy="4085797"/>
-      </dsp:txXfrm>
     </dsp:sp>
     <dsp:sp modelId="{E01A1116-EEF5-40F3-A1AB-5B2152D30435}">
       <dsp:nvSpPr>
-        <dsp:cNvPr id="4" name="Oval 3"/>
+        <dsp:cNvPr id="0" name=""/>
         <dsp:cNvSpPr/>
       </dsp:nvSpPr>
-      <dsp:spPr bwMode="white">
+      <dsp:spPr>
         <a:xfrm>
-          <a:off x="1052880" y="3038199"/>
+          <a:off x="1052879" y="3038198"/>
           <a:ext cx="150357" cy="150357"/>
         </a:xfrm>
         <a:prstGeom prst="ellipse">
           <a:avLst/>
         </a:prstGeom>
+        <a:solidFill>
+          <a:schemeClr val="accent1">
+            <a:hueOff val="0"/>
+            <a:satOff val="0"/>
+            <a:lumOff val="0"/>
+            <a:alphaOff val="0"/>
+          </a:schemeClr>
+        </a:solidFill>
+        <a:ln w="19050" cap="rnd" cmpd="sng" algn="ctr">
+          <a:solidFill>
+            <a:schemeClr val="lt1">
+              <a:hueOff val="0"/>
+              <a:satOff val="0"/>
+              <a:lumOff val="0"/>
+              <a:alphaOff val="0"/>
+            </a:schemeClr>
+          </a:solidFill>
+          <a:prstDash val="solid"/>
+        </a:ln>
+        <a:effectLst/>
       </dsp:spPr>
       <dsp:style>
         <a:lnRef idx="2">
-          <a:schemeClr val="lt1"/>
+          <a:scrgbClr r="0" g="0" b="0"/>
         </a:lnRef>
         <a:fillRef idx="1">
-          <a:schemeClr val="accent1"/>
+          <a:scrgbClr r="0" g="0" b="0"/>
         </a:fillRef>
         <a:effectRef idx="0">
           <a:scrgbClr r="0" g="0" b="0"/>
@@ -2637,35 +2639,32 @@
           <a:schemeClr val="lt1"/>
         </a:fontRef>
       </dsp:style>
-      <dsp:txXfrm>
-        <a:off x="1052880" y="3038199"/>
-        <a:ext cx="150357" cy="150357"/>
-      </dsp:txXfrm>
     </dsp:sp>
     <dsp:sp modelId="{50D9E917-3DAC-4A3F-A991-42B18DBC85AC}">
       <dsp:nvSpPr>
-        <dsp:cNvPr id="5" name="Rectangles 4"/>
+        <dsp:cNvPr id="0" name=""/>
         <dsp:cNvSpPr/>
       </dsp:nvSpPr>
-      <dsp:spPr bwMode="white">
+      <dsp:spPr>
         <a:xfrm>
           <a:off x="1128058" y="3113377"/>
-          <a:ext cx="856383" cy="972420"/>
+          <a:ext cx="856383" cy="972419"/>
         </a:xfrm>
         <a:prstGeom prst="rect">
           <a:avLst/>
         </a:prstGeom>
+        <a:noFill/>
+        <a:ln>
+          <a:noFill/>
+        </a:ln>
+        <a:effectLst/>
       </dsp:spPr>
       <dsp:style>
         <a:lnRef idx="0">
-          <a:schemeClr val="dk1">
-            <a:alpha val="0"/>
-          </a:schemeClr>
+          <a:scrgbClr r="0" g="0" b="0"/>
         </a:lnRef>
         <a:fillRef idx="0">
-          <a:schemeClr val="lt1">
-            <a:alpha val="0"/>
-          </a:schemeClr>
+          <a:scrgbClr r="0" g="0" b="0"/>
         </a:fillRef>
         <a:effectRef idx="0">
           <a:scrgbClr r="0" g="0" b="0"/>
@@ -2673,40 +2672,14 @@
         <a:fontRef idx="minor"/>
       </dsp:style>
       <dsp:txBody>
-        <a:bodyPr lIns="79671" tIns="0" rIns="0" bIns="0" anchor="t"/>
-        <a:lstStyle>
-          <a:lvl1pPr algn="l">
-            <a:defRPr sz="1500"/>
-          </a:lvl1pPr>
-          <a:lvl2pPr marL="57150" indent="-57150" algn="l">
-            <a:defRPr sz="1100"/>
-          </a:lvl2pPr>
-          <a:lvl3pPr marL="114300" indent="-57150" algn="l">
-            <a:defRPr sz="1100"/>
-          </a:lvl3pPr>
-          <a:lvl4pPr marL="171450" indent="-57150" algn="l">
-            <a:defRPr sz="1100"/>
-          </a:lvl4pPr>
-          <a:lvl5pPr marL="228600" indent="-57150" algn="l">
-            <a:defRPr sz="1100"/>
-          </a:lvl5pPr>
-          <a:lvl6pPr marL="285750" indent="-57150" algn="l">
-            <a:defRPr sz="1100"/>
-          </a:lvl6pPr>
-          <a:lvl7pPr marL="342900" indent="-57150" algn="l">
-            <a:defRPr sz="1100"/>
-          </a:lvl7pPr>
-          <a:lvl8pPr marL="400050" indent="-57150" algn="l">
-            <a:defRPr sz="1100"/>
-          </a:lvl8pPr>
-          <a:lvl9pPr marL="457200" indent="-57150" algn="l">
-            <a:defRPr sz="1100"/>
-          </a:lvl9pPr>
-        </a:lstStyle>
+        <a:bodyPr spcFirstLastPara="0" vert="horz" wrap="square" lIns="79671" tIns="0" rIns="0" bIns="0" numCol="1" spcCol="1270" anchor="t" anchorCtr="0">
+          <a:noAutofit/>
+        </a:bodyPr>
+        <a:lstStyle/>
         <a:p>
-          <a:pPr lvl="0">
+          <a:pPr lvl="0" algn="l" defTabSz="711200">
             <a:lnSpc>
-              <a:spcPct val="100000"/>
+              <a:spcPct val="90000"/>
             </a:lnSpc>
             <a:spcBef>
               <a:spcPct val="0"/>
@@ -2716,87 +2689,87 @@
             </a:spcAft>
           </a:pPr>
           <a:r>
-            <a:rPr lang="en-US" altLang="zh-CN" dirty="0">
-              <a:solidFill>
-                <a:schemeClr val="tx1"/>
-              </a:solidFill>
+            <a:rPr lang="en-US" altLang="zh-CN" sz="1600" kern="1200" dirty="0">
               <a:latin typeface="+mn-ea"/>
               <a:ea typeface="+mn-ea"/>
             </a:rPr>
             <a:t>2006</a:t>
           </a:r>
           <a:r>
-            <a:rPr lang="zh-CN" altLang="en-US" dirty="0">
-              <a:solidFill>
-                <a:schemeClr val="tx1"/>
-              </a:solidFill>
+            <a:rPr lang="zh-CN" altLang="en-US" sz="1600" kern="1200" dirty="0">
               <a:latin typeface="+mn-ea"/>
               <a:ea typeface="+mn-ea"/>
             </a:rPr>
             <a:t>年</a:t>
           </a:r>
           <a:r>
-            <a:rPr lang="en-US" altLang="zh-CN" dirty="0" err="1">
-              <a:solidFill>
-                <a:schemeClr val="tx1"/>
-              </a:solidFill>
+            <a:rPr lang="en-US" altLang="zh-CN" sz="1600" kern="1200" dirty="0" err="1">
               <a:latin typeface="Times New Roman" panose="02020603050405020304" pitchFamily="18" charset="0"/>
               <a:cs typeface="Times New Roman" panose="02020603050405020304" pitchFamily="18" charset="0"/>
             </a:rPr>
             <a:t>Graydon</a:t>
           </a:r>
           <a:r>
-            <a:rPr lang="en-US" altLang="zh-CN" dirty="0">
-              <a:solidFill>
-                <a:schemeClr val="tx1"/>
-              </a:solidFill>
+            <a:rPr lang="en-US" altLang="zh-CN" sz="1600" kern="1200" dirty="0">
               <a:latin typeface="Times New Roman" panose="02020603050405020304" pitchFamily="18" charset="0"/>
               <a:cs typeface="Times New Roman" panose="02020603050405020304" pitchFamily="18" charset="0"/>
             </a:rPr>
             <a:t> Hoare</a:t>
           </a:r>
           <a:r>
-            <a:rPr lang="zh-CN" altLang="en-US" dirty="0">
-              <a:solidFill>
-                <a:schemeClr val="tx1"/>
-              </a:solidFill>
+            <a:rPr lang="zh-CN" altLang="en-US" sz="1600" kern="1200" dirty="0">
               <a:latin typeface="+mn-ea"/>
               <a:ea typeface="+mn-ea"/>
             </a:rPr>
             <a:t>开发</a:t>
           </a:r>
-          <a:endParaRPr>
-            <a:solidFill>
-              <a:schemeClr val="tx1"/>
-            </a:solidFill>
-          </a:endParaRPr>
         </a:p>
       </dsp:txBody>
       <dsp:txXfrm>
         <a:off x="1128058" y="3113377"/>
-        <a:ext cx="856383" cy="972420"/>
+        <a:ext cx="856383" cy="972419"/>
       </dsp:txXfrm>
     </dsp:sp>
     <dsp:sp modelId="{E1D17602-9636-4444-8F4C-4B133495B27E}">
       <dsp:nvSpPr>
-        <dsp:cNvPr id="6" name="Oval 5"/>
+        <dsp:cNvPr id="0" name=""/>
         <dsp:cNvSpPr/>
       </dsp:nvSpPr>
-      <dsp:spPr bwMode="white">
+      <dsp:spPr>
         <a:xfrm>
           <a:off x="1866770" y="2256177"/>
-          <a:ext cx="235342" cy="235342"/>
+          <a:ext cx="235341" cy="235341"/>
         </a:xfrm>
         <a:prstGeom prst="ellipse">
           <a:avLst/>
         </a:prstGeom>
+        <a:solidFill>
+          <a:schemeClr val="accent1">
+            <a:hueOff val="0"/>
+            <a:satOff val="0"/>
+            <a:lumOff val="0"/>
+            <a:alphaOff val="0"/>
+          </a:schemeClr>
+        </a:solidFill>
+        <a:ln w="19050" cap="rnd" cmpd="sng" algn="ctr">
+          <a:solidFill>
+            <a:schemeClr val="lt1">
+              <a:hueOff val="0"/>
+              <a:satOff val="0"/>
+              <a:lumOff val="0"/>
+              <a:alphaOff val="0"/>
+            </a:schemeClr>
+          </a:solidFill>
+          <a:prstDash val="solid"/>
+        </a:ln>
+        <a:effectLst/>
       </dsp:spPr>
       <dsp:style>
         <a:lnRef idx="2">
-          <a:schemeClr val="lt1"/>
+          <a:scrgbClr r="0" g="0" b="0"/>
         </a:lnRef>
         <a:fillRef idx="1">
-          <a:schemeClr val="accent1"/>
+          <a:scrgbClr r="0" g="0" b="0"/>
         </a:fillRef>
         <a:effectRef idx="0">
           <a:scrgbClr r="0" g="0" b="0"/>
@@ -2805,35 +2778,32 @@
           <a:schemeClr val="lt1"/>
         </a:fontRef>
       </dsp:style>
-      <dsp:txXfrm>
-        <a:off x="1866770" y="2256177"/>
-        <a:ext cx="235342" cy="235342"/>
-      </dsp:txXfrm>
     </dsp:sp>
     <dsp:sp modelId="{3331BA0B-0227-44E7-A0EE-96E9667A38C5}">
       <dsp:nvSpPr>
-        <dsp:cNvPr id="7" name="Rectangles 6"/>
+        <dsp:cNvPr id="0" name=""/>
         <dsp:cNvSpPr/>
       </dsp:nvSpPr>
-      <dsp:spPr bwMode="white">
+      <dsp:spPr>
         <a:xfrm>
           <a:off x="1984441" y="2373848"/>
-          <a:ext cx="1085188" cy="1711949"/>
+          <a:ext cx="1085187" cy="1711948"/>
         </a:xfrm>
         <a:prstGeom prst="rect">
           <a:avLst/>
         </a:prstGeom>
+        <a:noFill/>
+        <a:ln>
+          <a:noFill/>
+        </a:ln>
+        <a:effectLst/>
       </dsp:spPr>
       <dsp:style>
         <a:lnRef idx="0">
-          <a:schemeClr val="dk1">
-            <a:alpha val="0"/>
-          </a:schemeClr>
+          <a:scrgbClr r="0" g="0" b="0"/>
         </a:lnRef>
         <a:fillRef idx="0">
-          <a:schemeClr val="lt1">
-            <a:alpha val="0"/>
-          </a:schemeClr>
+          <a:scrgbClr r="0" g="0" b="0"/>
         </a:fillRef>
         <a:effectRef idx="0">
           <a:scrgbClr r="0" g="0" b="0"/>
@@ -2841,40 +2811,14 @@
         <a:fontRef idx="minor"/>
       </dsp:style>
       <dsp:txBody>
-        <a:bodyPr lIns="124702" tIns="0" rIns="0" bIns="0" anchor="t"/>
-        <a:lstStyle>
-          <a:lvl1pPr algn="l">
-            <a:defRPr sz="1500"/>
-          </a:lvl1pPr>
-          <a:lvl2pPr marL="57150" indent="-57150" algn="l">
-            <a:defRPr sz="1100"/>
-          </a:lvl2pPr>
-          <a:lvl3pPr marL="114300" indent="-57150" algn="l">
-            <a:defRPr sz="1100"/>
-          </a:lvl3pPr>
-          <a:lvl4pPr marL="171450" indent="-57150" algn="l">
-            <a:defRPr sz="1100"/>
-          </a:lvl4pPr>
-          <a:lvl5pPr marL="228600" indent="-57150" algn="l">
-            <a:defRPr sz="1100"/>
-          </a:lvl5pPr>
-          <a:lvl6pPr marL="285750" indent="-57150" algn="l">
-            <a:defRPr sz="1100"/>
-          </a:lvl6pPr>
-          <a:lvl7pPr marL="342900" indent="-57150" algn="l">
-            <a:defRPr sz="1100"/>
-          </a:lvl7pPr>
-          <a:lvl8pPr marL="400050" indent="-57150" algn="l">
-            <a:defRPr sz="1100"/>
-          </a:lvl8pPr>
-          <a:lvl9pPr marL="457200" indent="-57150" algn="l">
-            <a:defRPr sz="1100"/>
-          </a:lvl9pPr>
-        </a:lstStyle>
+        <a:bodyPr spcFirstLastPara="0" vert="horz" wrap="square" lIns="124703" tIns="0" rIns="0" bIns="0" numCol="1" spcCol="1270" anchor="t" anchorCtr="0">
+          <a:noAutofit/>
+        </a:bodyPr>
+        <a:lstStyle/>
         <a:p>
-          <a:pPr lvl="0">
+          <a:pPr lvl="0" algn="l" defTabSz="711200">
             <a:lnSpc>
-              <a:spcPct val="100000"/>
+              <a:spcPct val="90000"/>
             </a:lnSpc>
             <a:spcBef>
               <a:spcPct val="0"/>
@@ -2884,30 +2828,21 @@
             </a:spcAft>
           </a:pPr>
           <a:r>
-            <a:rPr lang="en-US" altLang="zh-CN" dirty="0">
-              <a:solidFill>
-                <a:schemeClr val="tx1"/>
-              </a:solidFill>
+            <a:rPr lang="en-US" altLang="zh-CN" sz="1600" kern="1200" dirty="0">
               <a:latin typeface="+mn-ea"/>
               <a:ea typeface="+mn-ea"/>
             </a:rPr>
             <a:t>2009</a:t>
           </a:r>
           <a:r>
-            <a:rPr lang="zh-CN" altLang="en-US" dirty="0">
-              <a:solidFill>
-                <a:schemeClr val="tx1"/>
-              </a:solidFill>
+            <a:rPr lang="zh-CN" altLang="en-US" sz="1600" kern="1200" dirty="0">
               <a:latin typeface="+mn-ea"/>
               <a:ea typeface="+mn-ea"/>
             </a:rPr>
             <a:t>年受到</a:t>
           </a:r>
           <a:r>
-            <a:rPr lang="en-US" altLang="zh-CN" dirty="0">
-              <a:solidFill>
-                <a:schemeClr val="tx1"/>
-              </a:solidFill>
+            <a:rPr lang="en-US" altLang="zh-CN" sz="1600" kern="1200" dirty="0">
               <a:latin typeface="Times New Roman" panose="02020603050405020304" pitchFamily="18" charset="0"/>
               <a:ea typeface="+mn-ea"/>
               <a:cs typeface="Times New Roman" panose="02020603050405020304" pitchFamily="18" charset="0"/>
@@ -2915,33 +2850,25 @@
             <a:t>Mozilla</a:t>
           </a:r>
           <a:r>
-            <a:rPr lang="zh-CN" altLang="en-US" dirty="0">
-              <a:solidFill>
-                <a:schemeClr val="tx1"/>
-              </a:solidFill>
+            <a:rPr lang="zh-CN" altLang="en-US" sz="1600" kern="1200" dirty="0">
               <a:latin typeface="+mn-ea"/>
               <a:ea typeface="+mn-ea"/>
             </a:rPr>
             <a:t>公司赞助</a:t>
           </a:r>
-          <a:endParaRPr>
-            <a:solidFill>
-              <a:schemeClr val="tx1"/>
-            </a:solidFill>
-          </a:endParaRPr>
         </a:p>
       </dsp:txBody>
       <dsp:txXfrm>
         <a:off x="1984441" y="2373848"/>
-        <a:ext cx="1085188" cy="1711949"/>
+        <a:ext cx="1085187" cy="1711948"/>
       </dsp:txXfrm>
     </dsp:sp>
     <dsp:sp modelId="{52320FAD-E02B-4695-8C9D-F7B2E412DB02}">
       <dsp:nvSpPr>
-        <dsp:cNvPr id="8" name="Oval 7"/>
+        <dsp:cNvPr id="0" name=""/>
         <dsp:cNvSpPr/>
       </dsp:nvSpPr>
-      <dsp:spPr bwMode="white">
+      <dsp:spPr>
         <a:xfrm>
           <a:off x="2912734" y="1632684"/>
           <a:ext cx="313789" cy="313789"/>
@@ -2949,13 +2876,33 @@
         <a:prstGeom prst="ellipse">
           <a:avLst/>
         </a:prstGeom>
+        <a:solidFill>
+          <a:schemeClr val="accent1">
+            <a:hueOff val="0"/>
+            <a:satOff val="0"/>
+            <a:lumOff val="0"/>
+            <a:alphaOff val="0"/>
+          </a:schemeClr>
+        </a:solidFill>
+        <a:ln w="19050" cap="rnd" cmpd="sng" algn="ctr">
+          <a:solidFill>
+            <a:schemeClr val="lt1">
+              <a:hueOff val="0"/>
+              <a:satOff val="0"/>
+              <a:lumOff val="0"/>
+              <a:alphaOff val="0"/>
+            </a:schemeClr>
+          </a:solidFill>
+          <a:prstDash val="solid"/>
+        </a:ln>
+        <a:effectLst/>
       </dsp:spPr>
       <dsp:style>
         <a:lnRef idx="2">
-          <a:schemeClr val="lt1"/>
+          <a:scrgbClr r="0" g="0" b="0"/>
         </a:lnRef>
         <a:fillRef idx="1">
-          <a:schemeClr val="accent1"/>
+          <a:scrgbClr r="0" g="0" b="0"/>
         </a:fillRef>
         <a:effectRef idx="0">
           <a:scrgbClr r="0" g="0" b="0"/>
@@ -2964,35 +2911,32 @@
           <a:schemeClr val="lt1"/>
         </a:fontRef>
       </dsp:style>
-      <dsp:txXfrm>
-        <a:off x="2912734" y="1632684"/>
-        <a:ext cx="313789" cy="313789"/>
-      </dsp:txXfrm>
     </dsp:sp>
     <dsp:sp modelId="{1B0A9E80-58E0-4F1B-9807-0D08965C64F9}">
       <dsp:nvSpPr>
-        <dsp:cNvPr id="9" name="Rectangles 8"/>
+        <dsp:cNvPr id="0" name=""/>
         <dsp:cNvSpPr/>
       </dsp:nvSpPr>
-      <dsp:spPr bwMode="white">
+      <dsp:spPr>
         <a:xfrm>
-          <a:off x="3069629" y="1789579"/>
-          <a:ext cx="1261694" cy="2296218"/>
+          <a:off x="3069628" y="1789579"/>
+          <a:ext cx="1261694" cy="2296217"/>
         </a:xfrm>
         <a:prstGeom prst="rect">
           <a:avLst/>
         </a:prstGeom>
+        <a:noFill/>
+        <a:ln>
+          <a:noFill/>
+        </a:ln>
+        <a:effectLst/>
       </dsp:spPr>
       <dsp:style>
         <a:lnRef idx="0">
-          <a:schemeClr val="dk1">
-            <a:alpha val="0"/>
-          </a:schemeClr>
+          <a:scrgbClr r="0" g="0" b="0"/>
         </a:lnRef>
         <a:fillRef idx="0">
-          <a:schemeClr val="lt1">
-            <a:alpha val="0"/>
-          </a:schemeClr>
+          <a:scrgbClr r="0" g="0" b="0"/>
         </a:fillRef>
         <a:effectRef idx="0">
           <a:scrgbClr r="0" g="0" b="0"/>
@@ -3000,40 +2944,14 @@
         <a:fontRef idx="minor"/>
       </dsp:style>
       <dsp:txBody>
-        <a:bodyPr lIns="166270" tIns="0" rIns="0" bIns="0" anchor="t"/>
-        <a:lstStyle>
-          <a:lvl1pPr algn="l">
-            <a:defRPr sz="1500"/>
-          </a:lvl1pPr>
-          <a:lvl2pPr marL="57150" indent="-57150" algn="l">
-            <a:defRPr sz="1100"/>
-          </a:lvl2pPr>
-          <a:lvl3pPr marL="114300" indent="-57150" algn="l">
-            <a:defRPr sz="1100"/>
-          </a:lvl3pPr>
-          <a:lvl4pPr marL="171450" indent="-57150" algn="l">
-            <a:defRPr sz="1100"/>
-          </a:lvl4pPr>
-          <a:lvl5pPr marL="228600" indent="-57150" algn="l">
-            <a:defRPr sz="1100"/>
-          </a:lvl5pPr>
-          <a:lvl6pPr marL="285750" indent="-57150" algn="l">
-            <a:defRPr sz="1100"/>
-          </a:lvl6pPr>
-          <a:lvl7pPr marL="342900" indent="-57150" algn="l">
-            <a:defRPr sz="1100"/>
-          </a:lvl7pPr>
-          <a:lvl8pPr marL="400050" indent="-57150" algn="l">
-            <a:defRPr sz="1100"/>
-          </a:lvl8pPr>
-          <a:lvl9pPr marL="457200" indent="-57150" algn="l">
-            <a:defRPr sz="1100"/>
-          </a:lvl9pPr>
-        </a:lstStyle>
+        <a:bodyPr spcFirstLastPara="0" vert="horz" wrap="square" lIns="166270" tIns="0" rIns="0" bIns="0" numCol="1" spcCol="1270" anchor="t" anchorCtr="0">
+          <a:noAutofit/>
+        </a:bodyPr>
+        <a:lstStyle/>
         <a:p>
-          <a:pPr lvl="0">
+          <a:pPr lvl="0" algn="l" defTabSz="711200">
             <a:lnSpc>
-              <a:spcPct val="100000"/>
+              <a:spcPct val="90000"/>
             </a:lnSpc>
             <a:spcBef>
               <a:spcPct val="0"/>
@@ -3043,43 +2961,32 @@
             </a:spcAft>
           </a:pPr>
           <a:r>
-            <a:rPr lang="en-US" altLang="zh-CN" dirty="0">
-              <a:solidFill>
-                <a:schemeClr val="tx1"/>
-              </a:solidFill>
+            <a:rPr lang="en-US" altLang="zh-CN" sz="1600" kern="1200" dirty="0">
               <a:latin typeface="+mn-ea"/>
               <a:ea typeface="+mn-ea"/>
             </a:rPr>
             <a:t>2011</a:t>
           </a:r>
           <a:r>
-            <a:rPr lang="zh-CN" altLang="en-US" dirty="0">
-              <a:solidFill>
-                <a:schemeClr val="tx1"/>
-              </a:solidFill>
+            <a:rPr lang="zh-CN" altLang="en-US" sz="1600" kern="1200" dirty="0">
               <a:latin typeface="+mn-ea"/>
               <a:ea typeface="+mn-ea"/>
             </a:rPr>
             <a:t>年完成自举</a:t>
           </a:r>
-          <a:endParaRPr>
-            <a:solidFill>
-              <a:schemeClr val="tx1"/>
-            </a:solidFill>
-          </a:endParaRPr>
         </a:p>
       </dsp:txBody>
       <dsp:txXfrm>
-        <a:off x="3069629" y="1789579"/>
-        <a:ext cx="1261694" cy="2296218"/>
+        <a:off x="3069628" y="1789579"/>
+        <a:ext cx="1261694" cy="2296217"/>
       </dsp:txXfrm>
     </dsp:sp>
     <dsp:sp modelId="{11C52DA7-38F9-42BA-86EC-E1190751B3A9}">
       <dsp:nvSpPr>
-        <dsp:cNvPr id="10" name="Oval 9"/>
+        <dsp:cNvPr id="0" name=""/>
         <dsp:cNvSpPr/>
       </dsp:nvSpPr>
-      <dsp:spPr bwMode="white">
+      <dsp:spPr>
         <a:xfrm>
           <a:off x="4128667" y="1145657"/>
           <a:ext cx="405311" cy="405311"/>
@@ -3087,13 +2994,33 @@
         <a:prstGeom prst="ellipse">
           <a:avLst/>
         </a:prstGeom>
+        <a:solidFill>
+          <a:schemeClr val="accent1">
+            <a:hueOff val="0"/>
+            <a:satOff val="0"/>
+            <a:lumOff val="0"/>
+            <a:alphaOff val="0"/>
+          </a:schemeClr>
+        </a:solidFill>
+        <a:ln w="19050" cap="rnd" cmpd="sng" algn="ctr">
+          <a:solidFill>
+            <a:schemeClr val="lt1">
+              <a:hueOff val="0"/>
+              <a:satOff val="0"/>
+              <a:lumOff val="0"/>
+              <a:alphaOff val="0"/>
+            </a:schemeClr>
+          </a:solidFill>
+          <a:prstDash val="solid"/>
+        </a:ln>
+        <a:effectLst/>
       </dsp:spPr>
       <dsp:style>
         <a:lnRef idx="2">
-          <a:schemeClr val="lt1"/>
+          <a:scrgbClr r="0" g="0" b="0"/>
         </a:lnRef>
         <a:fillRef idx="1">
-          <a:schemeClr val="accent1"/>
+          <a:scrgbClr r="0" g="0" b="0"/>
         </a:fillRef>
         <a:effectRef idx="0">
           <a:scrgbClr r="0" g="0" b="0"/>
@@ -3102,35 +3029,32 @@
           <a:schemeClr val="lt1"/>
         </a:fontRef>
       </dsp:style>
-      <dsp:txXfrm>
-        <a:off x="4128667" y="1145657"/>
-        <a:ext cx="405311" cy="405311"/>
-      </dsp:txXfrm>
     </dsp:sp>
     <dsp:sp modelId="{A6A60C68-6B48-400D-989E-41B3A837A146}">
       <dsp:nvSpPr>
-        <dsp:cNvPr id="11" name="Rectangles 10"/>
+        <dsp:cNvPr id="0" name=""/>
         <dsp:cNvSpPr/>
       </dsp:nvSpPr>
-      <dsp:spPr bwMode="white">
+      <dsp:spPr>
         <a:xfrm>
           <a:off x="4331323" y="1348313"/>
-          <a:ext cx="1307455" cy="2737484"/>
+          <a:ext cx="1307455" cy="2737483"/>
         </a:xfrm>
         <a:prstGeom prst="rect">
           <a:avLst/>
         </a:prstGeom>
+        <a:noFill/>
+        <a:ln>
+          <a:noFill/>
+        </a:ln>
+        <a:effectLst/>
       </dsp:spPr>
       <dsp:style>
         <a:lnRef idx="0">
-          <a:schemeClr val="dk1">
-            <a:alpha val="0"/>
-          </a:schemeClr>
+          <a:scrgbClr r="0" g="0" b="0"/>
         </a:lnRef>
         <a:fillRef idx="0">
-          <a:schemeClr val="lt1">
-            <a:alpha val="0"/>
-          </a:schemeClr>
+          <a:scrgbClr r="0" g="0" b="0"/>
         </a:fillRef>
         <a:effectRef idx="0">
           <a:scrgbClr r="0" g="0" b="0"/>
@@ -3138,40 +3062,14 @@
         <a:fontRef idx="minor"/>
       </dsp:style>
       <dsp:txBody>
-        <a:bodyPr lIns="214765" tIns="0" rIns="0" bIns="0" anchor="t"/>
-        <a:lstStyle>
-          <a:lvl1pPr algn="l">
-            <a:defRPr sz="1500"/>
-          </a:lvl1pPr>
-          <a:lvl2pPr marL="114300" indent="-114300" algn="l">
-            <a:defRPr sz="1200"/>
-          </a:lvl2pPr>
-          <a:lvl3pPr marL="228600" indent="-114300" algn="l">
-            <a:defRPr sz="1200"/>
-          </a:lvl3pPr>
-          <a:lvl4pPr marL="342900" indent="-114300" algn="l">
-            <a:defRPr sz="1200"/>
-          </a:lvl4pPr>
-          <a:lvl5pPr marL="457200" indent="-114300" algn="l">
-            <a:defRPr sz="1200"/>
-          </a:lvl5pPr>
-          <a:lvl6pPr marL="571500" indent="-114300" algn="l">
-            <a:defRPr sz="1200"/>
-          </a:lvl6pPr>
-          <a:lvl7pPr marL="685800" indent="-114300" algn="l">
-            <a:defRPr sz="1200"/>
-          </a:lvl7pPr>
-          <a:lvl8pPr marL="800100" indent="-114300" algn="l">
-            <a:defRPr sz="1200"/>
-          </a:lvl8pPr>
-          <a:lvl9pPr marL="914400" indent="-114300" algn="l">
-            <a:defRPr sz="1200"/>
-          </a:lvl9pPr>
-        </a:lstStyle>
+        <a:bodyPr spcFirstLastPara="0" vert="horz" wrap="square" lIns="214766" tIns="0" rIns="0" bIns="0" numCol="1" spcCol="1270" anchor="t" anchorCtr="0">
+          <a:noAutofit/>
+        </a:bodyPr>
+        <a:lstStyle/>
         <a:p>
-          <a:pPr lvl="0">
+          <a:pPr lvl="0" algn="l" defTabSz="711200">
             <a:lnSpc>
-              <a:spcPct val="100000"/>
+              <a:spcPct val="90000"/>
             </a:lnSpc>
             <a:spcBef>
               <a:spcPct val="0"/>
@@ -3180,38 +3078,54 @@
               <a:spcPct val="35000"/>
             </a:spcAft>
           </a:pPr>
-          <a:endParaRPr lang="zh-CN" altLang="en-US">
-            <a:solidFill>
-              <a:schemeClr val="tx1"/>
-            </a:solidFill>
-          </a:endParaRPr>
+          <a:endParaRPr lang="zh-CN" altLang="en-US" sz="1600" kern="1200"/>
         </a:p>
       </dsp:txBody>
       <dsp:txXfrm>
         <a:off x="4331323" y="1348313"/>
-        <a:ext cx="1307455" cy="2737484"/>
+        <a:ext cx="1307455" cy="2737483"/>
       </dsp:txXfrm>
     </dsp:sp>
     <dsp:sp modelId="{709D4EEB-418B-4C8B-818F-B9749DC245C4}">
       <dsp:nvSpPr>
-        <dsp:cNvPr id="12" name="Oval 11"/>
+        <dsp:cNvPr id="0" name=""/>
         <dsp:cNvSpPr/>
       </dsp:nvSpPr>
-      <dsp:spPr bwMode="white">
+      <dsp:spPr>
         <a:xfrm>
-          <a:off x="5380556" y="820428"/>
-          <a:ext cx="516445" cy="516445"/>
+          <a:off x="5380555" y="820428"/>
+          <a:ext cx="516444" cy="516444"/>
         </a:xfrm>
         <a:prstGeom prst="ellipse">
           <a:avLst/>
         </a:prstGeom>
+        <a:solidFill>
+          <a:schemeClr val="accent1">
+            <a:hueOff val="0"/>
+            <a:satOff val="0"/>
+            <a:lumOff val="0"/>
+            <a:alphaOff val="0"/>
+          </a:schemeClr>
+        </a:solidFill>
+        <a:ln w="19050" cap="rnd" cmpd="sng" algn="ctr">
+          <a:solidFill>
+            <a:schemeClr val="lt1">
+              <a:hueOff val="0"/>
+              <a:satOff val="0"/>
+              <a:lumOff val="0"/>
+              <a:alphaOff val="0"/>
+            </a:schemeClr>
+          </a:solidFill>
+          <a:prstDash val="solid"/>
+        </a:ln>
+        <a:effectLst/>
       </dsp:spPr>
       <dsp:style>
         <a:lnRef idx="2">
-          <a:schemeClr val="lt1"/>
+          <a:scrgbClr r="0" g="0" b="0"/>
         </a:lnRef>
         <a:fillRef idx="1">
-          <a:schemeClr val="accent1"/>
+          <a:scrgbClr r="0" g="0" b="0"/>
         </a:fillRef>
         <a:effectRef idx="0">
           <a:scrgbClr r="0" g="0" b="0"/>
@@ -3220,35 +3134,32 @@
           <a:schemeClr val="lt1"/>
         </a:fontRef>
       </dsp:style>
-      <dsp:txXfrm>
-        <a:off x="5380556" y="820428"/>
-        <a:ext cx="516445" cy="516445"/>
-      </dsp:txXfrm>
     </dsp:sp>
     <dsp:sp modelId="{4BB30F82-E3F8-4F78-9892-353560ECF66A}">
       <dsp:nvSpPr>
-        <dsp:cNvPr id="13" name="Rectangles 12"/>
+        <dsp:cNvPr id="0" name=""/>
         <dsp:cNvSpPr/>
       </dsp:nvSpPr>
-      <dsp:spPr bwMode="white">
+      <dsp:spPr>
         <a:xfrm>
           <a:off x="5638778" y="1078650"/>
-          <a:ext cx="1307455" cy="3007147"/>
+          <a:ext cx="1307455" cy="3007146"/>
         </a:xfrm>
         <a:prstGeom prst="rect">
           <a:avLst/>
         </a:prstGeom>
+        <a:noFill/>
+        <a:ln>
+          <a:noFill/>
+        </a:ln>
+        <a:effectLst/>
       </dsp:spPr>
       <dsp:style>
         <a:lnRef idx="0">
-          <a:schemeClr val="dk1">
-            <a:alpha val="0"/>
-          </a:schemeClr>
+          <a:scrgbClr r="0" g="0" b="0"/>
         </a:lnRef>
         <a:fillRef idx="0">
-          <a:schemeClr val="lt1">
-            <a:alpha val="0"/>
-          </a:schemeClr>
+          <a:scrgbClr r="0" g="0" b="0"/>
         </a:fillRef>
         <a:effectRef idx="0">
           <a:scrgbClr r="0" g="0" b="0"/>
@@ -3256,40 +3167,14 @@
         <a:fontRef idx="minor"/>
       </dsp:style>
       <dsp:txBody>
-        <a:bodyPr lIns="273653" tIns="0" rIns="0" bIns="0" anchor="t"/>
-        <a:lstStyle>
-          <a:lvl1pPr algn="l">
-            <a:defRPr sz="1500"/>
-          </a:lvl1pPr>
-          <a:lvl2pPr marL="114300" indent="-114300" algn="l">
-            <a:defRPr sz="1200"/>
-          </a:lvl2pPr>
-          <a:lvl3pPr marL="228600" indent="-114300" algn="l">
-            <a:defRPr sz="1200"/>
-          </a:lvl3pPr>
-          <a:lvl4pPr marL="342900" indent="-114300" algn="l">
-            <a:defRPr sz="1200"/>
-          </a:lvl4pPr>
-          <a:lvl5pPr marL="457200" indent="-114300" algn="l">
-            <a:defRPr sz="1200"/>
-          </a:lvl5pPr>
-          <a:lvl6pPr marL="571500" indent="-114300" algn="l">
-            <a:defRPr sz="1200"/>
-          </a:lvl6pPr>
-          <a:lvl7pPr marL="685800" indent="-114300" algn="l">
-            <a:defRPr sz="1200"/>
-          </a:lvl7pPr>
-          <a:lvl8pPr marL="800100" indent="-114300" algn="l">
-            <a:defRPr sz="1200"/>
-          </a:lvl8pPr>
-          <a:lvl9pPr marL="914400" indent="-114300" algn="l">
-            <a:defRPr sz="1200"/>
-          </a:lvl9pPr>
-        </a:lstStyle>
+        <a:bodyPr spcFirstLastPara="0" vert="horz" wrap="square" lIns="273653" tIns="0" rIns="0" bIns="0" numCol="1" spcCol="1270" anchor="t" anchorCtr="0">
+          <a:noAutofit/>
+        </a:bodyPr>
+        <a:lstStyle/>
         <a:p>
-          <a:pPr lvl="0">
+          <a:pPr lvl="0" algn="l" defTabSz="711200">
             <a:lnSpc>
-              <a:spcPct val="100000"/>
+              <a:spcPct val="90000"/>
             </a:lnSpc>
             <a:spcBef>
               <a:spcPct val="0"/>
@@ -3298,16 +3183,12 @@
               <a:spcPct val="35000"/>
             </a:spcAft>
           </a:pPr>
-          <a:endParaRPr lang="zh-CN" altLang="en-US">
-            <a:solidFill>
-              <a:schemeClr val="tx1"/>
-            </a:solidFill>
-          </a:endParaRPr>
+          <a:endParaRPr lang="zh-CN" altLang="en-US" sz="1600" kern="1200"/>
         </a:p>
       </dsp:txBody>
       <dsp:txXfrm>
         <a:off x="5638778" y="1078650"/>
-        <a:ext cx="1307455" cy="3007147"/>
+        <a:ext cx="1307455" cy="3007146"/>
       </dsp:txXfrm>
     </dsp:sp>
   </dsp:spTree>
@@ -3315,7 +3196,7 @@
 </file>
 
 <file path=ppt/diagrams/layout1.xml><?xml version="1.0" encoding="utf-8"?>
-<dgm:layoutDef xmlns:dgm="http://schemas.openxmlformats.org/drawingml/2006/diagram" xmlns:a="http://schemas.openxmlformats.org/drawingml/2006/main" uniqueId="urn:microsoft.com/office/officeart/2005/8/layout/vList2">
+<dgm:layoutDef xmlns:dgm="http://schemas.openxmlformats.org/drawingml/2006/diagram" xmlns:a="http://schemas.openxmlformats.org/drawingml/2006/main" uniqueId="urn:microsoft.com/office/officeart/2005/8/layout/vList2#1">
   <dgm:title val=""/>
   <dgm:desc val=""/>
   <dgm:catLst>
@@ -3482,7 +3363,7 @@
 </file>
 
 <file path=ppt/diagrams/layout2.xml><?xml version="1.0" encoding="utf-8"?>
-<dgm:layoutDef xmlns:dgm="http://schemas.openxmlformats.org/drawingml/2006/diagram" xmlns:a="http://schemas.openxmlformats.org/drawingml/2006/main" uniqueId="urn:microsoft.com/office/officeart/2005/8/layout/arrow2">
+<dgm:layoutDef xmlns:dgm="http://schemas.openxmlformats.org/drawingml/2006/diagram" xmlns:a="http://schemas.openxmlformats.org/drawingml/2006/main" uniqueId="urn:microsoft.com/office/officeart/2005/8/layout/arrow2#1">
   <dgm:title val=""/>
   <dgm:desc val=""/>
   <dgm:catLst>
@@ -5127,7 +5008,7 @@
 </file>
 
 <file path=ppt/diagrams/quickStyle1.xml><?xml version="1.0" encoding="utf-8"?>
-<dgm:styleDef xmlns:dgm="http://schemas.openxmlformats.org/drawingml/2006/diagram" xmlns:a="http://schemas.openxmlformats.org/drawingml/2006/main" uniqueId="urn:microsoft.com/office/officeart/2005/8/quickstyle/simple1">
+<dgm:styleDef xmlns:dgm="http://schemas.openxmlformats.org/drawingml/2006/diagram" xmlns:a="http://schemas.openxmlformats.org/drawingml/2006/main" uniqueId="urn:microsoft.com/office/officeart/2005/8/quickstyle/simple1#1">
   <dgm:title val=""/>
   <dgm:desc val=""/>
   <dgm:catLst>
@@ -5142,6 +5023,7 @@
       <a:camera prst="orthographicFront"/>
       <a:lightRig rig="threePt" dir="t"/>
     </dgm:scene3d>
+    <dgm:sp3d/>
     <dgm:txPr/>
     <dgm:style>
       <a:lnRef idx="2">
@@ -5161,6 +5043,7 @@
       <a:camera prst="orthographicFront"/>
       <a:lightRig rig="threePt" dir="t"/>
     </dgm:scene3d>
+    <dgm:sp3d/>
     <dgm:txPr/>
     <dgm:style>
       <a:lnRef idx="2">
@@ -5180,6 +5063,7 @@
       <a:camera prst="orthographicFront"/>
       <a:lightRig rig="threePt" dir="t"/>
     </dgm:scene3d>
+    <dgm:sp3d/>
     <dgm:txPr/>
     <dgm:style>
       <a:lnRef idx="2">
@@ -5199,6 +5083,7 @@
       <a:camera prst="orthographicFront"/>
       <a:lightRig rig="threePt" dir="t"/>
     </dgm:scene3d>
+    <dgm:sp3d/>
     <dgm:txPr/>
     <dgm:style>
       <a:lnRef idx="2">
@@ -5220,6 +5105,7 @@
       <a:camera prst="orthographicFront"/>
       <a:lightRig rig="threePt" dir="t"/>
     </dgm:scene3d>
+    <dgm:sp3d/>
     <dgm:txPr/>
     <dgm:style>
       <a:lnRef idx="2">
@@ -5241,6 +5127,7 @@
       <a:camera prst="orthographicFront"/>
       <a:lightRig rig="threePt" dir="t"/>
     </dgm:scene3d>
+    <dgm:sp3d/>
     <dgm:txPr/>
     <dgm:style>
       <a:lnRef idx="2">
@@ -5262,6 +5149,7 @@
       <a:camera prst="orthographicFront"/>
       <a:lightRig rig="threePt" dir="t"/>
     </dgm:scene3d>
+    <dgm:sp3d/>
     <dgm:txPr/>
     <dgm:style>
       <a:lnRef idx="2">
@@ -5283,6 +5171,7 @@
       <a:camera prst="orthographicFront"/>
       <a:lightRig rig="threePt" dir="t"/>
     </dgm:scene3d>
+    <dgm:sp3d/>
     <dgm:txPr/>
     <dgm:style>
       <a:lnRef idx="2">
@@ -5304,6 +5193,7 @@
       <a:camera prst="orthographicFront"/>
       <a:lightRig rig="threePt" dir="t"/>
     </dgm:scene3d>
+    <dgm:sp3d/>
     <dgm:txPr/>
     <dgm:style>
       <a:lnRef idx="2">
@@ -5325,6 +5215,7 @@
       <a:camera prst="orthographicFront"/>
       <a:lightRig rig="threePt" dir="t"/>
     </dgm:scene3d>
+    <dgm:sp3d/>
     <dgm:txPr/>
     <dgm:style>
       <a:lnRef idx="2">
@@ -5344,6 +5235,7 @@
       <a:camera prst="orthographicFront"/>
       <a:lightRig rig="threePt" dir="t"/>
     </dgm:scene3d>
+    <dgm:sp3d/>
     <dgm:txPr/>
     <dgm:style>
       <a:lnRef idx="2">
@@ -5363,6 +5255,7 @@
       <a:camera prst="orthographicFront"/>
       <a:lightRig rig="threePt" dir="t"/>
     </dgm:scene3d>
+    <dgm:sp3d/>
     <dgm:txPr/>
     <dgm:style>
       <a:lnRef idx="2">
@@ -5382,6 +5275,7 @@
       <a:camera prst="orthographicFront"/>
       <a:lightRig rig="threePt" dir="t"/>
     </dgm:scene3d>
+    <dgm:sp3d/>
     <dgm:txPr/>
     <dgm:style>
       <a:lnRef idx="0">
@@ -5401,6 +5295,7 @@
       <a:camera prst="orthographicFront"/>
       <a:lightRig rig="threePt" dir="t"/>
     </dgm:scene3d>
+    <dgm:sp3d/>
     <dgm:txPr/>
     <dgm:style>
       <a:lnRef idx="0">
@@ -5422,6 +5317,7 @@
       <a:camera prst="orthographicFront"/>
       <a:lightRig rig="threePt" dir="t"/>
     </dgm:scene3d>
+    <dgm:sp3d/>
     <dgm:txPr/>
     <dgm:style>
       <a:lnRef idx="2">
@@ -5441,6 +5337,7 @@
       <a:camera prst="orthographicFront"/>
       <a:lightRig rig="threePt" dir="t"/>
     </dgm:scene3d>
+    <dgm:sp3d/>
     <dgm:txPr/>
     <dgm:style>
       <a:lnRef idx="2">
@@ -5460,6 +5357,7 @@
       <a:camera prst="orthographicFront"/>
       <a:lightRig rig="threePt" dir="t"/>
     </dgm:scene3d>
+    <dgm:sp3d/>
     <dgm:txPr/>
     <dgm:style>
       <a:lnRef idx="0">
@@ -5479,6 +5377,7 @@
       <a:camera prst="orthographicFront"/>
       <a:lightRig rig="threePt" dir="t"/>
     </dgm:scene3d>
+    <dgm:sp3d/>
     <dgm:txPr/>
     <dgm:style>
       <a:lnRef idx="2">
@@ -5498,6 +5397,7 @@
       <a:camera prst="orthographicFront"/>
       <a:lightRig rig="threePt" dir="t"/>
     </dgm:scene3d>
+    <dgm:sp3d/>
     <dgm:txPr/>
     <dgm:style>
       <a:lnRef idx="2">
@@ -5517,6 +5417,7 @@
       <a:camera prst="orthographicFront"/>
       <a:lightRig rig="threePt" dir="t"/>
     </dgm:scene3d>
+    <dgm:sp3d/>
     <dgm:txPr/>
     <dgm:style>
       <a:lnRef idx="2">
@@ -5536,6 +5437,7 @@
       <a:camera prst="orthographicFront"/>
       <a:lightRig rig="threePt" dir="t"/>
     </dgm:scene3d>
+    <dgm:sp3d/>
     <dgm:txPr/>
     <dgm:style>
       <a:lnRef idx="2">
@@ -5555,6 +5457,7 @@
       <a:camera prst="orthographicFront"/>
       <a:lightRig rig="threePt" dir="t"/>
     </dgm:scene3d>
+    <dgm:sp3d/>
     <dgm:txPr/>
     <dgm:style>
       <a:lnRef idx="2">
@@ -5574,6 +5477,7 @@
       <a:camera prst="orthographicFront"/>
       <a:lightRig rig="threePt" dir="t"/>
     </dgm:scene3d>
+    <dgm:sp3d/>
     <dgm:txPr/>
     <dgm:style>
       <a:lnRef idx="2">
@@ -5593,6 +5497,7 @@
       <a:camera prst="orthographicFront"/>
       <a:lightRig rig="threePt" dir="t"/>
     </dgm:scene3d>
+    <dgm:sp3d/>
     <dgm:txPr/>
     <dgm:style>
       <a:lnRef idx="2">
@@ -5612,6 +5517,7 @@
       <a:camera prst="orthographicFront"/>
       <a:lightRig rig="threePt" dir="t"/>
     </dgm:scene3d>
+    <dgm:sp3d/>
     <dgm:txPr/>
     <dgm:style>
       <a:lnRef idx="2">
@@ -5631,6 +5537,7 @@
       <a:camera prst="orthographicFront"/>
       <a:lightRig rig="threePt" dir="t"/>
     </dgm:scene3d>
+    <dgm:sp3d/>
     <dgm:txPr/>
     <dgm:style>
       <a:lnRef idx="0">
@@ -5652,6 +5559,7 @@
       <a:camera prst="orthographicFront"/>
       <a:lightRig rig="threePt" dir="t"/>
     </dgm:scene3d>
+    <dgm:sp3d/>
     <dgm:txPr/>
     <dgm:style>
       <a:lnRef idx="2">
@@ -5673,6 +5581,7 @@
       <a:camera prst="orthographicFront"/>
       <a:lightRig rig="threePt" dir="t"/>
     </dgm:scene3d>
+    <dgm:sp3d/>
     <dgm:txPr/>
     <dgm:style>
       <a:lnRef idx="2">
@@ -5694,6 +5603,7 @@
       <a:camera prst="orthographicFront"/>
       <a:lightRig rig="threePt" dir="t"/>
     </dgm:scene3d>
+    <dgm:sp3d/>
     <dgm:txPr/>
     <dgm:style>
       <a:lnRef idx="2">
@@ -5715,6 +5625,7 @@
       <a:camera prst="orthographicFront"/>
       <a:lightRig rig="threePt" dir="t"/>
     </dgm:scene3d>
+    <dgm:sp3d/>
     <dgm:txPr/>
     <dgm:style>
       <a:lnRef idx="2">
@@ -5736,6 +5647,7 @@
       <a:camera prst="orthographicFront"/>
       <a:lightRig rig="threePt" dir="t"/>
     </dgm:scene3d>
+    <dgm:sp3d/>
     <dgm:txPr/>
     <dgm:style>
       <a:lnRef idx="2">
@@ -5757,6 +5669,7 @@
       <a:camera prst="orthographicFront"/>
       <a:lightRig rig="threePt" dir="t"/>
     </dgm:scene3d>
+    <dgm:sp3d/>
     <dgm:txPr/>
     <dgm:style>
       <a:lnRef idx="2">
@@ -5778,6 +5691,7 @@
       <a:camera prst="orthographicFront"/>
       <a:lightRig rig="threePt" dir="t"/>
     </dgm:scene3d>
+    <dgm:sp3d/>
     <dgm:txPr/>
     <dgm:style>
       <a:lnRef idx="2">
@@ -5797,6 +5711,7 @@
       <a:camera prst="orthographicFront"/>
       <a:lightRig rig="threePt" dir="t"/>
     </dgm:scene3d>
+    <dgm:sp3d/>
     <dgm:txPr/>
     <dgm:style>
       <a:lnRef idx="2">
@@ -5816,6 +5731,7 @@
       <a:camera prst="orthographicFront"/>
       <a:lightRig rig="threePt" dir="t"/>
     </dgm:scene3d>
+    <dgm:sp3d/>
     <dgm:txPr/>
     <dgm:style>
       <a:lnRef idx="2">
@@ -5835,6 +5751,7 @@
       <a:camera prst="orthographicFront"/>
       <a:lightRig rig="threePt" dir="t"/>
     </dgm:scene3d>
+    <dgm:sp3d/>
     <dgm:txPr/>
     <dgm:style>
       <a:lnRef idx="2">
@@ -5854,6 +5771,7 @@
       <a:camera prst="orthographicFront"/>
       <a:lightRig rig="threePt" dir="t"/>
     </dgm:scene3d>
+    <dgm:sp3d/>
     <dgm:txPr/>
     <dgm:style>
       <a:lnRef idx="2">
@@ -5875,6 +5793,7 @@
       <a:camera prst="orthographicFront"/>
       <a:lightRig rig="threePt" dir="t"/>
     </dgm:scene3d>
+    <dgm:sp3d/>
     <dgm:txPr/>
     <dgm:style>
       <a:lnRef idx="2">
@@ -5896,6 +5815,7 @@
       <a:camera prst="orthographicFront"/>
       <a:lightRig rig="threePt" dir="t"/>
     </dgm:scene3d>
+    <dgm:sp3d/>
     <dgm:txPr/>
     <dgm:style>
       <a:lnRef idx="2">
@@ -5917,6 +5837,7 @@
       <a:camera prst="orthographicFront"/>
       <a:lightRig rig="threePt" dir="t"/>
     </dgm:scene3d>
+    <dgm:sp3d/>
     <dgm:txPr/>
     <dgm:style>
       <a:lnRef idx="2">
@@ -5938,6 +5859,7 @@
       <a:camera prst="orthographicFront"/>
       <a:lightRig rig="threePt" dir="t"/>
     </dgm:scene3d>
+    <dgm:sp3d/>
     <dgm:txPr/>
     <dgm:style>
       <a:lnRef idx="0">
@@ -5957,6 +5879,7 @@
       <a:camera prst="orthographicFront"/>
       <a:lightRig rig="threePt" dir="t"/>
     </dgm:scene3d>
+    <dgm:sp3d/>
     <dgm:txPr/>
     <dgm:style>
       <a:lnRef idx="1">
@@ -5976,6 +5899,7 @@
       <a:camera prst="orthographicFront"/>
       <a:lightRig rig="threePt" dir="t"/>
     </dgm:scene3d>
+    <dgm:sp3d/>
     <dgm:txPr/>
     <dgm:style>
       <a:lnRef idx="0">
@@ -5997,6 +5921,7 @@
       <a:camera prst="orthographicFront"/>
       <a:lightRig rig="threePt" dir="t"/>
     </dgm:scene3d>
+    <dgm:sp3d/>
     <dgm:txPr/>
     <dgm:style>
       <a:lnRef idx="2">
@@ -6016,6 +5941,7 @@
       <a:camera prst="orthographicFront"/>
       <a:lightRig rig="threePt" dir="t"/>
     </dgm:scene3d>
+    <dgm:sp3d/>
     <dgm:txPr/>
     <dgm:style>
       <a:lnRef idx="2">
@@ -6035,6 +5961,7 @@
       <a:camera prst="orthographicFront"/>
       <a:lightRig rig="threePt" dir="t"/>
     </dgm:scene3d>
+    <dgm:sp3d/>
     <dgm:txPr/>
     <dgm:style>
       <a:lnRef idx="2">
@@ -6054,6 +5981,7 @@
       <a:camera prst="orthographicFront"/>
       <a:lightRig rig="threePt" dir="t"/>
     </dgm:scene3d>
+    <dgm:sp3d/>
     <dgm:txPr/>
     <dgm:style>
       <a:lnRef idx="1">
@@ -6073,6 +6001,7 @@
       <a:camera prst="orthographicFront"/>
       <a:lightRig rig="threePt" dir="t"/>
     </dgm:scene3d>
+    <dgm:sp3d/>
     <dgm:txPr/>
     <dgm:style>
       <a:lnRef idx="0">
@@ -6092,6 +6021,7 @@
       <a:camera prst="orthographicFront"/>
       <a:lightRig rig="threePt" dir="t"/>
     </dgm:scene3d>
+    <dgm:sp3d/>
     <dgm:txPr/>
     <dgm:style>
       <a:lnRef idx="2">
@@ -6112,7 +6042,7 @@
 </file>
 
 <file path=ppt/diagrams/quickStyle2.xml><?xml version="1.0" encoding="utf-8"?>
-<dgm:styleDef xmlns:dgm="http://schemas.openxmlformats.org/drawingml/2006/diagram" xmlns:a="http://schemas.openxmlformats.org/drawingml/2006/main" uniqueId="urn:microsoft.com/office/officeart/2005/8/quickstyle/simple1">
+<dgm:styleDef xmlns:dgm="http://schemas.openxmlformats.org/drawingml/2006/diagram" xmlns:a="http://schemas.openxmlformats.org/drawingml/2006/main" uniqueId="urn:microsoft.com/office/officeart/2005/8/quickstyle/simple1#2">
   <dgm:title val=""/>
   <dgm:desc val=""/>
   <dgm:catLst>
@@ -6127,6 +6057,7 @@
       <a:camera prst="orthographicFront"/>
       <a:lightRig rig="threePt" dir="t"/>
     </dgm:scene3d>
+    <dgm:sp3d/>
     <dgm:txPr/>
     <dgm:style>
       <a:lnRef idx="2">
@@ -6146,6 +6077,7 @@
       <a:camera prst="orthographicFront"/>
       <a:lightRig rig="threePt" dir="t"/>
     </dgm:scene3d>
+    <dgm:sp3d/>
     <dgm:txPr/>
     <dgm:style>
       <a:lnRef idx="2">
@@ -6165,6 +6097,7 @@
       <a:camera prst="orthographicFront"/>
       <a:lightRig rig="threePt" dir="t"/>
     </dgm:scene3d>
+    <dgm:sp3d/>
     <dgm:txPr/>
     <dgm:style>
       <a:lnRef idx="2">
@@ -6184,6 +6117,7 @@
       <a:camera prst="orthographicFront"/>
       <a:lightRig rig="threePt" dir="t"/>
     </dgm:scene3d>
+    <dgm:sp3d/>
     <dgm:txPr/>
     <dgm:style>
       <a:lnRef idx="2">
@@ -6205,6 +6139,7 @@
       <a:camera prst="orthographicFront"/>
       <a:lightRig rig="threePt" dir="t"/>
     </dgm:scene3d>
+    <dgm:sp3d/>
     <dgm:txPr/>
     <dgm:style>
       <a:lnRef idx="2">
@@ -6226,6 +6161,7 @@
       <a:camera prst="orthographicFront"/>
       <a:lightRig rig="threePt" dir="t"/>
     </dgm:scene3d>
+    <dgm:sp3d/>
     <dgm:txPr/>
     <dgm:style>
       <a:lnRef idx="2">
@@ -6247,6 +6183,7 @@
       <a:camera prst="orthographicFront"/>
       <a:lightRig rig="threePt" dir="t"/>
     </dgm:scene3d>
+    <dgm:sp3d/>
     <dgm:txPr/>
     <dgm:style>
       <a:lnRef idx="2">
@@ -6268,6 +6205,7 @@
       <a:camera prst="orthographicFront"/>
       <a:lightRig rig="threePt" dir="t"/>
     </dgm:scene3d>
+    <dgm:sp3d/>
     <dgm:txPr/>
     <dgm:style>
       <a:lnRef idx="2">
@@ -6289,6 +6227,7 @@
       <a:camera prst="orthographicFront"/>
       <a:lightRig rig="threePt" dir="t"/>
     </dgm:scene3d>
+    <dgm:sp3d/>
     <dgm:txPr/>
     <dgm:style>
       <a:lnRef idx="2">
@@ -6310,6 +6249,7 @@
       <a:camera prst="orthographicFront"/>
       <a:lightRig rig="threePt" dir="t"/>
     </dgm:scene3d>
+    <dgm:sp3d/>
     <dgm:txPr/>
     <dgm:style>
       <a:lnRef idx="2">
@@ -6329,6 +6269,7 @@
       <a:camera prst="orthographicFront"/>
       <a:lightRig rig="threePt" dir="t"/>
     </dgm:scene3d>
+    <dgm:sp3d/>
     <dgm:txPr/>
     <dgm:style>
       <a:lnRef idx="2">
@@ -6348,6 +6289,7 @@
       <a:camera prst="orthographicFront"/>
       <a:lightRig rig="threePt" dir="t"/>
     </dgm:scene3d>
+    <dgm:sp3d/>
     <dgm:txPr/>
     <dgm:style>
       <a:lnRef idx="2">
@@ -6367,6 +6309,7 @@
       <a:camera prst="orthographicFront"/>
       <a:lightRig rig="threePt" dir="t"/>
     </dgm:scene3d>
+    <dgm:sp3d/>
     <dgm:txPr/>
     <dgm:style>
       <a:lnRef idx="0">
@@ -6386,6 +6329,7 @@
       <a:camera prst="orthographicFront"/>
       <a:lightRig rig="threePt" dir="t"/>
     </dgm:scene3d>
+    <dgm:sp3d/>
     <dgm:txPr/>
     <dgm:style>
       <a:lnRef idx="0">
@@ -6407,6 +6351,7 @@
       <a:camera prst="orthographicFront"/>
       <a:lightRig rig="threePt" dir="t"/>
     </dgm:scene3d>
+    <dgm:sp3d/>
     <dgm:txPr/>
     <dgm:style>
       <a:lnRef idx="2">
@@ -6426,6 +6371,7 @@
       <a:camera prst="orthographicFront"/>
       <a:lightRig rig="threePt" dir="t"/>
     </dgm:scene3d>
+    <dgm:sp3d/>
     <dgm:txPr/>
     <dgm:style>
       <a:lnRef idx="2">
@@ -6445,6 +6391,7 @@
       <a:camera prst="orthographicFront"/>
       <a:lightRig rig="threePt" dir="t"/>
     </dgm:scene3d>
+    <dgm:sp3d/>
     <dgm:txPr/>
     <dgm:style>
       <a:lnRef idx="0">
@@ -6464,6 +6411,7 @@
       <a:camera prst="orthographicFront"/>
       <a:lightRig rig="threePt" dir="t"/>
     </dgm:scene3d>
+    <dgm:sp3d/>
     <dgm:txPr/>
     <dgm:style>
       <a:lnRef idx="2">
@@ -6483,6 +6431,7 @@
       <a:camera prst="orthographicFront"/>
       <a:lightRig rig="threePt" dir="t"/>
     </dgm:scene3d>
+    <dgm:sp3d/>
     <dgm:txPr/>
     <dgm:style>
       <a:lnRef idx="2">
@@ -6502,6 +6451,7 @@
       <a:camera prst="orthographicFront"/>
       <a:lightRig rig="threePt" dir="t"/>
     </dgm:scene3d>
+    <dgm:sp3d/>
     <dgm:txPr/>
     <dgm:style>
       <a:lnRef idx="2">
@@ -6521,6 +6471,7 @@
       <a:camera prst="orthographicFront"/>
       <a:lightRig rig="threePt" dir="t"/>
     </dgm:scene3d>
+    <dgm:sp3d/>
     <dgm:txPr/>
     <dgm:style>
       <a:lnRef idx="2">
@@ -6540,6 +6491,7 @@
       <a:camera prst="orthographicFront"/>
       <a:lightRig rig="threePt" dir="t"/>
     </dgm:scene3d>
+    <dgm:sp3d/>
     <dgm:txPr/>
     <dgm:style>
       <a:lnRef idx="2">
@@ -6559,6 +6511,7 @@
       <a:camera prst="orthographicFront"/>
       <a:lightRig rig="threePt" dir="t"/>
     </dgm:scene3d>
+    <dgm:sp3d/>
     <dgm:txPr/>
     <dgm:style>
       <a:lnRef idx="2">
@@ -6578,6 +6531,7 @@
       <a:camera prst="orthographicFront"/>
       <a:lightRig rig="threePt" dir="t"/>
     </dgm:scene3d>
+    <dgm:sp3d/>
     <dgm:txPr/>
     <dgm:style>
       <a:lnRef idx="2">
@@ -6597,6 +6551,7 @@
       <a:camera prst="orthographicFront"/>
       <a:lightRig rig="threePt" dir="t"/>
     </dgm:scene3d>
+    <dgm:sp3d/>
     <dgm:txPr/>
     <dgm:style>
       <a:lnRef idx="2">
@@ -6616,6 +6571,7 @@
       <a:camera prst="orthographicFront"/>
       <a:lightRig rig="threePt" dir="t"/>
     </dgm:scene3d>
+    <dgm:sp3d/>
     <dgm:txPr/>
     <dgm:style>
       <a:lnRef idx="0">
@@ -6637,6 +6593,7 @@
       <a:camera prst="orthographicFront"/>
       <a:lightRig rig="threePt" dir="t"/>
     </dgm:scene3d>
+    <dgm:sp3d/>
     <dgm:txPr/>
     <dgm:style>
       <a:lnRef idx="2">
@@ -6658,6 +6615,7 @@
       <a:camera prst="orthographicFront"/>
       <a:lightRig rig="threePt" dir="t"/>
     </dgm:scene3d>
+    <dgm:sp3d/>
     <dgm:txPr/>
     <dgm:style>
       <a:lnRef idx="2">
@@ -6679,6 +6637,7 @@
       <a:camera prst="orthographicFront"/>
       <a:lightRig rig="threePt" dir="t"/>
     </dgm:scene3d>
+    <dgm:sp3d/>
     <dgm:txPr/>
     <dgm:style>
       <a:lnRef idx="2">
@@ -6700,6 +6659,7 @@
       <a:camera prst="orthographicFront"/>
       <a:lightRig rig="threePt" dir="t"/>
     </dgm:scene3d>
+    <dgm:sp3d/>
     <dgm:txPr/>
     <dgm:style>
       <a:lnRef idx="2">
@@ -6721,6 +6681,7 @@
       <a:camera prst="orthographicFront"/>
       <a:lightRig rig="threePt" dir="t"/>
     </dgm:scene3d>
+    <dgm:sp3d/>
     <dgm:txPr/>
     <dgm:style>
       <a:lnRef idx="2">
@@ -6742,6 +6703,7 @@
       <a:camera prst="orthographicFront"/>
       <a:lightRig rig="threePt" dir="t"/>
     </dgm:scene3d>
+    <dgm:sp3d/>
     <dgm:txPr/>
     <dgm:style>
       <a:lnRef idx="2">
@@ -6763,6 +6725,7 @@
       <a:camera prst="orthographicFront"/>
       <a:lightRig rig="threePt" dir="t"/>
     </dgm:scene3d>
+    <dgm:sp3d/>
     <dgm:txPr/>
     <dgm:style>
       <a:lnRef idx="2">
@@ -6782,6 +6745,7 @@
       <a:camera prst="orthographicFront"/>
       <a:lightRig rig="threePt" dir="t"/>
     </dgm:scene3d>
+    <dgm:sp3d/>
     <dgm:txPr/>
     <dgm:style>
       <a:lnRef idx="2">
@@ -6801,6 +6765,7 @@
       <a:camera prst="orthographicFront"/>
       <a:lightRig rig="threePt" dir="t"/>
     </dgm:scene3d>
+    <dgm:sp3d/>
     <dgm:txPr/>
     <dgm:style>
       <a:lnRef idx="2">
@@ -6820,6 +6785,7 @@
       <a:camera prst="orthographicFront"/>
       <a:lightRig rig="threePt" dir="t"/>
     </dgm:scene3d>
+    <dgm:sp3d/>
     <dgm:txPr/>
     <dgm:style>
       <a:lnRef idx="2">
@@ -6839,6 +6805,7 @@
       <a:camera prst="orthographicFront"/>
       <a:lightRig rig="threePt" dir="t"/>
     </dgm:scene3d>
+    <dgm:sp3d/>
     <dgm:txPr/>
     <dgm:style>
       <a:lnRef idx="2">
@@ -6860,6 +6827,7 @@
       <a:camera prst="orthographicFront"/>
       <a:lightRig rig="threePt" dir="t"/>
     </dgm:scene3d>
+    <dgm:sp3d/>
     <dgm:txPr/>
     <dgm:style>
       <a:lnRef idx="2">
@@ -6881,6 +6849,7 @@
       <a:camera prst="orthographicFront"/>
       <a:lightRig rig="threePt" dir="t"/>
     </dgm:scene3d>
+    <dgm:sp3d/>
     <dgm:txPr/>
     <dgm:style>
       <a:lnRef idx="2">
@@ -6902,6 +6871,7 @@
       <a:camera prst="orthographicFront"/>
       <a:lightRig rig="threePt" dir="t"/>
     </dgm:scene3d>
+    <dgm:sp3d/>
     <dgm:txPr/>
     <dgm:style>
       <a:lnRef idx="2">
@@ -6923,6 +6893,7 @@
       <a:camera prst="orthographicFront"/>
       <a:lightRig rig="threePt" dir="t"/>
     </dgm:scene3d>
+    <dgm:sp3d/>
     <dgm:txPr/>
     <dgm:style>
       <a:lnRef idx="0">
@@ -6942,6 +6913,7 @@
       <a:camera prst="orthographicFront"/>
       <a:lightRig rig="threePt" dir="t"/>
     </dgm:scene3d>
+    <dgm:sp3d/>
     <dgm:txPr/>
     <dgm:style>
       <a:lnRef idx="1">
@@ -6961,6 +6933,7 @@
       <a:camera prst="orthographicFront"/>
       <a:lightRig rig="threePt" dir="t"/>
     </dgm:scene3d>
+    <dgm:sp3d/>
     <dgm:txPr/>
     <dgm:style>
       <a:lnRef idx="0">
@@ -6982,6 +6955,7 @@
       <a:camera prst="orthographicFront"/>
       <a:lightRig rig="threePt" dir="t"/>
     </dgm:scene3d>
+    <dgm:sp3d/>
     <dgm:txPr/>
     <dgm:style>
       <a:lnRef idx="2">
@@ -7001,6 +6975,7 @@
       <a:camera prst="orthographicFront"/>
       <a:lightRig rig="threePt" dir="t"/>
     </dgm:scene3d>
+    <dgm:sp3d/>
     <dgm:txPr/>
     <dgm:style>
       <a:lnRef idx="2">
@@ -7020,6 +6995,7 @@
       <a:camera prst="orthographicFront"/>
       <a:lightRig rig="threePt" dir="t"/>
     </dgm:scene3d>
+    <dgm:sp3d/>
     <dgm:txPr/>
     <dgm:style>
       <a:lnRef idx="2">
@@ -7039,6 +7015,7 @@
       <a:camera prst="orthographicFront"/>
       <a:lightRig rig="threePt" dir="t"/>
     </dgm:scene3d>
+    <dgm:sp3d/>
     <dgm:txPr/>
     <dgm:style>
       <a:lnRef idx="1">
@@ -7058,6 +7035,7 @@
       <a:camera prst="orthographicFront"/>
       <a:lightRig rig="threePt" dir="t"/>
     </dgm:scene3d>
+    <dgm:sp3d/>
     <dgm:txPr/>
     <dgm:style>
       <a:lnRef idx="0">
@@ -7077,6 +7055,7 @@
       <a:camera prst="orthographicFront"/>
       <a:lightRig rig="threePt" dir="t"/>
     </dgm:scene3d>
+    <dgm:sp3d/>
     <dgm:txPr/>
     <dgm:style>
       <a:lnRef idx="2">
@@ -7178,6 +7157,7 @@
           <a:p>
             <a:fld id="{05389ADD-357A-448F-B13B-6EC087BE2CAF}" type="datetimeFigureOut">
               <a:rPr lang="zh-CN" altLang="en-US" smtClean="0"/>
+              <a:t>2021/11/30</a:t>
             </a:fld>
             <a:endParaRPr lang="zh-CN" altLang="en-US"/>
           </a:p>
@@ -7244,7 +7224,6 @@
               <a:rPr lang="zh-CN" altLang="en-US"/>
               <a:t>单击此处编辑母版文本样式</a:t>
             </a:r>
-            <a:endParaRPr lang="zh-CN" altLang="en-US"/>
           </a:p>
           <a:p>
             <a:pPr lvl="1"/>
@@ -7252,7 +7231,6 @@
               <a:rPr lang="zh-CN" altLang="en-US"/>
               <a:t>第二级</a:t>
             </a:r>
-            <a:endParaRPr lang="zh-CN" altLang="en-US"/>
           </a:p>
           <a:p>
             <a:pPr lvl="2"/>
@@ -7260,7 +7238,6 @@
               <a:rPr lang="zh-CN" altLang="en-US"/>
               <a:t>第三级</a:t>
             </a:r>
-            <a:endParaRPr lang="zh-CN" altLang="en-US"/>
           </a:p>
           <a:p>
             <a:pPr lvl="3"/>
@@ -7268,7 +7245,6 @@
               <a:rPr lang="zh-CN" altLang="en-US"/>
               <a:t>第四级</a:t>
             </a:r>
-            <a:endParaRPr lang="zh-CN" altLang="en-US"/>
           </a:p>
           <a:p>
             <a:pPr lvl="4"/>
@@ -7276,7 +7252,6 @@
               <a:rPr lang="zh-CN" altLang="en-US"/>
               <a:t>第五级</a:t>
             </a:r>
-            <a:endParaRPr lang="zh-CN" altLang="en-US"/>
           </a:p>
         </p:txBody>
       </p:sp>
@@ -7340,12 +7315,18 @@
           <a:p>
             <a:fld id="{6245CCF4-CF1B-4B4B-B5D0-2221EBE362B5}" type="slidenum">
               <a:rPr lang="zh-CN" altLang="en-US" smtClean="0"/>
+              <a:t>‹#›</a:t>
             </a:fld>
             <a:endParaRPr lang="zh-CN" altLang="en-US"/>
           </a:p>
         </p:txBody>
       </p:sp>
     </p:spTree>
+    <p:extLst>
+      <p:ext uri="{BB962C8B-B14F-4D97-AF65-F5344CB8AC3E}">
+        <p14:creationId xmlns:p14="http://schemas.microsoft.com/office/powerpoint/2010/main" val="2490318565"/>
+      </p:ext>
+    </p:extLst>
   </p:cSld>
   <p:clrMap bg1="lt1" tx1="dk1" bg2="lt2" tx2="dk2" accent1="accent1" accent2="accent2" accent3="accent3" accent4="accent4" accent5="accent5" accent6="accent6" hlink="hlink" folHlink="folHlink"/>
   <p:notesStyle>
@@ -7672,12 +7653,18 @@
           <a:p>
             <a:fld id="{6245CCF4-CF1B-4B4B-B5D0-2221EBE362B5}" type="slidenum">
               <a:rPr lang="zh-CN" altLang="en-US" smtClean="0"/>
+              <a:t>3</a:t>
             </a:fld>
             <a:endParaRPr lang="zh-CN" altLang="en-US"/>
           </a:p>
         </p:txBody>
       </p:sp>
     </p:spTree>
+    <p:extLst>
+      <p:ext uri="{BB962C8B-B14F-4D97-AF65-F5344CB8AC3E}">
+        <p14:creationId xmlns:p14="http://schemas.microsoft.com/office/powerpoint/2010/main" val="942547766"/>
+      </p:ext>
+    </p:extLst>
   </p:cSld>
   <p:clrMapOvr>
     <a:masterClrMapping/>
@@ -7750,12 +7737,18 @@
           <a:p>
             <a:fld id="{6245CCF4-CF1B-4B4B-B5D0-2221EBE362B5}" type="slidenum">
               <a:rPr lang="zh-CN" altLang="en-US" smtClean="0"/>
+              <a:t>13</a:t>
             </a:fld>
             <a:endParaRPr lang="zh-CN" altLang="en-US"/>
           </a:p>
         </p:txBody>
       </p:sp>
     </p:spTree>
+    <p:extLst>
+      <p:ext uri="{BB962C8B-B14F-4D97-AF65-F5344CB8AC3E}">
+        <p14:creationId xmlns:p14="http://schemas.microsoft.com/office/powerpoint/2010/main" val="2025390987"/>
+      </p:ext>
+    </p:extLst>
   </p:cSld>
   <p:clrMapOvr>
     <a:masterClrMapping/>
@@ -7807,7 +7800,7 @@
           <a:bodyPr/>
           <a:lstStyle/>
           <a:p>
-            <a:endParaRPr kumimoji="1" lang="zh-CN" altLang="en-US"/>
+            <a:endParaRPr lang="zh-CN" altLang="en-US" dirty="0"/>
           </a:p>
         </p:txBody>
       </p:sp>
@@ -7818,7 +7811,7 @@
             <a:spLocks noGrp="1"/>
           </p:cNvSpPr>
           <p:nvPr>
-            <p:ph type="sldNum" sz="quarter" idx="5"/>
+            <p:ph type="sldNum" sz="quarter" idx="10"/>
           </p:nvPr>
         </p:nvSpPr>
         <p:spPr/>
@@ -7828,12 +7821,158 @@
           <a:p>
             <a:fld id="{6245CCF4-CF1B-4B4B-B5D0-2221EBE362B5}" type="slidenum">
               <a:rPr lang="zh-CN" altLang="en-US" smtClean="0"/>
+              <a:t>14</a:t>
             </a:fld>
             <a:endParaRPr lang="zh-CN" altLang="en-US"/>
           </a:p>
         </p:txBody>
       </p:sp>
     </p:spTree>
+    <p:extLst>
+      <p:ext uri="{BB962C8B-B14F-4D97-AF65-F5344CB8AC3E}">
+        <p14:creationId xmlns:p14="http://schemas.microsoft.com/office/powerpoint/2010/main" val="4247127536"/>
+      </p:ext>
+    </p:extLst>
+  </p:cSld>
+  <p:clrMapOvr>
+    <a:masterClrMapping/>
+  </p:clrMapOvr>
+</p:notes>
+</file>
+
+<file path=ppt/notesSlides/notesSlide12.xml><?xml version="1.0" encoding="utf-8"?>
+<p:notes xmlns:a="http://schemas.openxmlformats.org/drawingml/2006/main" xmlns:r="http://schemas.openxmlformats.org/officeDocument/2006/relationships" xmlns:p="http://schemas.openxmlformats.org/presentationml/2006/main">
+  <p:cSld>
+    <p:spTree>
+      <p:nvGrpSpPr>
+        <p:cNvPr id="1" name=""/>
+        <p:cNvGrpSpPr/>
+        <p:nvPr/>
+      </p:nvGrpSpPr>
+      <p:grpSpPr>
+        <a:xfrm>
+          <a:off x="0" y="0"/>
+          <a:ext cx="0" cy="0"/>
+          <a:chOff x="0" y="0"/>
+          <a:chExt cx="0" cy="0"/>
+        </a:xfrm>
+      </p:grpSpPr>
+      <p:sp>
+        <p:nvSpPr>
+          <p:cNvPr id="2" name="幻灯片图像占位符 1"/>
+          <p:cNvSpPr>
+            <a:spLocks noGrp="1" noRot="1" noChangeAspect="1"/>
+          </p:cNvSpPr>
+          <p:nvPr>
+            <p:ph type="sldImg"/>
+          </p:nvPr>
+        </p:nvSpPr>
+        <p:spPr/>
+      </p:sp>
+      <p:sp>
+        <p:nvSpPr>
+          <p:cNvPr id="3" name="备注占位符 2"/>
+          <p:cNvSpPr>
+            <a:spLocks noGrp="1"/>
+          </p:cNvSpPr>
+          <p:nvPr>
+            <p:ph type="body" idx="1"/>
+          </p:nvPr>
+        </p:nvSpPr>
+        <p:spPr/>
+        <p:txBody>
+          <a:bodyPr/>
+          <a:lstStyle/>
+          <a:p>
+            <a:r>
+              <a:rPr lang="en-US" altLang="zh-CN" dirty="0" smtClean="0"/>
+              <a:t>Rust</a:t>
+            </a:r>
+            <a:r>
+              <a:rPr lang="zh-CN" altLang="en-US" dirty="0" smtClean="0"/>
+              <a:t>发展是依赖社区和开发团队共同推进的，</a:t>
+            </a:r>
+            <a:r>
+              <a:rPr lang="en-US" altLang="zh-CN" dirty="0" smtClean="0"/>
+              <a:t>rust</a:t>
+            </a:r>
+            <a:r>
+              <a:rPr lang="zh-CN" altLang="en-US" dirty="0" smtClean="0"/>
+              <a:t>核心团队主要集中在</a:t>
+            </a:r>
+            <a:r>
+              <a:rPr lang="en-US" altLang="zh-CN" dirty="0" smtClean="0"/>
+              <a:t>rust</a:t>
+            </a:r>
+            <a:r>
+              <a:rPr lang="zh-CN" altLang="en-US" dirty="0" smtClean="0"/>
+              <a:t>语言本身的特性开发上，而社区主要集中在</a:t>
+            </a:r>
+            <a:r>
+              <a:rPr lang="en-US" altLang="zh-CN" dirty="0" smtClean="0"/>
+              <a:t>rust</a:t>
+            </a:r>
+            <a:r>
+              <a:rPr lang="zh-CN" altLang="en-US" dirty="0" smtClean="0"/>
+              <a:t>的基础应用上。很多基础库都会以</a:t>
+            </a:r>
+            <a:r>
+              <a:rPr lang="en-US" altLang="zh-CN" dirty="0" smtClean="0"/>
+              <a:t>crate</a:t>
+            </a:r>
+            <a:r>
+              <a:rPr lang="zh-CN" altLang="en-US" dirty="0" smtClean="0"/>
+              <a:t>的形式发布到</a:t>
+            </a:r>
+            <a:r>
+              <a:rPr lang="en-US" altLang="zh-CN" dirty="0" smtClean="0"/>
+              <a:t>crates.io</a:t>
+            </a:r>
+            <a:r>
+              <a:rPr lang="zh-CN" altLang="en-US" dirty="0" smtClean="0"/>
+              <a:t>上。目前为止有</a:t>
+            </a:r>
+            <a:r>
+              <a:rPr lang="en-US" altLang="zh-CN" dirty="0" smtClean="0"/>
+              <a:t>71905</a:t>
+            </a:r>
+            <a:r>
+              <a:rPr lang="zh-CN" altLang="en-US" smtClean="0"/>
+              <a:t>个</a:t>
+            </a:r>
+            <a:endParaRPr lang="zh-CN" altLang="en-US" dirty="0"/>
+          </a:p>
+        </p:txBody>
+      </p:sp>
+      <p:sp>
+        <p:nvSpPr>
+          <p:cNvPr id="4" name="灯片编号占位符 3"/>
+          <p:cNvSpPr>
+            <a:spLocks noGrp="1"/>
+          </p:cNvSpPr>
+          <p:nvPr>
+            <p:ph type="sldNum" sz="quarter" idx="10"/>
+          </p:nvPr>
+        </p:nvSpPr>
+        <p:spPr/>
+        <p:txBody>
+          <a:bodyPr/>
+          <a:lstStyle/>
+          <a:p>
+            <a:fld id="{6245CCF4-CF1B-4B4B-B5D0-2221EBE362B5}" type="slidenum">
+              <a:rPr lang="zh-CN" altLang="en-US" smtClean="0"/>
+              <a:t>15</a:t>
+            </a:fld>
+            <a:endParaRPr lang="zh-CN" altLang="en-US"/>
+          </a:p>
+        </p:txBody>
+      </p:sp>
+    </p:spTree>
+    <p:extLst>
+      <p:ext uri="{BB962C8B-B14F-4D97-AF65-F5344CB8AC3E}">
+        <p14:creationId xmlns:p14="http://schemas.microsoft.com/office/powerpoint/2010/main" val="1322133225"/>
+      </p:ext>
+    </p:extLst>
   </p:cSld>
   <p:clrMapOvr>
     <a:masterClrMapping/>
@@ -7933,7 +8072,6 @@
               <a:rPr lang="zh-CN" altLang="en-US" dirty="0"/>
               <a:t>的调查数据。</a:t>
             </a:r>
-            <a:endParaRPr lang="zh-CN" altLang="en-US" dirty="0"/>
           </a:p>
         </p:txBody>
       </p:sp>
@@ -7954,12 +8092,18 @@
           <a:p>
             <a:fld id="{6245CCF4-CF1B-4B4B-B5D0-2221EBE362B5}" type="slidenum">
               <a:rPr lang="zh-CN" altLang="en-US" smtClean="0"/>
+              <a:t>4</a:t>
             </a:fld>
             <a:endParaRPr lang="zh-CN" altLang="en-US"/>
           </a:p>
         </p:txBody>
       </p:sp>
     </p:spTree>
+    <p:extLst>
+      <p:ext uri="{BB962C8B-B14F-4D97-AF65-F5344CB8AC3E}">
+        <p14:creationId xmlns:p14="http://schemas.microsoft.com/office/powerpoint/2010/main" val="382649545"/>
+      </p:ext>
+    </p:extLst>
   </p:cSld>
   <p:clrMapOvr>
     <a:masterClrMapping/>
@@ -8148,12 +8292,18 @@
           <a:p>
             <a:fld id="{6245CCF4-CF1B-4B4B-B5D0-2221EBE362B5}" type="slidenum">
               <a:rPr lang="zh-CN" altLang="en-US" smtClean="0"/>
+              <a:t>5</a:t>
             </a:fld>
             <a:endParaRPr lang="zh-CN" altLang="en-US"/>
           </a:p>
         </p:txBody>
       </p:sp>
     </p:spTree>
+    <p:extLst>
+      <p:ext uri="{BB962C8B-B14F-4D97-AF65-F5344CB8AC3E}">
+        <p14:creationId xmlns:p14="http://schemas.microsoft.com/office/powerpoint/2010/main" val="2930985737"/>
+      </p:ext>
+    </p:extLst>
   </p:cSld>
   <p:clrMapOvr>
     <a:masterClrMapping/>
@@ -8207,9 +8357,16 @@
           <a:p>
             <a:r>
               <a:rPr lang="zh-CN" altLang="en-US" dirty="0"/>
-              <a:t>在计算机领域中，人们普遍关心的两个属性，分别是性能和安全性。早期计算机行业，计算资源匮乏，为了获取更高的性能宁愿牺牲安全性。随着计算机行业的发展，计算资源得到极大增加，不仅关注性能，更关注安全性。因此格雷顿霍尔萌生了自己开发一门语言的想法。他期望该语言能有如下表现。</a:t>
-            </a:r>
-            <a:endParaRPr lang="zh-CN" altLang="en-US" dirty="0"/>
+              <a:t>在计算机领域中，人们普遍关心的两个属性，分别是性能和安全性。早期计算机行业，计算资源匮乏，为了获取更高的性能宁愿牺牲安全性。随着计算机行业的发展，计算资源得到极大增加，不仅关注性能，更关注安全性</a:t>
+            </a:r>
+            <a:r>
+              <a:rPr lang="zh-CN" altLang="en-US" dirty="0" smtClean="0"/>
+              <a:t>。（微软公司、空指针异常）因此</a:t>
+            </a:r>
+            <a:r>
+              <a:rPr lang="zh-CN" altLang="en-US" dirty="0"/>
+              <a:t>格雷顿霍尔萌生了自己开发一门语言的想法。他期望该语言能有如下表现。</a:t>
+            </a:r>
           </a:p>
         </p:txBody>
       </p:sp>
@@ -8230,12 +8387,18 @@
           <a:p>
             <a:fld id="{6245CCF4-CF1B-4B4B-B5D0-2221EBE362B5}" type="slidenum">
               <a:rPr lang="zh-CN" altLang="en-US" smtClean="0"/>
+              <a:t>6</a:t>
             </a:fld>
             <a:endParaRPr lang="zh-CN" altLang="en-US"/>
           </a:p>
         </p:txBody>
       </p:sp>
     </p:spTree>
+    <p:extLst>
+      <p:ext uri="{BB962C8B-B14F-4D97-AF65-F5344CB8AC3E}">
+        <p14:creationId xmlns:p14="http://schemas.microsoft.com/office/powerpoint/2010/main" val="2808651156"/>
+      </p:ext>
+    </p:extLst>
   </p:cSld>
   <p:clrMapOvr>
     <a:masterClrMapping/>
@@ -8291,19 +8454,21 @@
               <a:rPr lang="zh-CN" altLang="en-US" dirty="0"/>
               <a:t>相比于之前的系统编程语言必须是更加安全的、不易崩溃的，尤其是在操作内存时</a:t>
             </a:r>
-            <a:endParaRPr lang="zh-CN" altLang="en-US" dirty="0"/>
           </a:p>
           <a:p>
             <a:r>
               <a:rPr lang="zh-CN" altLang="en-US" dirty="0"/>
               <a:t>不需要有垃圾回收系统，不能为了内存安全引入性能负担。不需要垃圾回收的同时也不需要开发者主动手动释放内存。</a:t>
             </a:r>
-            <a:endParaRPr lang="zh-CN" altLang="en-US" dirty="0"/>
           </a:p>
           <a:p>
             <a:r>
               <a:rPr lang="zh-CN" altLang="en-US" dirty="0"/>
-              <a:t>不仅仅拥有一个主要特性、而应该拥有一系列广泛特性，这些特性之间又不缺乏一致性，这些特性之间可以很高的相互协作，从而使该语言更容易编写、维护和调试，让程序员写出更安全、更高效的代码</a:t>
+              <a:t>不仅仅拥有一个主要特性、而应该拥有一系列广泛特性，这些特性之间又不缺乏一致性，这些特性之间可以很高的相互协作，从而使该语言更容易编写、维护和调试，让程序员写出更安全、更高效的</a:t>
+            </a:r>
+            <a:r>
+              <a:rPr lang="zh-CN" altLang="en-US" dirty="0" smtClean="0"/>
+              <a:t>代码。</a:t>
             </a:r>
             <a:endParaRPr lang="zh-CN" altLang="en-US" dirty="0"/>
           </a:p>
@@ -8326,12 +8491,18 @@
           <a:p>
             <a:fld id="{6245CCF4-CF1B-4B4B-B5D0-2221EBE362B5}" type="slidenum">
               <a:rPr lang="zh-CN" altLang="en-US" smtClean="0"/>
+              <a:t>7</a:t>
             </a:fld>
             <a:endParaRPr lang="zh-CN" altLang="en-US"/>
           </a:p>
         </p:txBody>
       </p:sp>
     </p:spTree>
+    <p:extLst>
+      <p:ext uri="{BB962C8B-B14F-4D97-AF65-F5344CB8AC3E}">
+        <p14:creationId xmlns:p14="http://schemas.microsoft.com/office/powerpoint/2010/main" val="3601951598"/>
+      </p:ext>
+    </p:extLst>
   </p:cSld>
   <p:clrMapOvr>
     <a:masterClrMapping/>
@@ -8403,7 +8574,6 @@
               <a:rPr lang="zh-CN" altLang="en-US" dirty="0"/>
               <a:t>中是如何体现这三个原则特性的呢？</a:t>
             </a:r>
-            <a:endParaRPr lang="zh-CN" altLang="en-US" dirty="0"/>
           </a:p>
         </p:txBody>
       </p:sp>
@@ -8424,12 +8594,18 @@
           <a:p>
             <a:fld id="{6245CCF4-CF1B-4B4B-B5D0-2221EBE362B5}" type="slidenum">
               <a:rPr lang="zh-CN" altLang="en-US" smtClean="0"/>
+              <a:t>8</a:t>
             </a:fld>
             <a:endParaRPr lang="zh-CN" altLang="en-US"/>
           </a:p>
         </p:txBody>
       </p:sp>
     </p:spTree>
+    <p:extLst>
+      <p:ext uri="{BB962C8B-B14F-4D97-AF65-F5344CB8AC3E}">
+        <p14:creationId xmlns:p14="http://schemas.microsoft.com/office/powerpoint/2010/main" val="3198523500"/>
+      </p:ext>
+    </p:extLst>
   </p:cSld>
   <p:clrMapOvr>
     <a:masterClrMapping/>
@@ -8498,21 +8674,54 @@
             </a:r>
             <a:r>
               <a:rPr kumimoji="1" lang="zh-CN" altLang="en-US" dirty="0"/>
-              <a:t>建立了强大的内存管理模型。</a:t>
-            </a:r>
-            <a:endParaRPr kumimoji="1" lang="en-US" altLang="zh-CN" dirty="0"/>
-          </a:p>
-          <a:p>
+              <a:t>建立</a:t>
+            </a:r>
+            <a:r>
+              <a:rPr kumimoji="1" lang="zh-CN" altLang="en-US" dirty="0" smtClean="0"/>
+              <a:t>了独特的</a:t>
+            </a:r>
             <a:r>
               <a:rPr kumimoji="1" lang="zh-CN" altLang="en-US" dirty="0"/>
-              <a:t>所有权系统指的是每个被分配的内存都有一个独占其所有权的指针，只有当该指针被销毁时，其对应的内存才会被释放。</a:t>
-            </a:r>
-            <a:endParaRPr kumimoji="1" lang="en-US" altLang="zh-CN" dirty="0"/>
-          </a:p>
-          <a:p>
+              <a:t>内存管理模型</a:t>
+            </a:r>
+            <a:r>
+              <a:rPr kumimoji="1" lang="zh-CN" altLang="en-US" dirty="0" smtClean="0"/>
+              <a:t>。</a:t>
+            </a:r>
+            <a:endParaRPr kumimoji="1" lang="en-US" altLang="zh-CN" dirty="0" smtClean="0"/>
+          </a:p>
+          <a:p>
+            <a:r>
+              <a:rPr kumimoji="1" lang="zh-CN" altLang="en-US" dirty="0" smtClean="0"/>
+              <a:t>所有权</a:t>
+            </a:r>
             <a:r>
               <a:rPr kumimoji="1" lang="zh-CN" altLang="en-US" dirty="0"/>
-              <a:t>借用和生命周期，每个变量都有其生命周期，一旦超出生命周期，变量会被自动释放，如果是借用则可以通过标记生命周期参数供编译器检查，防止出现悬垂引用。</a:t>
+              <a:t>系统指的是每个被分配的内存都有一个独占其所有权的指针，只有当该指针被销毁时，其对应的内存才会被释放</a:t>
+            </a:r>
+            <a:r>
+              <a:rPr kumimoji="1" lang="zh-CN" altLang="en-US" dirty="0" smtClean="0"/>
+              <a:t>。也是基于所有权的基础上，</a:t>
+            </a:r>
+            <a:r>
+              <a:rPr kumimoji="1" lang="en-US" altLang="zh-CN" dirty="0" smtClean="0"/>
+              <a:t>rust</a:t>
+            </a:r>
+            <a:r>
+              <a:rPr kumimoji="1" lang="zh-CN" altLang="en-US" dirty="0" smtClean="0"/>
+              <a:t>实现了无需</a:t>
+            </a:r>
+            <a:r>
+              <a:rPr kumimoji="1" lang="en-US" altLang="zh-CN" dirty="0" smtClean="0"/>
+              <a:t>GC</a:t>
+            </a:r>
+            <a:r>
+              <a:rPr kumimoji="1" lang="zh-CN" altLang="en-US" dirty="0" smtClean="0"/>
+              <a:t>也无需手动管理内存的，内存模型。所有的借用</a:t>
+            </a:r>
+            <a:r>
+              <a:rPr kumimoji="1" lang="zh-CN" altLang="en-US" dirty="0"/>
+              <a:t>和生命周期，每个变量都有其生命周期，一旦超出生命周期，变量会被自动释放，如果是借用则可以通过标记生命周期参数供编译器检查，防止出现悬垂引用。</a:t>
             </a:r>
             <a:endParaRPr kumimoji="1" lang="en-US" altLang="zh-CN" dirty="0"/>
           </a:p>
@@ -8535,12 +8744,18 @@
           <a:p>
             <a:fld id="{6245CCF4-CF1B-4B4B-B5D0-2221EBE362B5}" type="slidenum">
               <a:rPr lang="zh-CN" altLang="en-US" smtClean="0"/>
+              <a:t>9</a:t>
             </a:fld>
             <a:endParaRPr lang="zh-CN" altLang="en-US"/>
           </a:p>
         </p:txBody>
       </p:sp>
     </p:spTree>
+    <p:extLst>
+      <p:ext uri="{BB962C8B-B14F-4D97-AF65-F5344CB8AC3E}">
+        <p14:creationId xmlns:p14="http://schemas.microsoft.com/office/powerpoint/2010/main" val="360185304"/>
+      </p:ext>
+    </p:extLst>
   </p:cSld>
   <p:clrMapOvr>
     <a:masterClrMapping/>
@@ -8594,7 +8809,11 @@
           <a:p>
             <a:r>
               <a:rPr lang="zh-CN" altLang="en-US" dirty="0"/>
-              <a:t>零成本，函数方法生成</a:t>
+              <a:t>零成本，函数方法</a:t>
+            </a:r>
+            <a:r>
+              <a:rPr lang="zh-CN" altLang="en-US" dirty="0" smtClean="0"/>
+              <a:t>生成。零成本</a:t>
             </a:r>
             <a:endParaRPr lang="zh-CN" altLang="en-US" dirty="0"/>
           </a:p>
@@ -8617,12 +8836,18 @@
           <a:p>
             <a:fld id="{6245CCF4-CF1B-4B4B-B5D0-2221EBE362B5}" type="slidenum">
               <a:rPr lang="zh-CN" altLang="en-US" smtClean="0"/>
+              <a:t>10</a:t>
             </a:fld>
             <a:endParaRPr lang="zh-CN" altLang="en-US"/>
           </a:p>
         </p:txBody>
       </p:sp>
     </p:spTree>
+    <p:extLst>
+      <p:ext uri="{BB962C8B-B14F-4D97-AF65-F5344CB8AC3E}">
+        <p14:creationId xmlns:p14="http://schemas.microsoft.com/office/powerpoint/2010/main" val="275810286"/>
+      </p:ext>
+    </p:extLst>
   </p:cSld>
   <p:clrMapOvr>
     <a:masterClrMapping/>
@@ -8686,7 +8911,6 @@
               <a:rPr kumimoji="1" lang="zh-CN" altLang="en-US" dirty="0"/>
               <a:t>，并发</a:t>
             </a:r>
-            <a:endParaRPr kumimoji="1" lang="zh-CN" altLang="en-US" dirty="0"/>
           </a:p>
         </p:txBody>
       </p:sp>
@@ -8707,12 +8931,18 @@
           <a:p>
             <a:fld id="{6245CCF4-CF1B-4B4B-B5D0-2221EBE362B5}" type="slidenum">
               <a:rPr lang="zh-CN" altLang="en-US" smtClean="0"/>
+              <a:t>12</a:t>
             </a:fld>
             <a:endParaRPr lang="zh-CN" altLang="en-US"/>
           </a:p>
         </p:txBody>
       </p:sp>
     </p:spTree>
+    <p:extLst>
+      <p:ext uri="{BB962C8B-B14F-4D97-AF65-F5344CB8AC3E}">
+        <p14:creationId xmlns:p14="http://schemas.microsoft.com/office/powerpoint/2010/main" val="3290587185"/>
+      </p:ext>
+    </p:extLst>
   </p:cSld>
   <p:clrMapOvr>
     <a:masterClrMapping/>
@@ -8906,6 +9136,7 @@
           <a:p>
             <a:fld id="{3CD8EDAB-281B-495C-B3B1-C831B56AA954}" type="datetimeFigureOut">
               <a:rPr lang="zh-CN" altLang="en-US" smtClean="0"/>
+              <a:t>2021/11/30</a:t>
             </a:fld>
             <a:endParaRPr lang="zh-CN" altLang="en-US"/>
           </a:p>
@@ -8947,6 +9178,7 @@
           <a:p>
             <a:fld id="{F813E51F-F931-4312-91EC-86D68240970C}" type="slidenum">
               <a:rPr lang="zh-CN" altLang="en-US" smtClean="0"/>
+              <a:t>‹#›</a:t>
             </a:fld>
             <a:endParaRPr lang="zh-CN" altLang="en-US"/>
           </a:p>
@@ -9154,7 +9386,6 @@
               <a:rPr lang="zh-CN" altLang="en-US"/>
               <a:t>单击此处编辑母版文本样式</a:t>
             </a:r>
-            <a:endParaRPr lang="zh-CN" altLang="en-US"/>
           </a:p>
         </p:txBody>
       </p:sp>
@@ -9175,6 +9406,7 @@
           <a:p>
             <a:fld id="{3CD8EDAB-281B-495C-B3B1-C831B56AA954}" type="datetimeFigureOut">
               <a:rPr lang="zh-CN" altLang="en-US" smtClean="0"/>
+              <a:t>2021/11/30</a:t>
             </a:fld>
             <a:endParaRPr lang="zh-CN" altLang="en-US"/>
           </a:p>
@@ -9216,6 +9448,7 @@
           <a:p>
             <a:fld id="{F813E51F-F931-4312-91EC-86D68240970C}" type="slidenum">
               <a:rPr lang="zh-CN" altLang="en-US" smtClean="0"/>
+              <a:t>‹#›</a:t>
             </a:fld>
             <a:endParaRPr lang="zh-CN" altLang="en-US"/>
           </a:p>
@@ -9342,7 +9575,6 @@
               <a:rPr lang="zh-CN" altLang="en-US"/>
               <a:t>单击此处编辑母版文本样式</a:t>
             </a:r>
-            <a:endParaRPr lang="zh-CN" altLang="en-US"/>
           </a:p>
         </p:txBody>
       </p:sp>
@@ -9363,6 +9595,7 @@
           <a:p>
             <a:fld id="{3CD8EDAB-281B-495C-B3B1-C831B56AA954}" type="datetimeFigureOut">
               <a:rPr lang="zh-CN" altLang="en-US" smtClean="0"/>
+              <a:t>2021/11/30</a:t>
             </a:fld>
             <a:endParaRPr lang="zh-CN" altLang="en-US"/>
           </a:p>
@@ -9404,6 +9637,7 @@
           <a:p>
             <a:fld id="{F813E51F-F931-4312-91EC-86D68240970C}" type="slidenum">
               <a:rPr lang="zh-CN" altLang="en-US" smtClean="0"/>
+              <a:t>‹#›</a:t>
             </a:fld>
             <a:endParaRPr lang="zh-CN" altLang="en-US"/>
           </a:p>
@@ -9542,7 +9776,6 @@
               <a:rPr lang="zh-CN" altLang="en-US"/>
               <a:t>单击此处编辑母版文本样式</a:t>
             </a:r>
-            <a:endParaRPr lang="zh-CN" altLang="en-US"/>
           </a:p>
         </p:txBody>
       </p:sp>
@@ -9610,7 +9843,6 @@
               <a:rPr lang="zh-CN" altLang="en-US"/>
               <a:t>单击此处编辑母版文本样式</a:t>
             </a:r>
-            <a:endParaRPr lang="zh-CN" altLang="en-US"/>
           </a:p>
         </p:txBody>
       </p:sp>
@@ -9631,6 +9863,7 @@
           <a:p>
             <a:fld id="{3CD8EDAB-281B-495C-B3B1-C831B56AA954}" type="datetimeFigureOut">
               <a:rPr lang="zh-CN" altLang="en-US" smtClean="0"/>
+              <a:t>2021/11/30</a:t>
             </a:fld>
             <a:endParaRPr lang="zh-CN" altLang="en-US"/>
           </a:p>
@@ -9672,6 +9905,7 @@
           <a:p>
             <a:fld id="{F813E51F-F931-4312-91EC-86D68240970C}" type="slidenum">
               <a:rPr lang="zh-CN" altLang="en-US" smtClean="0"/>
+              <a:t>‹#›</a:t>
             </a:fld>
             <a:endParaRPr lang="zh-CN" altLang="en-US"/>
           </a:p>
@@ -9721,7 +9955,6 @@
               <a:rPr lang="en-US" dirty="0"/>
               <a:t>“</a:t>
             </a:r>
-            <a:endParaRPr lang="en-US" dirty="0"/>
           </a:p>
         </p:txBody>
       </p:sp>
@@ -9769,7 +10002,6 @@
               <a:rPr lang="en-US" dirty="0"/>
               <a:t>”</a:t>
             </a:r>
-            <a:endParaRPr lang="en-US" dirty="0"/>
           </a:p>
         </p:txBody>
       </p:sp>
@@ -9947,7 +10179,6 @@
               <a:rPr lang="zh-CN" altLang="en-US"/>
               <a:t>单击此处编辑母版文本样式</a:t>
             </a:r>
-            <a:endParaRPr lang="zh-CN" altLang="en-US"/>
           </a:p>
         </p:txBody>
       </p:sp>
@@ -9968,6 +10199,7 @@
           <a:p>
             <a:fld id="{3CD8EDAB-281B-495C-B3B1-C831B56AA954}" type="datetimeFigureOut">
               <a:rPr lang="zh-CN" altLang="en-US" smtClean="0"/>
+              <a:t>2021/11/30</a:t>
             </a:fld>
             <a:endParaRPr lang="zh-CN" altLang="en-US"/>
           </a:p>
@@ -10009,6 +10241,7 @@
           <a:p>
             <a:fld id="{F813E51F-F931-4312-91EC-86D68240970C}" type="slidenum">
               <a:rPr lang="zh-CN" altLang="en-US" smtClean="0"/>
+              <a:t>‹#›</a:t>
             </a:fld>
             <a:endParaRPr lang="zh-CN" altLang="en-US"/>
           </a:p>
@@ -10137,7 +10370,6 @@
               <a:rPr lang="zh-CN" altLang="en-US"/>
               <a:t>单击此处编辑母版文本样式</a:t>
             </a:r>
-            <a:endParaRPr lang="zh-CN" altLang="en-US"/>
           </a:p>
         </p:txBody>
       </p:sp>
@@ -10205,7 +10437,6 @@
               <a:rPr lang="zh-CN" altLang="en-US"/>
               <a:t>单击此处编辑母版文本样式</a:t>
             </a:r>
-            <a:endParaRPr lang="zh-CN" altLang="en-US"/>
           </a:p>
         </p:txBody>
       </p:sp>
@@ -10280,7 +10511,6 @@
               <a:rPr lang="zh-CN" altLang="en-US"/>
               <a:t>单击此处编辑母版文本样式</a:t>
             </a:r>
-            <a:endParaRPr lang="zh-CN" altLang="en-US"/>
           </a:p>
         </p:txBody>
       </p:sp>
@@ -10348,7 +10578,6 @@
               <a:rPr lang="zh-CN" altLang="en-US"/>
               <a:t>单击此处编辑母版文本样式</a:t>
             </a:r>
-            <a:endParaRPr lang="zh-CN" altLang="en-US"/>
           </a:p>
         </p:txBody>
       </p:sp>
@@ -10423,7 +10652,6 @@
               <a:rPr lang="zh-CN" altLang="en-US"/>
               <a:t>单击此处编辑母版文本样式</a:t>
             </a:r>
-            <a:endParaRPr lang="zh-CN" altLang="en-US"/>
           </a:p>
         </p:txBody>
       </p:sp>
@@ -10491,7 +10719,6 @@
               <a:rPr lang="zh-CN" altLang="en-US"/>
               <a:t>单击此处编辑母版文本样式</a:t>
             </a:r>
-            <a:endParaRPr lang="zh-CN" altLang="en-US"/>
           </a:p>
         </p:txBody>
       </p:sp>
@@ -10590,6 +10817,7 @@
           <a:p>
             <a:fld id="{3CD8EDAB-281B-495C-B3B1-C831B56AA954}" type="datetimeFigureOut">
               <a:rPr lang="zh-CN" altLang="en-US" smtClean="0"/>
+              <a:t>2021/11/30</a:t>
             </a:fld>
             <a:endParaRPr lang="zh-CN" altLang="en-US"/>
           </a:p>
@@ -10631,6 +10859,7 @@
           <a:p>
             <a:fld id="{F813E51F-F931-4312-91EC-86D68240970C}" type="slidenum">
               <a:rPr lang="zh-CN" altLang="en-US" smtClean="0"/>
+              <a:t>‹#›</a:t>
             </a:fld>
             <a:endParaRPr lang="zh-CN" altLang="en-US"/>
           </a:p>
@@ -10759,7 +10988,6 @@
               <a:rPr lang="zh-CN" altLang="en-US"/>
               <a:t>单击此处编辑母版文本样式</a:t>
             </a:r>
-            <a:endParaRPr lang="zh-CN" altLang="en-US"/>
           </a:p>
         </p:txBody>
       </p:sp>
@@ -10906,7 +11134,6 @@
               <a:rPr lang="zh-CN" altLang="en-US"/>
               <a:t>单击此处编辑母版文本样式</a:t>
             </a:r>
-            <a:endParaRPr lang="zh-CN" altLang="en-US"/>
           </a:p>
         </p:txBody>
       </p:sp>
@@ -10981,7 +11208,6 @@
               <a:rPr lang="zh-CN" altLang="en-US"/>
               <a:t>单击此处编辑母版文本样式</a:t>
             </a:r>
-            <a:endParaRPr lang="zh-CN" altLang="en-US"/>
           </a:p>
         </p:txBody>
       </p:sp>
@@ -11128,7 +11354,6 @@
               <a:rPr lang="zh-CN" altLang="en-US"/>
               <a:t>单击此处编辑母版文本样式</a:t>
             </a:r>
-            <a:endParaRPr lang="zh-CN" altLang="en-US"/>
           </a:p>
         </p:txBody>
       </p:sp>
@@ -11203,7 +11428,6 @@
               <a:rPr lang="zh-CN" altLang="en-US"/>
               <a:t>单击此处编辑母版文本样式</a:t>
             </a:r>
-            <a:endParaRPr lang="zh-CN" altLang="en-US"/>
           </a:p>
         </p:txBody>
       </p:sp>
@@ -11350,7 +11574,6 @@
               <a:rPr lang="zh-CN" altLang="en-US"/>
               <a:t>单击此处编辑母版文本样式</a:t>
             </a:r>
-            <a:endParaRPr lang="zh-CN" altLang="en-US"/>
           </a:p>
         </p:txBody>
       </p:sp>
@@ -11449,6 +11672,7 @@
           <a:p>
             <a:fld id="{3CD8EDAB-281B-495C-B3B1-C831B56AA954}" type="datetimeFigureOut">
               <a:rPr lang="zh-CN" altLang="en-US" smtClean="0"/>
+              <a:t>2021/11/30</a:t>
             </a:fld>
             <a:endParaRPr lang="zh-CN" altLang="en-US"/>
           </a:p>
@@ -11490,6 +11714,7 @@
           <a:p>
             <a:fld id="{F813E51F-F931-4312-91EC-86D68240970C}" type="slidenum">
               <a:rPr lang="zh-CN" altLang="en-US" smtClean="0"/>
+              <a:t>‹#›</a:t>
             </a:fld>
             <a:endParaRPr lang="zh-CN" altLang="en-US"/>
           </a:p>
@@ -11563,7 +11788,6 @@
               <a:rPr lang="zh-CN" altLang="en-US"/>
               <a:t>单击此处编辑母版文本样式</a:t>
             </a:r>
-            <a:endParaRPr lang="zh-CN" altLang="en-US"/>
           </a:p>
           <a:p>
             <a:pPr lvl="1"/>
@@ -11571,7 +11795,6 @@
               <a:rPr lang="zh-CN" altLang="en-US"/>
               <a:t>第二级</a:t>
             </a:r>
-            <a:endParaRPr lang="zh-CN" altLang="en-US"/>
           </a:p>
           <a:p>
             <a:pPr lvl="2"/>
@@ -11579,7 +11802,6 @@
               <a:rPr lang="zh-CN" altLang="en-US"/>
               <a:t>第三级</a:t>
             </a:r>
-            <a:endParaRPr lang="zh-CN" altLang="en-US"/>
           </a:p>
           <a:p>
             <a:pPr lvl="3"/>
@@ -11587,7 +11809,6 @@
               <a:rPr lang="zh-CN" altLang="en-US"/>
               <a:t>第四级</a:t>
             </a:r>
-            <a:endParaRPr lang="zh-CN" altLang="en-US"/>
           </a:p>
           <a:p>
             <a:pPr lvl="4"/>
@@ -11616,6 +11837,7 @@
           <a:p>
             <a:fld id="{3CD8EDAB-281B-495C-B3B1-C831B56AA954}" type="datetimeFigureOut">
               <a:rPr lang="zh-CN" altLang="en-US" smtClean="0"/>
+              <a:t>2021/11/30</a:t>
             </a:fld>
             <a:endParaRPr lang="zh-CN" altLang="en-US"/>
           </a:p>
@@ -11657,6 +11879,7 @@
           <a:p>
             <a:fld id="{F813E51F-F931-4312-91EC-86D68240970C}" type="slidenum">
               <a:rPr lang="zh-CN" altLang="en-US" smtClean="0"/>
+              <a:t>‹#›</a:t>
             </a:fld>
             <a:endParaRPr lang="zh-CN" altLang="en-US"/>
           </a:p>
@@ -11740,7 +11963,6 @@
               <a:rPr lang="zh-CN" altLang="en-US"/>
               <a:t>单击此处编辑母版文本样式</a:t>
             </a:r>
-            <a:endParaRPr lang="zh-CN" altLang="en-US"/>
           </a:p>
           <a:p>
             <a:pPr lvl="1"/>
@@ -11748,7 +11970,6 @@
               <a:rPr lang="zh-CN" altLang="en-US"/>
               <a:t>第二级</a:t>
             </a:r>
-            <a:endParaRPr lang="zh-CN" altLang="en-US"/>
           </a:p>
           <a:p>
             <a:pPr lvl="2"/>
@@ -11756,7 +11977,6 @@
               <a:rPr lang="zh-CN" altLang="en-US"/>
               <a:t>第三级</a:t>
             </a:r>
-            <a:endParaRPr lang="zh-CN" altLang="en-US"/>
           </a:p>
           <a:p>
             <a:pPr lvl="3"/>
@@ -11764,7 +11984,6 @@
               <a:rPr lang="zh-CN" altLang="en-US"/>
               <a:t>第四级</a:t>
             </a:r>
-            <a:endParaRPr lang="zh-CN" altLang="en-US"/>
           </a:p>
           <a:p>
             <a:pPr lvl="4"/>
@@ -11793,6 +12012,7 @@
           <a:p>
             <a:fld id="{3CD8EDAB-281B-495C-B3B1-C831B56AA954}" type="datetimeFigureOut">
               <a:rPr lang="zh-CN" altLang="en-US" smtClean="0"/>
+              <a:t>2021/11/30</a:t>
             </a:fld>
             <a:endParaRPr lang="zh-CN" altLang="en-US"/>
           </a:p>
@@ -11834,6 +12054,7 @@
           <a:p>
             <a:fld id="{F813E51F-F931-4312-91EC-86D68240970C}" type="slidenum">
               <a:rPr lang="zh-CN" altLang="en-US" smtClean="0"/>
+              <a:t>‹#›</a:t>
             </a:fld>
             <a:endParaRPr lang="zh-CN" altLang="en-US"/>
           </a:p>
@@ -11907,7 +12128,6 @@
               <a:rPr lang="zh-CN" altLang="en-US"/>
               <a:t>单击此处编辑母版文本样式</a:t>
             </a:r>
-            <a:endParaRPr lang="zh-CN" altLang="en-US"/>
           </a:p>
           <a:p>
             <a:pPr lvl="1"/>
@@ -11915,7 +12135,6 @@
               <a:rPr lang="zh-CN" altLang="en-US"/>
               <a:t>第二级</a:t>
             </a:r>
-            <a:endParaRPr lang="zh-CN" altLang="en-US"/>
           </a:p>
           <a:p>
             <a:pPr lvl="2"/>
@@ -11923,7 +12142,6 @@
               <a:rPr lang="zh-CN" altLang="en-US"/>
               <a:t>第三级</a:t>
             </a:r>
-            <a:endParaRPr lang="zh-CN" altLang="en-US"/>
           </a:p>
           <a:p>
             <a:pPr lvl="3"/>
@@ -11931,7 +12149,6 @@
               <a:rPr lang="zh-CN" altLang="en-US"/>
               <a:t>第四级</a:t>
             </a:r>
-            <a:endParaRPr lang="zh-CN" altLang="en-US"/>
           </a:p>
           <a:p>
             <a:pPr lvl="4"/>
@@ -11960,6 +12177,7 @@
           <a:p>
             <a:fld id="{3CD8EDAB-281B-495C-B3B1-C831B56AA954}" type="datetimeFigureOut">
               <a:rPr lang="zh-CN" altLang="en-US" smtClean="0"/>
+              <a:t>2021/11/30</a:t>
             </a:fld>
             <a:endParaRPr lang="zh-CN" altLang="en-US"/>
           </a:p>
@@ -12001,6 +12219,7 @@
           <a:p>
             <a:fld id="{F813E51F-F931-4312-91EC-86D68240970C}" type="slidenum">
               <a:rPr lang="zh-CN" altLang="en-US" smtClean="0"/>
+              <a:t>‹#›</a:t>
             </a:fld>
             <a:endParaRPr lang="zh-CN" altLang="en-US"/>
           </a:p>
@@ -12180,7 +12399,6 @@
               <a:rPr lang="zh-CN" altLang="en-US"/>
               <a:t>单击此处编辑母版文本样式</a:t>
             </a:r>
-            <a:endParaRPr lang="zh-CN" altLang="en-US"/>
           </a:p>
         </p:txBody>
       </p:sp>
@@ -12201,6 +12419,7 @@
           <a:p>
             <a:fld id="{3CD8EDAB-281B-495C-B3B1-C831B56AA954}" type="datetimeFigureOut">
               <a:rPr lang="zh-CN" altLang="en-US" smtClean="0"/>
+              <a:t>2021/11/30</a:t>
             </a:fld>
             <a:endParaRPr lang="zh-CN" altLang="en-US"/>
           </a:p>
@@ -12242,6 +12461,7 @@
           <a:p>
             <a:fld id="{F813E51F-F931-4312-91EC-86D68240970C}" type="slidenum">
               <a:rPr lang="zh-CN" altLang="en-US" smtClean="0"/>
+              <a:t>‹#›</a:t>
             </a:fld>
             <a:endParaRPr lang="zh-CN" altLang="en-US"/>
           </a:p>
@@ -12350,7 +12570,6 @@
               <a:rPr lang="zh-CN" altLang="en-US"/>
               <a:t>单击此处编辑母版文本样式</a:t>
             </a:r>
-            <a:endParaRPr lang="zh-CN" altLang="en-US"/>
           </a:p>
           <a:p>
             <a:pPr lvl="1"/>
@@ -12358,7 +12577,6 @@
               <a:rPr lang="zh-CN" altLang="en-US"/>
               <a:t>第二级</a:t>
             </a:r>
-            <a:endParaRPr lang="zh-CN" altLang="en-US"/>
           </a:p>
           <a:p>
             <a:pPr lvl="2"/>
@@ -12366,7 +12584,6 @@
               <a:rPr lang="zh-CN" altLang="en-US"/>
               <a:t>第三级</a:t>
             </a:r>
-            <a:endParaRPr lang="zh-CN" altLang="en-US"/>
           </a:p>
           <a:p>
             <a:pPr lvl="3"/>
@@ -12374,7 +12591,6 @@
               <a:rPr lang="zh-CN" altLang="en-US"/>
               <a:t>第四级</a:t>
             </a:r>
-            <a:endParaRPr lang="zh-CN" altLang="en-US"/>
           </a:p>
           <a:p>
             <a:pPr lvl="4"/>
@@ -12441,7 +12657,6 @@
               <a:rPr lang="zh-CN" altLang="en-US"/>
               <a:t>单击此处编辑母版文本样式</a:t>
             </a:r>
-            <a:endParaRPr lang="zh-CN" altLang="en-US"/>
           </a:p>
           <a:p>
             <a:pPr lvl="1"/>
@@ -12449,7 +12664,6 @@
               <a:rPr lang="zh-CN" altLang="en-US"/>
               <a:t>第二级</a:t>
             </a:r>
-            <a:endParaRPr lang="zh-CN" altLang="en-US"/>
           </a:p>
           <a:p>
             <a:pPr lvl="2"/>
@@ -12457,7 +12671,6 @@
               <a:rPr lang="zh-CN" altLang="en-US"/>
               <a:t>第三级</a:t>
             </a:r>
-            <a:endParaRPr lang="zh-CN" altLang="en-US"/>
           </a:p>
           <a:p>
             <a:pPr lvl="3"/>
@@ -12465,7 +12678,6 @@
               <a:rPr lang="zh-CN" altLang="en-US"/>
               <a:t>第四级</a:t>
             </a:r>
-            <a:endParaRPr lang="zh-CN" altLang="en-US"/>
           </a:p>
           <a:p>
             <a:pPr lvl="4"/>
@@ -12494,6 +12706,7 @@
           <a:p>
             <a:fld id="{3CD8EDAB-281B-495C-B3B1-C831B56AA954}" type="datetimeFigureOut">
               <a:rPr lang="zh-CN" altLang="en-US" smtClean="0"/>
+              <a:t>2021/11/30</a:t>
             </a:fld>
             <a:endParaRPr lang="zh-CN" altLang="en-US"/>
           </a:p>
@@ -12535,6 +12748,7 @@
           <a:p>
             <a:fld id="{F813E51F-F931-4312-91EC-86D68240970C}" type="slidenum">
               <a:rPr lang="zh-CN" altLang="en-US" smtClean="0"/>
+              <a:t>‹#›</a:t>
             </a:fld>
             <a:endParaRPr lang="zh-CN" altLang="en-US"/>
           </a:p>
@@ -12663,7 +12877,6 @@
               <a:rPr lang="zh-CN" altLang="en-US"/>
               <a:t>单击此处编辑母版文本样式</a:t>
             </a:r>
-            <a:endParaRPr lang="zh-CN" altLang="en-US"/>
           </a:p>
         </p:txBody>
       </p:sp>
@@ -12722,7 +12935,6 @@
               <a:rPr lang="zh-CN" altLang="en-US"/>
               <a:t>单击此处编辑母版文本样式</a:t>
             </a:r>
-            <a:endParaRPr lang="zh-CN" altLang="en-US"/>
           </a:p>
           <a:p>
             <a:pPr lvl="1"/>
@@ -12730,7 +12942,6 @@
               <a:rPr lang="zh-CN" altLang="en-US"/>
               <a:t>第二级</a:t>
             </a:r>
-            <a:endParaRPr lang="zh-CN" altLang="en-US"/>
           </a:p>
           <a:p>
             <a:pPr lvl="2"/>
@@ -12738,7 +12949,6 @@
               <a:rPr lang="zh-CN" altLang="en-US"/>
               <a:t>第三级</a:t>
             </a:r>
-            <a:endParaRPr lang="zh-CN" altLang="en-US"/>
           </a:p>
           <a:p>
             <a:pPr lvl="3"/>
@@ -12746,7 +12956,6 @@
               <a:rPr lang="zh-CN" altLang="en-US"/>
               <a:t>第四级</a:t>
             </a:r>
-            <a:endParaRPr lang="zh-CN" altLang="en-US"/>
           </a:p>
           <a:p>
             <a:pPr lvl="4"/>
@@ -12829,7 +13038,6 @@
               <a:rPr lang="zh-CN" altLang="en-US"/>
               <a:t>单击此处编辑母版文本样式</a:t>
             </a:r>
-            <a:endParaRPr lang="zh-CN" altLang="en-US"/>
           </a:p>
         </p:txBody>
       </p:sp>
@@ -12888,7 +13096,6 @@
               <a:rPr lang="zh-CN" altLang="en-US"/>
               <a:t>单击此处编辑母版文本样式</a:t>
             </a:r>
-            <a:endParaRPr lang="zh-CN" altLang="en-US"/>
           </a:p>
           <a:p>
             <a:pPr lvl="1"/>
@@ -12896,7 +13103,6 @@
               <a:rPr lang="zh-CN" altLang="en-US"/>
               <a:t>第二级</a:t>
             </a:r>
-            <a:endParaRPr lang="zh-CN" altLang="en-US"/>
           </a:p>
           <a:p>
             <a:pPr lvl="2"/>
@@ -12904,7 +13110,6 @@
               <a:rPr lang="zh-CN" altLang="en-US"/>
               <a:t>第三级</a:t>
             </a:r>
-            <a:endParaRPr lang="zh-CN" altLang="en-US"/>
           </a:p>
           <a:p>
             <a:pPr lvl="3"/>
@@ -12912,7 +13117,6 @@
               <a:rPr lang="zh-CN" altLang="en-US"/>
               <a:t>第四级</a:t>
             </a:r>
-            <a:endParaRPr lang="zh-CN" altLang="en-US"/>
           </a:p>
           <a:p>
             <a:pPr lvl="4"/>
@@ -12941,6 +13145,7 @@
           <a:p>
             <a:fld id="{3CD8EDAB-281B-495C-B3B1-C831B56AA954}" type="datetimeFigureOut">
               <a:rPr lang="zh-CN" altLang="en-US" smtClean="0"/>
+              <a:t>2021/11/30</a:t>
             </a:fld>
             <a:endParaRPr lang="zh-CN" altLang="en-US"/>
           </a:p>
@@ -12982,6 +13187,7 @@
           <a:p>
             <a:fld id="{F813E51F-F931-4312-91EC-86D68240970C}" type="slidenum">
               <a:rPr lang="zh-CN" altLang="en-US" smtClean="0"/>
+              <a:t>‹#›</a:t>
             </a:fld>
             <a:endParaRPr lang="zh-CN" altLang="en-US"/>
           </a:p>
@@ -13052,6 +13258,7 @@
           <a:p>
             <a:fld id="{3CD8EDAB-281B-495C-B3B1-C831B56AA954}" type="datetimeFigureOut">
               <a:rPr lang="zh-CN" altLang="en-US" smtClean="0"/>
+              <a:t>2021/11/30</a:t>
             </a:fld>
             <a:endParaRPr lang="zh-CN" altLang="en-US"/>
           </a:p>
@@ -13093,6 +13300,7 @@
           <a:p>
             <a:fld id="{F813E51F-F931-4312-91EC-86D68240970C}" type="slidenum">
               <a:rPr lang="zh-CN" altLang="en-US" smtClean="0"/>
+              <a:t>‹#›</a:t>
             </a:fld>
             <a:endParaRPr lang="zh-CN" altLang="en-US"/>
           </a:p>
@@ -13140,6 +13348,7 @@
           <a:p>
             <a:fld id="{3CD8EDAB-281B-495C-B3B1-C831B56AA954}" type="datetimeFigureOut">
               <a:rPr lang="zh-CN" altLang="en-US" smtClean="0"/>
+              <a:t>2021/11/30</a:t>
             </a:fld>
             <a:endParaRPr lang="zh-CN" altLang="en-US"/>
           </a:p>
@@ -13181,6 +13390,7 @@
           <a:p>
             <a:fld id="{F813E51F-F931-4312-91EC-86D68240970C}" type="slidenum">
               <a:rPr lang="zh-CN" altLang="en-US" smtClean="0"/>
+              <a:t>‹#›</a:t>
             </a:fld>
             <a:endParaRPr lang="zh-CN" altLang="en-US"/>
           </a:p>
@@ -13298,7 +13508,6 @@
               <a:rPr lang="zh-CN" altLang="en-US"/>
               <a:t>单击此处编辑母版文本样式</a:t>
             </a:r>
-            <a:endParaRPr lang="zh-CN" altLang="en-US"/>
           </a:p>
           <a:p>
             <a:pPr lvl="1"/>
@@ -13306,7 +13515,6 @@
               <a:rPr lang="zh-CN" altLang="en-US"/>
               <a:t>第二级</a:t>
             </a:r>
-            <a:endParaRPr lang="zh-CN" altLang="en-US"/>
           </a:p>
           <a:p>
             <a:pPr lvl="2"/>
@@ -13314,7 +13522,6 @@
               <a:rPr lang="zh-CN" altLang="en-US"/>
               <a:t>第三级</a:t>
             </a:r>
-            <a:endParaRPr lang="zh-CN" altLang="en-US"/>
           </a:p>
           <a:p>
             <a:pPr lvl="3"/>
@@ -13322,7 +13529,6 @@
               <a:rPr lang="zh-CN" altLang="en-US"/>
               <a:t>第四级</a:t>
             </a:r>
-            <a:endParaRPr lang="zh-CN" altLang="en-US"/>
           </a:p>
           <a:p>
             <a:pPr lvl="4"/>
@@ -13396,7 +13602,6 @@
               <a:rPr lang="zh-CN" altLang="en-US"/>
               <a:t>单击此处编辑母版文本样式</a:t>
             </a:r>
-            <a:endParaRPr lang="zh-CN" altLang="en-US"/>
           </a:p>
         </p:txBody>
       </p:sp>
@@ -13417,6 +13622,7 @@
           <a:p>
             <a:fld id="{3CD8EDAB-281B-495C-B3B1-C831B56AA954}" type="datetimeFigureOut">
               <a:rPr lang="zh-CN" altLang="en-US" smtClean="0"/>
+              <a:t>2021/11/30</a:t>
             </a:fld>
             <a:endParaRPr lang="zh-CN" altLang="en-US"/>
           </a:p>
@@ -13458,6 +13664,7 @@
           <a:p>
             <a:fld id="{F813E51F-F931-4312-91EC-86D68240970C}" type="slidenum">
               <a:rPr lang="zh-CN" altLang="en-US" smtClean="0"/>
+              <a:t>‹#›</a:t>
             </a:fld>
             <a:endParaRPr lang="zh-CN" altLang="en-US"/>
           </a:p>
@@ -13665,7 +13872,6 @@
               <a:rPr lang="zh-CN" altLang="en-US"/>
               <a:t>单击此处编辑母版文本样式</a:t>
             </a:r>
-            <a:endParaRPr lang="zh-CN" altLang="en-US"/>
           </a:p>
         </p:txBody>
       </p:sp>
@@ -13686,6 +13892,7 @@
           <a:p>
             <a:fld id="{3CD8EDAB-281B-495C-B3B1-C831B56AA954}" type="datetimeFigureOut">
               <a:rPr lang="zh-CN" altLang="en-US" smtClean="0"/>
+              <a:t>2021/11/30</a:t>
             </a:fld>
             <a:endParaRPr lang="zh-CN" altLang="en-US"/>
           </a:p>
@@ -13727,6 +13934,7 @@
           <a:p>
             <a:fld id="{F813E51F-F931-4312-91EC-86D68240970C}" type="slidenum">
               <a:rPr lang="zh-CN" altLang="en-US" smtClean="0"/>
+              <a:t>‹#›</a:t>
             </a:fld>
             <a:endParaRPr lang="zh-CN" altLang="en-US"/>
           </a:p>
@@ -13771,7 +13979,7 @@
           <p:nvPr/>
         </p:nvPicPr>
         <p:blipFill rotWithShape="1">
-          <a:blip r:embed="rId18">
+          <a:blip r:embed="rId19">
             <a:extLst>
               <a:ext uri="{28A0092B-C50C-407E-A947-70E740481C1C}">
                 <a14:useLocalDpi xmlns:a14="http://schemas.microsoft.com/office/drawing/2010/main" val="0"/>
@@ -13802,7 +14010,7 @@
           <p:nvPr/>
         </p:nvPicPr>
         <p:blipFill rotWithShape="1">
-          <a:blip r:embed="rId19">
+          <a:blip r:embed="rId20">
             <a:extLst>
               <a:ext uri="{28A0092B-C50C-407E-A947-70E740481C1C}">
                 <a14:useLocalDpi xmlns:a14="http://schemas.microsoft.com/office/drawing/2010/main" val="0"/>
@@ -13896,7 +14104,7 @@
           <p:nvPr/>
         </p:nvPicPr>
         <p:blipFill rotWithShape="1">
-          <a:blip r:embed="rId20">
+          <a:blip r:embed="rId21">
             <a:extLst>
               <a:ext uri="{28A0092B-C50C-407E-A947-70E740481C1C}">
                 <a14:useLocalDpi xmlns:a14="http://schemas.microsoft.com/office/drawing/2010/main" val="0"/>
@@ -13927,7 +14135,7 @@
           <p:nvPr/>
         </p:nvPicPr>
         <p:blipFill rotWithShape="1">
-          <a:blip r:embed="rId21">
+          <a:blip r:embed="rId22">
             <a:extLst>
               <a:ext uri="{28A0092B-C50C-407E-A947-70E740481C1C}">
                 <a14:useLocalDpi xmlns:a14="http://schemas.microsoft.com/office/drawing/2010/main" val="0"/>
@@ -14048,7 +14256,6 @@
               <a:rPr lang="zh-CN" altLang="en-US"/>
               <a:t>单击此处编辑母版文本样式</a:t>
             </a:r>
-            <a:endParaRPr lang="zh-CN" altLang="en-US"/>
           </a:p>
           <a:p>
             <a:pPr lvl="1"/>
@@ -14056,7 +14263,6 @@
               <a:rPr lang="zh-CN" altLang="en-US"/>
               <a:t>第二级</a:t>
             </a:r>
-            <a:endParaRPr lang="zh-CN" altLang="en-US"/>
           </a:p>
           <a:p>
             <a:pPr lvl="2"/>
@@ -14064,7 +14270,6 @@
               <a:rPr lang="zh-CN" altLang="en-US"/>
               <a:t>第三级</a:t>
             </a:r>
-            <a:endParaRPr lang="zh-CN" altLang="en-US"/>
           </a:p>
           <a:p>
             <a:pPr lvl="3"/>
@@ -14072,7 +14277,6 @@
               <a:rPr lang="zh-CN" altLang="en-US"/>
               <a:t>第四级</a:t>
             </a:r>
-            <a:endParaRPr lang="zh-CN" altLang="en-US"/>
           </a:p>
           <a:p>
             <a:pPr lvl="4"/>
@@ -14120,6 +14324,7 @@
           <a:p>
             <a:fld id="{3CD8EDAB-281B-495C-B3B1-C831B56AA954}" type="datetimeFigureOut">
               <a:rPr lang="zh-CN" altLang="en-US" smtClean="0"/>
+              <a:t>2021/11/30</a:t>
             </a:fld>
             <a:endParaRPr lang="zh-CN" altLang="en-US"/>
           </a:p>
@@ -14198,6 +14403,7 @@
           <a:p>
             <a:fld id="{F813E51F-F931-4312-91EC-86D68240970C}" type="slidenum">
               <a:rPr lang="zh-CN" altLang="en-US" smtClean="0"/>
+              <a:t>‹#›</a:t>
             </a:fld>
             <a:endParaRPr lang="zh-CN" altLang="en-US"/>
           </a:p>
@@ -14674,9 +14880,6 @@
               </a:rPr>
               <a:t>调研</a:t>
             </a:r>
-            <a:endParaRPr lang="zh-CN" altLang="en-US" dirty="0">
-              <a:latin typeface="+mj-ea"/>
-            </a:endParaRPr>
           </a:p>
         </p:txBody>
       </p:sp>
@@ -14727,10 +14930,22 @@
               <a:t>Rust</a:t>
             </a:r>
             <a:r>
-              <a:rPr lang="zh-CN" altLang="en-US" dirty="0">
+              <a:rPr lang="zh-CN" altLang="en-US" dirty="0" smtClean="0">
                 <a:latin typeface="+mj-ea"/>
               </a:rPr>
               <a:t>简介</a:t>
+            </a:r>
+            <a:r>
+              <a:rPr lang="en-US" altLang="zh-CN" dirty="0" smtClean="0">
+                <a:latin typeface="+mj-ea"/>
+              </a:rPr>
+              <a:t>-</a:t>
+            </a:r>
+            <a:r>
+              <a:rPr lang="zh-CN" altLang="en-US" dirty="0" smtClean="0">
+                <a:latin typeface="+mj-ea"/>
+              </a:rPr>
+              <a:t>特性</a:t>
             </a:r>
             <a:endParaRPr lang="zh-CN" altLang="en-US" dirty="0">
               <a:latin typeface="+mj-ea"/>
@@ -14765,9 +14980,26 @@
             </a:pPr>
             <a:r>
               <a:rPr lang="en-US" altLang="zh-CN" dirty="0"/>
-              <a:t>	- trait</a:t>
-            </a:r>
-            <a:endParaRPr lang="en-US" altLang="zh-CN" dirty="0"/>
+              <a:t>	- </a:t>
+            </a:r>
+            <a:r>
+              <a:rPr lang="en-US" altLang="zh-CN" dirty="0" smtClean="0">
+                <a:latin typeface="Times New Roman" panose="02020603050405020304" pitchFamily="18" charset="0"/>
+                <a:cs typeface="Times New Roman" panose="02020603050405020304" pitchFamily="18" charset="0"/>
+              </a:rPr>
+              <a:t>trait</a:t>
+            </a:r>
+            <a:r>
+              <a:rPr lang="zh-CN" altLang="en-US" dirty="0" smtClean="0">
+                <a:latin typeface="Times New Roman" panose="02020603050405020304" pitchFamily="18" charset="0"/>
+                <a:cs typeface="Times New Roman" panose="02020603050405020304" pitchFamily="18" charset="0"/>
+              </a:rPr>
+              <a:t>（限定）</a:t>
+            </a:r>
+            <a:endParaRPr lang="en-US" altLang="zh-CN" dirty="0">
+              <a:latin typeface="Times New Roman" panose="02020603050405020304" pitchFamily="18" charset="0"/>
+              <a:cs typeface="Times New Roman" panose="02020603050405020304" pitchFamily="18" charset="0"/>
+            </a:endParaRPr>
           </a:p>
           <a:p>
             <a:pPr marL="0" indent="0">
@@ -14779,8 +15011,18 @@
             </a:r>
             <a:r>
               <a:rPr lang="zh-CN" altLang="en-US" dirty="0"/>
-              <a:t>泛型</a:t>
-            </a:r>
+              <a:t>泛</a:t>
+            </a:r>
+            <a:r>
+              <a:rPr lang="zh-CN" altLang="en-US" dirty="0" smtClean="0"/>
+              <a:t>型</a:t>
+            </a:r>
+            <a:endParaRPr lang="en-US" altLang="zh-CN" dirty="0" smtClean="0"/>
+          </a:p>
+          <a:p>
+            <a:pPr marL="0" indent="0">
+              <a:buNone/>
+            </a:pPr>
             <a:endParaRPr lang="en-US" altLang="zh-CN" dirty="0"/>
           </a:p>
         </p:txBody>
@@ -14832,10 +15074,22 @@
               <a:t>Rust</a:t>
             </a:r>
             <a:r>
-              <a:rPr lang="zh-CN" altLang="en-US" dirty="0">
+              <a:rPr lang="zh-CN" altLang="en-US" dirty="0" smtClean="0">
                 <a:latin typeface="+mj-ea"/>
               </a:rPr>
               <a:t>简介</a:t>
+            </a:r>
+            <a:r>
+              <a:rPr lang="en-US" altLang="zh-CN" dirty="0" smtClean="0">
+                <a:latin typeface="+mj-ea"/>
+              </a:rPr>
+              <a:t>-</a:t>
+            </a:r>
+            <a:r>
+              <a:rPr lang="zh-CN" altLang="en-US" dirty="0" smtClean="0">
+                <a:latin typeface="+mj-ea"/>
+              </a:rPr>
+              <a:t>特性</a:t>
             </a:r>
             <a:endParaRPr lang="zh-CN" altLang="en-US" dirty="0">
               <a:latin typeface="+mj-ea"/>
@@ -14983,10 +15237,22 @@
               <a:t>Rust</a:t>
             </a:r>
             <a:r>
-              <a:rPr lang="zh-CN" altLang="en-US" dirty="0">
+              <a:rPr lang="zh-CN" altLang="en-US" dirty="0" smtClean="0">
                 <a:latin typeface="+mj-ea"/>
               </a:rPr>
               <a:t>简介</a:t>
+            </a:r>
+            <a:r>
+              <a:rPr lang="en-US" altLang="zh-CN" dirty="0" smtClean="0">
+                <a:latin typeface="+mj-ea"/>
+              </a:rPr>
+              <a:t>-</a:t>
+            </a:r>
+            <a:r>
+              <a:rPr lang="zh-CN" altLang="en-US" dirty="0" smtClean="0">
+                <a:latin typeface="+mj-ea"/>
+              </a:rPr>
+              <a:t>优劣</a:t>
             </a:r>
             <a:endParaRPr lang="zh-CN" altLang="en-US" dirty="0">
               <a:latin typeface="+mj-ea"/>
@@ -15042,9 +15308,25 @@
             <a:pPr lvl="1"/>
             <a:r>
               <a:rPr lang="zh-CN" altLang="en-US" dirty="0"/>
-              <a:t>学习曲线陡峭</a:t>
-            </a:r>
-            <a:endParaRPr lang="en-US" altLang="zh-CN" dirty="0"/>
+              <a:t>学习曲线</a:t>
+            </a:r>
+            <a:r>
+              <a:rPr lang="zh-CN" altLang="en-US" dirty="0" smtClean="0"/>
+              <a:t>陡峭</a:t>
+            </a:r>
+            <a:endParaRPr lang="en-US" altLang="zh-CN" dirty="0" smtClean="0"/>
+          </a:p>
+          <a:p>
+            <a:pPr lvl="1"/>
+            <a:r>
+              <a:rPr lang="zh-CN" altLang="en-US" dirty="0"/>
+              <a:t>生态不够</a:t>
+            </a:r>
+            <a:r>
+              <a:rPr lang="zh-CN" altLang="en-US" dirty="0" smtClean="0"/>
+              <a:t>丰富</a:t>
+            </a:r>
+            <a:endParaRPr lang="zh-CN" altLang="en-US" dirty="0"/>
           </a:p>
         </p:txBody>
       </p:sp>
@@ -15095,10 +15377,22 @@
               <a:t>Rust</a:t>
             </a:r>
             <a:r>
-              <a:rPr lang="zh-CN" altLang="en-US" dirty="0">
+              <a:rPr lang="zh-CN" altLang="en-US" dirty="0" smtClean="0">
                 <a:latin typeface="+mj-ea"/>
               </a:rPr>
               <a:t>简介</a:t>
+            </a:r>
+            <a:r>
+              <a:rPr lang="en-US" altLang="zh-CN" dirty="0" smtClean="0">
+                <a:latin typeface="+mj-ea"/>
+              </a:rPr>
+              <a:t>-</a:t>
+            </a:r>
+            <a:r>
+              <a:rPr lang="zh-CN" altLang="en-US" dirty="0" smtClean="0">
+                <a:latin typeface="+mj-ea"/>
+              </a:rPr>
+              <a:t>优劣</a:t>
             </a:r>
             <a:endParaRPr lang="zh-CN" altLang="en-US" dirty="0">
               <a:latin typeface="+mj-ea"/>
@@ -15132,7 +15426,6 @@
               <a:rPr lang="zh-CN" altLang="en-US" dirty="0"/>
               <a:t>生态不够丰富</a:t>
             </a:r>
-            <a:endParaRPr lang="zh-CN" altLang="en-US" dirty="0"/>
           </a:p>
         </p:txBody>
       </p:sp>
@@ -15177,14 +15470,32 @@
           <a:lstStyle/>
           <a:p>
             <a:r>
-              <a:rPr kumimoji="1" lang="en-US" altLang="zh-CN" dirty="0"/>
+              <a:rPr lang="en-US" altLang="zh-CN" dirty="0">
+                <a:latin typeface="+mj-ea"/>
+              </a:rPr>
               <a:t>Rust</a:t>
             </a:r>
             <a:r>
-              <a:rPr kumimoji="1" lang="zh-CN" altLang="en-US" dirty="0"/>
+              <a:rPr lang="zh-CN" altLang="en-US" dirty="0" smtClean="0">
+                <a:latin typeface="+mj-ea"/>
+              </a:rPr>
               <a:t>简介</a:t>
             </a:r>
-            <a:endParaRPr kumimoji="1" lang="zh-CN" altLang="en-US" dirty="0"/>
+            <a:r>
+              <a:rPr lang="en-US" altLang="zh-CN" dirty="0" smtClean="0">
+                <a:latin typeface="+mj-ea"/>
+              </a:rPr>
+              <a:t>-</a:t>
+            </a:r>
+            <a:r>
+              <a:rPr lang="zh-CN" altLang="en-US" dirty="0" smtClean="0">
+                <a:latin typeface="+mj-ea"/>
+              </a:rPr>
+              <a:t>优劣</a:t>
+            </a:r>
+            <a:endParaRPr lang="zh-CN" altLang="en-US" dirty="0">
+              <a:latin typeface="+mj-ea"/>
+            </a:endParaRPr>
           </a:p>
         </p:txBody>
       </p:sp>
@@ -15203,59 +15514,23 @@
           <a:bodyPr/>
           <a:lstStyle/>
           <a:p>
-            <a:r>
-              <a:rPr kumimoji="1" lang="zh-CN" altLang="en-US" dirty="0"/>
-              <a:t>项目</a:t>
-            </a:r>
-            <a:endParaRPr kumimoji="1" lang="zh-CN" altLang="en-US" dirty="0"/>
-          </a:p>
-          <a:p>
-            <a:r>
-              <a:rPr kumimoji="1" lang="zh-CN" altLang="en-US" dirty="0"/>
-              <a:t>基础库，</a:t>
-            </a:r>
-            <a:r>
-              <a:rPr kumimoji="1" lang="en-US" altLang="zh-CN" dirty="0"/>
-              <a:t>io</a:t>
-            </a:r>
-            <a:r>
-              <a:rPr kumimoji="1" lang="zh-CN" altLang="en-US" dirty="0"/>
-              <a:t>，网络，数据库，集中在云计算</a:t>
-            </a:r>
-            <a:endParaRPr kumimoji="1" lang="zh-CN" altLang="en-US" dirty="0"/>
-          </a:p>
-          <a:p>
-            <a:r>
-              <a:rPr kumimoji="1" lang="zh-CN" altLang="en-US" dirty="0"/>
-              <a:t>上层应用，典型的产品，</a:t>
-            </a:r>
-            <a:r>
-              <a:rPr kumimoji="1" lang="en-US" altLang="zh-CN" dirty="0"/>
-              <a:t>go-docker,rust-db,linkerd-proxy,2.0</a:t>
-            </a:r>
-            <a:r>
-              <a:rPr kumimoji="1" lang="zh-CN" altLang="en-US" dirty="0"/>
-              <a:t>（</a:t>
-            </a:r>
-            <a:r>
-              <a:rPr kumimoji="1" lang="en-US" altLang="zh-CN" dirty="0"/>
-              <a:t>envoy</a:t>
-            </a:r>
-            <a:r>
-              <a:rPr kumimoji="1" lang="zh-CN" altLang="en-US" dirty="0"/>
-              <a:t>）</a:t>
-            </a:r>
-            <a:endParaRPr kumimoji="1" lang="zh-CN" altLang="en-US" dirty="0"/>
-          </a:p>
-          <a:p>
             <a:pPr marL="0" indent="0">
               <a:buNone/>
             </a:pPr>
-            <a:endParaRPr kumimoji="1" lang="zh-CN" altLang="en-US" dirty="0"/>
+            <a:r>
+              <a:rPr lang="zh-CN" altLang="en-US" dirty="0" smtClean="0"/>
+              <a:t>图（学习曲线图）</a:t>
+            </a:r>
+            <a:endParaRPr lang="en-US" altLang="zh-CN" dirty="0"/>
           </a:p>
         </p:txBody>
       </p:sp>
     </p:spTree>
+    <p:extLst>
+      <p:ext uri="{BB962C8B-B14F-4D97-AF65-F5344CB8AC3E}">
+        <p14:creationId xmlns:p14="http://schemas.microsoft.com/office/powerpoint/2010/main" val="2341056355"/>
+      </p:ext>
+    </p:extLst>
   </p:cSld>
   <p:clrMapOvr>
     <a:masterClrMapping/>
@@ -15296,8 +15571,16 @@
           <a:lstStyle/>
           <a:p>
             <a:r>
-              <a:rPr lang="zh-CN" altLang="en-US" dirty="0"/>
-              <a:t>相关资料</a:t>
+              <a:rPr kumimoji="1" lang="en-US" altLang="zh-CN" dirty="0" smtClean="0">
+                <a:latin typeface="+mj-ea"/>
+              </a:rPr>
+              <a:t>Rust</a:t>
+            </a:r>
+            <a:r>
+              <a:rPr kumimoji="1" lang="zh-CN" altLang="en-US" dirty="0" smtClean="0">
+                <a:latin typeface="+mj-ea"/>
+              </a:rPr>
+              <a:t>生态和应用</a:t>
             </a:r>
             <a:endParaRPr lang="zh-CN" altLang="en-US" dirty="0"/>
           </a:p>
@@ -15318,11 +15601,246 @@
           <a:bodyPr/>
           <a:lstStyle/>
           <a:p>
+            <a:pPr marL="0" indent="0">
+              <a:buNone/>
+            </a:pPr>
+            <a:r>
+              <a:rPr kumimoji="1" lang="zh-CN" altLang="en-US" dirty="0" smtClean="0"/>
+              <a:t>基础</a:t>
+            </a:r>
+            <a:r>
+              <a:rPr kumimoji="1" lang="zh-CN" altLang="en-US" dirty="0"/>
+              <a:t>库，</a:t>
+            </a:r>
+            <a:r>
+              <a:rPr kumimoji="1" lang="en-US" altLang="zh-CN" dirty="0" err="1"/>
+              <a:t>io</a:t>
+            </a:r>
+            <a:r>
+              <a:rPr kumimoji="1" lang="zh-CN" altLang="en-US" dirty="0"/>
+              <a:t>，网络，数据库，集中在云计算</a:t>
+            </a:r>
+          </a:p>
+          <a:p>
+            <a:pPr marL="0" indent="0">
+              <a:buNone/>
+            </a:pPr>
+            <a:r>
+              <a:rPr kumimoji="1" lang="zh-CN" altLang="en-US" dirty="0"/>
+              <a:t>上层应用，典型的产品，</a:t>
+            </a:r>
+            <a:r>
+              <a:rPr kumimoji="1" lang="en-US" altLang="zh-CN" dirty="0"/>
+              <a:t>go-docker,rust-db,linkerd-proxy,2.0</a:t>
+            </a:r>
+            <a:r>
+              <a:rPr kumimoji="1" lang="zh-CN" altLang="en-US" dirty="0"/>
+              <a:t>（</a:t>
+            </a:r>
+            <a:r>
+              <a:rPr kumimoji="1" lang="en-US" altLang="zh-CN" dirty="0"/>
+              <a:t>envoy</a:t>
+            </a:r>
+            <a:r>
+              <a:rPr kumimoji="1" lang="zh-CN" altLang="en-US" dirty="0" smtClean="0"/>
+              <a:t>）</a:t>
+            </a:r>
+            <a:endParaRPr kumimoji="1" lang="zh-CN" altLang="en-US" dirty="0"/>
+          </a:p>
+        </p:txBody>
+      </p:sp>
+    </p:spTree>
+    <p:extLst>
+      <p:ext uri="{BB962C8B-B14F-4D97-AF65-F5344CB8AC3E}">
+        <p14:creationId xmlns:p14="http://schemas.microsoft.com/office/powerpoint/2010/main" val="3376935449"/>
+      </p:ext>
+    </p:extLst>
+  </p:cSld>
+  <p:clrMapOvr>
+    <a:masterClrMapping/>
+  </p:clrMapOvr>
+</p:sld>
+</file>
+
+<file path=ppt/slides/slide16.xml><?xml version="1.0" encoding="utf-8"?>
+<p:sld xmlns:a="http://schemas.openxmlformats.org/drawingml/2006/main" xmlns:r="http://schemas.openxmlformats.org/officeDocument/2006/relationships" xmlns:p="http://schemas.openxmlformats.org/presentationml/2006/main">
+  <p:cSld>
+    <p:spTree>
+      <p:nvGrpSpPr>
+        <p:cNvPr id="1" name=""/>
+        <p:cNvGrpSpPr/>
+        <p:nvPr/>
+      </p:nvGrpSpPr>
+      <p:grpSpPr>
+        <a:xfrm>
+          <a:off x="0" y="0"/>
+          <a:ext cx="0" cy="0"/>
+          <a:chOff x="0" y="0"/>
+          <a:chExt cx="0" cy="0"/>
+        </a:xfrm>
+      </p:grpSpPr>
+      <p:sp>
+        <p:nvSpPr>
+          <p:cNvPr id="2" name="标题 1"/>
+          <p:cNvSpPr>
+            <a:spLocks noGrp="1"/>
+          </p:cNvSpPr>
+          <p:nvPr>
+            <p:ph type="title"/>
+          </p:nvPr>
+        </p:nvSpPr>
+        <p:spPr/>
+        <p:txBody>
+          <a:bodyPr/>
+          <a:lstStyle/>
+          <a:p>
+            <a:r>
+              <a:rPr kumimoji="1" lang="en-US" altLang="zh-CN" dirty="0" smtClean="0">
+                <a:latin typeface="+mj-ea"/>
+              </a:rPr>
+              <a:t>Rust</a:t>
+            </a:r>
+            <a:r>
+              <a:rPr kumimoji="1" lang="zh-CN" altLang="en-US" dirty="0" smtClean="0">
+                <a:latin typeface="+mj-ea"/>
+              </a:rPr>
+              <a:t>生态和应用</a:t>
+            </a:r>
+            <a:endParaRPr lang="zh-CN" altLang="en-US" dirty="0"/>
+          </a:p>
+        </p:txBody>
+      </p:sp>
+      <p:sp>
+        <p:nvSpPr>
+          <p:cNvPr id="3" name="内容占位符 2"/>
+          <p:cNvSpPr>
+            <a:spLocks noGrp="1"/>
+          </p:cNvSpPr>
+          <p:nvPr>
+            <p:ph idx="1"/>
+          </p:nvPr>
+        </p:nvSpPr>
+        <p:spPr/>
+        <p:txBody>
+          <a:bodyPr/>
+          <a:lstStyle/>
+          <a:p>
+            <a:r>
+              <a:rPr kumimoji="1" lang="en-US" altLang="zh-CN" dirty="0" err="1" smtClean="0">
+                <a:latin typeface="Times New Roman" panose="02020603050405020304" pitchFamily="18" charset="0"/>
+                <a:cs typeface="Times New Roman" panose="02020603050405020304" pitchFamily="18" charset="0"/>
+              </a:rPr>
+              <a:t>Tokio</a:t>
+            </a:r>
+            <a:r>
+              <a:rPr kumimoji="1" lang="zh-CN" altLang="en-US" dirty="0" smtClean="0">
+                <a:latin typeface="Times New Roman" panose="02020603050405020304" pitchFamily="18" charset="0"/>
+                <a:cs typeface="Times New Roman" panose="02020603050405020304" pitchFamily="18" charset="0"/>
+              </a:rPr>
+              <a:t>、</a:t>
+            </a:r>
+            <a:r>
+              <a:rPr kumimoji="1" lang="en-US" altLang="zh-CN" dirty="0" err="1" smtClean="0">
+                <a:latin typeface="Times New Roman" panose="02020603050405020304" pitchFamily="18" charset="0"/>
+                <a:cs typeface="Times New Roman" panose="02020603050405020304" pitchFamily="18" charset="0"/>
+              </a:rPr>
+              <a:t>Tokio_uring</a:t>
+            </a:r>
+            <a:endParaRPr kumimoji="1" lang="en-US" altLang="zh-CN" dirty="0" smtClean="0">
+              <a:latin typeface="Times New Roman" panose="02020603050405020304" pitchFamily="18" charset="0"/>
+              <a:cs typeface="Times New Roman" panose="02020603050405020304" pitchFamily="18" charset="0"/>
+            </a:endParaRPr>
+          </a:p>
+          <a:p>
+            <a:pPr marL="0" indent="0">
+              <a:buNone/>
+            </a:pPr>
+            <a:r>
+              <a:rPr kumimoji="1" lang="zh-CN" altLang="en-US" dirty="0" smtClean="0">
+                <a:latin typeface="Times New Roman" panose="02020603050405020304" pitchFamily="18" charset="0"/>
+                <a:cs typeface="Times New Roman" panose="02020603050405020304" pitchFamily="18" charset="0"/>
+              </a:rPr>
+              <a:t>基础网络库</a:t>
+            </a:r>
+            <a:endParaRPr kumimoji="1" lang="en-US" altLang="zh-CN" dirty="0">
+              <a:latin typeface="Times New Roman" panose="02020603050405020304" pitchFamily="18" charset="0"/>
+              <a:cs typeface="Times New Roman" panose="02020603050405020304" pitchFamily="18" charset="0"/>
+            </a:endParaRPr>
+          </a:p>
+        </p:txBody>
+      </p:sp>
+    </p:spTree>
+    <p:extLst>
+      <p:ext uri="{BB962C8B-B14F-4D97-AF65-F5344CB8AC3E}">
+        <p14:creationId xmlns:p14="http://schemas.microsoft.com/office/powerpoint/2010/main" val="1174511585"/>
+      </p:ext>
+    </p:extLst>
+  </p:cSld>
+  <p:clrMapOvr>
+    <a:masterClrMapping/>
+  </p:clrMapOvr>
+</p:sld>
+</file>
+
+<file path=ppt/slides/slide17.xml><?xml version="1.0" encoding="utf-8"?>
+<p:sld xmlns:a="http://schemas.openxmlformats.org/drawingml/2006/main" xmlns:r="http://schemas.openxmlformats.org/officeDocument/2006/relationships" xmlns:p="http://schemas.openxmlformats.org/presentationml/2006/main">
+  <p:cSld>
+    <p:spTree>
+      <p:nvGrpSpPr>
+        <p:cNvPr id="1" name=""/>
+        <p:cNvGrpSpPr/>
+        <p:nvPr/>
+      </p:nvGrpSpPr>
+      <p:grpSpPr>
+        <a:xfrm>
+          <a:off x="0" y="0"/>
+          <a:ext cx="0" cy="0"/>
+          <a:chOff x="0" y="0"/>
+          <a:chExt cx="0" cy="0"/>
+        </a:xfrm>
+      </p:grpSpPr>
+      <p:sp>
+        <p:nvSpPr>
+          <p:cNvPr id="2" name="标题 1"/>
+          <p:cNvSpPr>
+            <a:spLocks noGrp="1"/>
+          </p:cNvSpPr>
+          <p:nvPr>
+            <p:ph type="title"/>
+          </p:nvPr>
+        </p:nvSpPr>
+        <p:spPr/>
+        <p:txBody>
+          <a:bodyPr/>
+          <a:lstStyle/>
+          <a:p>
+            <a:r>
+              <a:rPr lang="zh-CN" altLang="en-US" dirty="0"/>
+              <a:t>相关资料</a:t>
+            </a:r>
+          </a:p>
+        </p:txBody>
+      </p:sp>
+      <p:sp>
+        <p:nvSpPr>
+          <p:cNvPr id="3" name="内容占位符 2"/>
+          <p:cNvSpPr>
+            <a:spLocks noGrp="1"/>
+          </p:cNvSpPr>
+          <p:nvPr>
+            <p:ph idx="1"/>
+          </p:nvPr>
+        </p:nvSpPr>
+        <p:spPr/>
+        <p:txBody>
+          <a:bodyPr/>
+          <a:lstStyle/>
+          <a:p>
             <a:r>
               <a:rPr lang="en-US" altLang="zh-CN" dirty="0">
                 <a:latin typeface="Times New Roman" panose="02020603050405020304" pitchFamily="18" charset="0"/>
                 <a:cs typeface="Times New Roman" panose="02020603050405020304" pitchFamily="18" charset="0"/>
-                <a:hlinkClick r:id="rId1"/>
+                <a:hlinkClick r:id="rId2"/>
               </a:rPr>
               <a:t>http://venge.net/graydon/talks/intro-talk-2.pdf</a:t>
             </a:r>
@@ -15399,7 +15917,7 @@
               <a:rPr lang="en-US" altLang="zh-CN" dirty="0">
                 <a:latin typeface="Times New Roman" panose="02020603050405020304" pitchFamily="18" charset="0"/>
                 <a:cs typeface="Times New Roman" panose="02020603050405020304" pitchFamily="18" charset="0"/>
-                <a:hlinkClick r:id="rId2"/>
+                <a:hlinkClick r:id="rId3"/>
               </a:rPr>
               <a:t>https://foundation.rust-lang.org/</a:t>
             </a:r>
@@ -15417,10 +15935,6 @@
               </a:rPr>
               <a:t>基金会官网</a:t>
             </a:r>
-            <a:endParaRPr lang="zh-CN" altLang="en-US" dirty="0">
-              <a:latin typeface="Times New Roman" panose="02020603050405020304" pitchFamily="18" charset="0"/>
-              <a:cs typeface="Times New Roman" panose="02020603050405020304" pitchFamily="18" charset="0"/>
-            </a:endParaRPr>
           </a:p>
           <a:p>
             <a:endParaRPr lang="zh-CN" altLang="en-US" dirty="0">
@@ -15467,7 +15981,7 @@
         </p:xfrm>
         <a:graphic>
           <a:graphicData uri="http://schemas.openxmlformats.org/drawingml/2006/diagram">
-            <dgm:relIds xmlns:dgm="http://schemas.openxmlformats.org/drawingml/2006/diagram" xmlns:r="http://schemas.openxmlformats.org/officeDocument/2006/relationships" r:dm="rId1" r:lo="rId2" r:qs="rId3" r:cs="rId4"/>
+            <dgm:relIds xmlns:dgm="http://schemas.openxmlformats.org/drawingml/2006/diagram" xmlns:r="http://schemas.openxmlformats.org/officeDocument/2006/relationships" r:dm="rId2" r:lo="rId3" r:qs="rId4" r:cs="rId5"/>
           </a:graphicData>
         </a:graphic>
       </p:graphicFrame>
@@ -15523,10 +16037,22 @@
               <a:t>Rust</a:t>
             </a:r>
             <a:r>
-              <a:rPr lang="zh-CN" altLang="en-US" dirty="0">
+              <a:rPr lang="zh-CN" altLang="en-US" dirty="0" smtClean="0">
                 <a:latin typeface="+mj-ea"/>
               </a:rPr>
               <a:t>介绍</a:t>
+            </a:r>
+            <a:r>
+              <a:rPr lang="en-US" altLang="zh-CN" dirty="0" smtClean="0">
+                <a:latin typeface="+mj-ea"/>
+              </a:rPr>
+              <a:t>-</a:t>
+            </a:r>
+            <a:r>
+              <a:rPr lang="zh-CN" altLang="en-US" dirty="0" smtClean="0">
+                <a:latin typeface="+mj-ea"/>
+              </a:rPr>
+              <a:t>发展历程</a:t>
             </a:r>
             <a:endParaRPr lang="zh-CN" altLang="en-US" dirty="0">
               <a:latin typeface="+mj-ea"/>
@@ -15546,7 +16072,7 @@
         </p:xfrm>
         <a:graphic>
           <a:graphicData uri="http://schemas.openxmlformats.org/drawingml/2006/diagram">
-            <dgm:relIds xmlns:dgm="http://schemas.openxmlformats.org/drawingml/2006/diagram" xmlns:r="http://schemas.openxmlformats.org/officeDocument/2006/relationships" r:dm="rId1" r:lo="rId2" r:qs="rId3" r:cs="rId4"/>
+            <dgm:relIds xmlns:dgm="http://schemas.openxmlformats.org/drawingml/2006/diagram" xmlns:r="http://schemas.openxmlformats.org/officeDocument/2006/relationships" r:dm="rId3" r:lo="rId4" r:qs="rId5" r:cs="rId6"/>
           </a:graphicData>
         </a:graphic>
       </p:graphicFrame>
@@ -15630,9 +16156,6 @@
               </a:rPr>
               <a:t>年再次进行大版本迭代</a:t>
             </a:r>
-            <a:endParaRPr lang="zh-CN" altLang="en-US" dirty="0">
-              <a:latin typeface="+mn-ea"/>
-            </a:endParaRPr>
           </a:p>
         </p:txBody>
       </p:sp>
@@ -15690,10 +16213,6 @@
               </a:rPr>
               <a:t>简介</a:t>
             </a:r>
-            <a:endParaRPr lang="zh-CN" altLang="en-US" dirty="0">
-              <a:latin typeface="+mn-ea"/>
-              <a:ea typeface="+mn-ea"/>
-            </a:endParaRPr>
           </a:p>
         </p:txBody>
       </p:sp>
@@ -15708,7 +16227,7 @@
           </p:nvPr>
         </p:nvPicPr>
         <p:blipFill>
-          <a:blip r:embed="rId1"/>
+          <a:blip r:embed="rId3"/>
           <a:stretch>
             <a:fillRect/>
           </a:stretch>
@@ -15813,10 +16332,6 @@
               </a:rPr>
               <a:t>简介</a:t>
             </a:r>
-            <a:endParaRPr lang="zh-CN" altLang="en-US" dirty="0">
-              <a:latin typeface="+mn-ea"/>
-              <a:ea typeface="+mn-ea"/>
-            </a:endParaRPr>
           </a:p>
         </p:txBody>
       </p:sp>
@@ -15829,7 +16344,7 @@
           <p:nvPr/>
         </p:nvPicPr>
         <p:blipFill>
-          <a:blip r:embed="rId1"/>
+          <a:blip r:embed="rId3"/>
           <a:stretch>
             <a:fillRect/>
           </a:stretch>
@@ -15894,10 +16409,6 @@
               </a:rPr>
               <a:t>基金会</a:t>
             </a:r>
-            <a:endParaRPr lang="zh-CN" altLang="en-US" dirty="0">
-              <a:latin typeface="+mn-ea"/>
-              <a:cs typeface="Times New Roman" panose="02020603050405020304" pitchFamily="18" charset="0"/>
-            </a:endParaRPr>
           </a:p>
         </p:txBody>
       </p:sp>
@@ -15948,10 +16459,22 @@
               <a:t>Rust</a:t>
             </a:r>
             <a:r>
-              <a:rPr lang="zh-CN" altLang="en-US" dirty="0">
+              <a:rPr lang="zh-CN" altLang="en-US" dirty="0" smtClean="0">
                 <a:latin typeface="+mj-ea"/>
               </a:rPr>
               <a:t>简介</a:t>
+            </a:r>
+            <a:r>
+              <a:rPr lang="en-US" altLang="zh-CN" dirty="0" smtClean="0">
+                <a:latin typeface="+mj-ea"/>
+              </a:rPr>
+              <a:t>-</a:t>
+            </a:r>
+            <a:r>
+              <a:rPr lang="zh-CN" altLang="en-US" dirty="0" smtClean="0">
+                <a:latin typeface="+mj-ea"/>
+              </a:rPr>
+              <a:t>特性</a:t>
             </a:r>
             <a:endParaRPr lang="zh-CN" altLang="en-US" dirty="0">
               <a:latin typeface="+mj-ea"/>
@@ -15997,13 +16520,6 @@
               </a:rPr>
               <a:t>安全性</a:t>
             </a:r>
-            <a:endParaRPr lang="zh-CN" altLang="en-US" dirty="0">
-              <a:solidFill>
-                <a:srgbClr val="C00000"/>
-              </a:solidFill>
-              <a:latin typeface="+mn-ea"/>
-              <a:ea typeface="+mn-ea"/>
-            </a:endParaRPr>
           </a:p>
         </p:txBody>
       </p:sp>
@@ -16054,10 +16570,22 @@
               <a:t>Rust</a:t>
             </a:r>
             <a:r>
-              <a:rPr lang="zh-CN" altLang="en-US" dirty="0">
+              <a:rPr lang="zh-CN" altLang="en-US" dirty="0" smtClean="0">
                 <a:latin typeface="+mj-ea"/>
               </a:rPr>
               <a:t>简介</a:t>
+            </a:r>
+            <a:r>
+              <a:rPr lang="en-US" altLang="zh-CN" dirty="0" smtClean="0">
+                <a:latin typeface="+mj-ea"/>
+              </a:rPr>
+              <a:t>-</a:t>
+            </a:r>
+            <a:r>
+              <a:rPr lang="zh-CN" altLang="en-US" dirty="0" smtClean="0">
+                <a:latin typeface="+mj-ea"/>
+              </a:rPr>
+              <a:t>特性</a:t>
             </a:r>
             <a:endParaRPr lang="zh-CN" altLang="en-US" dirty="0">
               <a:latin typeface="+mj-ea"/>
@@ -16145,10 +16673,6 @@
               </a:rPr>
               <a:t>原文链接</a:t>
             </a:r>
-            <a:endParaRPr lang="zh-CN" altLang="en-US" dirty="0">
-              <a:latin typeface="+mn-ea"/>
-              <a:ea typeface="+mn-ea"/>
-            </a:endParaRPr>
           </a:p>
         </p:txBody>
       </p:sp>
@@ -16199,10 +16723,22 @@
               <a:t>Rust</a:t>
             </a:r>
             <a:r>
-              <a:rPr lang="zh-CN" altLang="en-US" dirty="0">
+              <a:rPr lang="zh-CN" altLang="en-US" dirty="0" smtClean="0">
                 <a:latin typeface="+mj-ea"/>
               </a:rPr>
               <a:t>简介</a:t>
+            </a:r>
+            <a:r>
+              <a:rPr lang="en-US" altLang="zh-CN" dirty="0" smtClean="0">
+                <a:latin typeface="+mj-ea"/>
+              </a:rPr>
+              <a:t>-</a:t>
+            </a:r>
+            <a:r>
+              <a:rPr lang="zh-CN" altLang="en-US" dirty="0" smtClean="0">
+                <a:latin typeface="+mj-ea"/>
+              </a:rPr>
+              <a:t>特性</a:t>
             </a:r>
             <a:endParaRPr lang="zh-CN" altLang="en-US" dirty="0">
               <a:latin typeface="+mj-ea"/>
@@ -16243,7 +16779,6 @@
               <a:rPr lang="zh-CN" altLang="en-US" dirty="0"/>
               <a:t>实用性</a:t>
             </a:r>
-            <a:endParaRPr lang="zh-CN" altLang="en-US" dirty="0"/>
           </a:p>
         </p:txBody>
       </p:sp>
@@ -16294,11 +16829,23 @@
               <a:t>Rust</a:t>
             </a:r>
             <a:r>
-              <a:rPr lang="zh-CN" altLang="en-US" dirty="0">
+              <a:rPr lang="zh-CN" altLang="en-US" dirty="0" smtClean="0">
                 <a:latin typeface="+mj-ea"/>
               </a:rPr>
               <a:t>简介</a:t>
             </a:r>
+            <a:r>
+              <a:rPr lang="en-US" altLang="zh-CN" dirty="0" smtClean="0">
+                <a:latin typeface="+mj-ea"/>
+              </a:rPr>
+              <a:t>-</a:t>
+            </a:r>
+            <a:r>
+              <a:rPr lang="zh-CN" altLang="en-US" dirty="0" smtClean="0">
+                <a:latin typeface="+mj-ea"/>
+              </a:rPr>
+              <a:t>特性</a:t>
+            </a:r>
             <a:endParaRPr lang="zh-CN" altLang="en-US" dirty="0">
               <a:latin typeface="+mj-ea"/>
             </a:endParaRPr>
@@ -16317,12 +16864,18 @@
         </p:nvSpPr>
         <p:spPr/>
         <p:txBody>
-          <a:bodyPr/>
+          <a:bodyPr>
+            <a:normAutofit/>
+          </a:bodyPr>
           <a:lstStyle/>
           <a:p>
             <a:r>
-              <a:rPr lang="zh-CN" altLang="en-US" dirty="0"/>
-              <a:t>内存安全</a:t>
+              <a:rPr lang="zh-CN" altLang="en-US" dirty="0" smtClean="0"/>
+              <a:t>内存不安全</a:t>
+            </a:r>
+            <a:r>
+              <a:rPr lang="en-US" altLang="zh-CN" dirty="0" smtClean="0"/>
+              <a:t>	</a:t>
             </a:r>
             <a:endParaRPr lang="en-US" altLang="zh-CN" dirty="0"/>
           </a:p>
@@ -16335,8 +16888,8 @@
               <a:t>	- </a:t>
             </a:r>
             <a:r>
-              <a:rPr lang="zh-CN" altLang="en-US" dirty="0"/>
-              <a:t>所有权</a:t>
+              <a:rPr lang="zh-CN" altLang="en-US" dirty="0" smtClean="0"/>
+              <a:t>内存分配（使用未初始化的内存）</a:t>
             </a:r>
             <a:endParaRPr lang="en-US" altLang="zh-CN" dirty="0"/>
           </a:p>
@@ -16350,7 +16903,11 @@
             </a:r>
             <a:r>
               <a:rPr lang="zh-CN" altLang="en-US" dirty="0"/>
-              <a:t> 借用和生命周期</a:t>
+              <a:t> </a:t>
+            </a:r>
+            <a:r>
+              <a:rPr lang="zh-CN" altLang="en-US" dirty="0" smtClean="0"/>
+              <a:t>内存访问（空指针引用，索引越界，悬垂指针）</a:t>
             </a:r>
             <a:endParaRPr lang="en-US" altLang="zh-CN" dirty="0"/>
           </a:p>
@@ -16364,7 +16921,73 @@
             </a:r>
             <a:r>
               <a:rPr lang="zh-CN" altLang="en-US" dirty="0"/>
-              <a:t> 复杂的内置类型</a:t>
+              <a:t> </a:t>
+            </a:r>
+            <a:r>
+              <a:rPr lang="zh-CN" altLang="en-US" dirty="0" smtClean="0"/>
+              <a:t>内存释放 （重复释放）     </a:t>
+            </a:r>
+            <a:endParaRPr lang="en-US" altLang="zh-CN" dirty="0"/>
+          </a:p>
+          <a:p>
+            <a:pPr marL="0" indent="0">
+              <a:buNone/>
+            </a:pPr>
+            <a:endParaRPr lang="en-US" altLang="zh-CN" dirty="0"/>
+          </a:p>
+          <a:p>
+            <a:r>
+              <a:rPr lang="zh-CN" altLang="en-US" dirty="0" smtClean="0"/>
+              <a:t>内存安全</a:t>
+            </a:r>
+            <a:r>
+              <a:rPr lang="en-US" altLang="zh-CN" dirty="0"/>
+              <a:t>	</a:t>
+            </a:r>
+          </a:p>
+          <a:p>
+            <a:pPr marL="0" indent="0">
+              <a:buNone/>
+            </a:pPr>
+            <a:r>
+              <a:rPr lang="en-US" altLang="zh-CN" dirty="0"/>
+              <a:t>	- </a:t>
+            </a:r>
+            <a:r>
+              <a:rPr lang="zh-CN" altLang="en-US" dirty="0" smtClean="0"/>
+              <a:t>所有权</a:t>
+            </a:r>
+            <a:endParaRPr lang="en-US" altLang="zh-CN" dirty="0"/>
+          </a:p>
+          <a:p>
+            <a:pPr marL="0" indent="0">
+              <a:buNone/>
+            </a:pPr>
+            <a:r>
+              <a:rPr lang="en-US" altLang="zh-CN" dirty="0"/>
+              <a:t>	-</a:t>
+            </a:r>
+            <a:r>
+              <a:rPr lang="zh-CN" altLang="en-US" dirty="0"/>
+              <a:t> 借用和生命周期</a:t>
+            </a:r>
+            <a:endParaRPr lang="en-US" altLang="zh-CN" dirty="0"/>
+          </a:p>
+          <a:p>
+            <a:pPr marL="0" indent="0">
+              <a:buNone/>
+            </a:pPr>
+            <a:r>
+              <a:rPr lang="en-US" altLang="zh-CN" dirty="0"/>
+              <a:t>	-</a:t>
+            </a:r>
+            <a:r>
+              <a:rPr lang="zh-CN" altLang="en-US" dirty="0"/>
+              <a:t> 复杂的内置类型                                         </a:t>
+            </a:r>
+            <a:r>
+              <a:rPr lang="zh-CN" altLang="en-US" dirty="0" smtClean="0"/>
+              <a:t>                                    </a:t>
             </a:r>
             <a:endParaRPr lang="en-US" altLang="zh-CN" dirty="0"/>
           </a:p>
@@ -16636,6 +17259,8 @@
       </a:bgFillStyleLst>
     </a:fmtScheme>
   </a:themeElements>
+  <a:objectDefaults/>
+  <a:extraClrSchemeLst/>
   <a:extLst>
     <a:ext uri="{05A4C25C-085E-4340-85A3-A5531E510DB2}">
       <thm15:themeFamily xmlns:thm15="http://schemas.microsoft.com/office/thememl/2012/main" name="Office Theme" id="{62F939B6-93AF-4DB8-9C6B-D6C7DFDC589F}" vid="{4A3C46E8-61CC-4603-A589-7422A47A8E4A}"/>
@@ -16895,6 +17520,8 @@
       </a:bgFillStyleLst>
     </a:fmtScheme>
   </a:themeElements>
+  <a:objectDefaults/>
+  <a:extraClrSchemeLst/>
   <a:extLst>
     <a:ext uri="{05A4C25C-085E-4340-85A3-A5531E510DB2}">
       <thm15:themeFamily xmlns:thm15="http://schemas.microsoft.com/office/thememl/2012/main" name="Office Theme" id="{62F939B6-93AF-4DB8-9C6B-D6C7DFDC589F}" vid="{4A3C46E8-61CC-4603-A589-7422A47A8E4A}"/>

</xml_diff>